<commit_message>
Pushing update report and presentation
</commit_message>
<xml_diff>
--- a/presentation/Presentation.pptx
+++ b/presentation/Presentation.pptx
@@ -114,6 +114,11 @@
       </a:defRPr>
     </a:lvl9pPr>
   </p:defaultTextStyle>
+  <p:extLst>
+    <p:ext uri="{EFAFB233-063F-42B5-8137-9DF3F51BA10A}">
+      <p15:sldGuideLst xmlns:p15="http://schemas.microsoft.com/office/powerpoint/2012/main"/>
+    </p:ext>
+  </p:extLst>
 </p:presentation>
 </file>
 
@@ -6535,7 +6540,7 @@
           <a:p>
             <a:fld id="{454AC2A5-0FEF-48B7-BFA1-2A7660A2FE01}" type="datetimeFigureOut">
               <a:rPr lang="en-IN" smtClean="0"/>
-              <a:t>20-06-2025</a:t>
+              <a:t>22-06-2025</a:t>
             </a:fld>
             <a:endParaRPr lang="en-IN"/>
           </a:p>
@@ -6735,7 +6740,7 @@
           <a:p>
             <a:fld id="{454AC2A5-0FEF-48B7-BFA1-2A7660A2FE01}" type="datetimeFigureOut">
               <a:rPr lang="en-IN" smtClean="0"/>
-              <a:t>20-06-2025</a:t>
+              <a:t>22-06-2025</a:t>
             </a:fld>
             <a:endParaRPr lang="en-IN"/>
           </a:p>
@@ -6945,7 +6950,7 @@
           <a:p>
             <a:fld id="{454AC2A5-0FEF-48B7-BFA1-2A7660A2FE01}" type="datetimeFigureOut">
               <a:rPr lang="en-IN" smtClean="0"/>
-              <a:t>20-06-2025</a:t>
+              <a:t>22-06-2025</a:t>
             </a:fld>
             <a:endParaRPr lang="en-IN"/>
           </a:p>
@@ -7145,7 +7150,7 @@
           <a:p>
             <a:fld id="{454AC2A5-0FEF-48B7-BFA1-2A7660A2FE01}" type="datetimeFigureOut">
               <a:rPr lang="en-IN" smtClean="0"/>
-              <a:t>20-06-2025</a:t>
+              <a:t>22-06-2025</a:t>
             </a:fld>
             <a:endParaRPr lang="en-IN"/>
           </a:p>
@@ -7421,7 +7426,7 @@
           <a:p>
             <a:fld id="{454AC2A5-0FEF-48B7-BFA1-2A7660A2FE01}" type="datetimeFigureOut">
               <a:rPr lang="en-IN" smtClean="0"/>
-              <a:t>20-06-2025</a:t>
+              <a:t>22-06-2025</a:t>
             </a:fld>
             <a:endParaRPr lang="en-IN"/>
           </a:p>
@@ -7689,7 +7694,7 @@
           <a:p>
             <a:fld id="{454AC2A5-0FEF-48B7-BFA1-2A7660A2FE01}" type="datetimeFigureOut">
               <a:rPr lang="en-IN" smtClean="0"/>
-              <a:t>20-06-2025</a:t>
+              <a:t>22-06-2025</a:t>
             </a:fld>
             <a:endParaRPr lang="en-IN"/>
           </a:p>
@@ -8104,7 +8109,7 @@
           <a:p>
             <a:fld id="{454AC2A5-0FEF-48B7-BFA1-2A7660A2FE01}" type="datetimeFigureOut">
               <a:rPr lang="en-IN" smtClean="0"/>
-              <a:t>20-06-2025</a:t>
+              <a:t>22-06-2025</a:t>
             </a:fld>
             <a:endParaRPr lang="en-IN"/>
           </a:p>
@@ -8246,7 +8251,7 @@
           <a:p>
             <a:fld id="{454AC2A5-0FEF-48B7-BFA1-2A7660A2FE01}" type="datetimeFigureOut">
               <a:rPr lang="en-IN" smtClean="0"/>
-              <a:t>20-06-2025</a:t>
+              <a:t>22-06-2025</a:t>
             </a:fld>
             <a:endParaRPr lang="en-IN"/>
           </a:p>
@@ -8359,7 +8364,7 @@
           <a:p>
             <a:fld id="{454AC2A5-0FEF-48B7-BFA1-2A7660A2FE01}" type="datetimeFigureOut">
               <a:rPr lang="en-IN" smtClean="0"/>
-              <a:t>20-06-2025</a:t>
+              <a:t>22-06-2025</a:t>
             </a:fld>
             <a:endParaRPr lang="en-IN"/>
           </a:p>
@@ -8672,7 +8677,7 @@
           <a:p>
             <a:fld id="{454AC2A5-0FEF-48B7-BFA1-2A7660A2FE01}" type="datetimeFigureOut">
               <a:rPr lang="en-IN" smtClean="0"/>
-              <a:t>20-06-2025</a:t>
+              <a:t>22-06-2025</a:t>
             </a:fld>
             <a:endParaRPr lang="en-IN"/>
           </a:p>
@@ -8961,7 +8966,7 @@
           <a:p>
             <a:fld id="{454AC2A5-0FEF-48B7-BFA1-2A7660A2FE01}" type="datetimeFigureOut">
               <a:rPr lang="en-IN" smtClean="0"/>
-              <a:t>20-06-2025</a:t>
+              <a:t>22-06-2025</a:t>
             </a:fld>
             <a:endParaRPr lang="en-IN"/>
           </a:p>
@@ -9204,7 +9209,7 @@
           <a:p>
             <a:fld id="{454AC2A5-0FEF-48B7-BFA1-2A7660A2FE01}" type="datetimeFigureOut">
               <a:rPr lang="en-IN" smtClean="0"/>
-              <a:t>20-06-2025</a:t>
+              <a:t>22-06-2025</a:t>
             </a:fld>
             <a:endParaRPr lang="en-IN"/>
           </a:p>

</xml_diff>

<commit_message>
by Tushar--> presentation updated with output
</commit_message>
<xml_diff>
--- a/presentation/Presentation.pptx
+++ b/presentation/Presentation.pptx
@@ -116,7 +116,7 @@
   </p:defaultTextStyle>
   <p:extLst>
     <p:ext uri="{EFAFB233-063F-42B5-8137-9DF3F51BA10A}">
-      <p15:sldGuideLst xmlns:p15="http://schemas.microsoft.com/office/powerpoint/2012/main"/>
+      <p15:sldGuideLst xmlns:p15="http://schemas.microsoft.com/office/powerpoint/2012/main" xmlns=""/>
     </p:ext>
   </p:extLst>
 </p:presentation>
@@ -1928,6 +1928,13 @@
         </dgm:presLayoutVars>
       </dgm:prSet>
       <dgm:spPr/>
+      <dgm:t>
+        <a:bodyPr/>
+        <a:lstStyle/>
+        <a:p>
+          <a:endParaRPr lang="en-US"/>
+        </a:p>
+      </dgm:t>
     </dgm:pt>
     <dgm:pt modelId="{DB039CEE-5DE1-4E3A-AAA3-81FED94972FB}" type="pres">
       <dgm:prSet presAssocID="{6C8C840A-C567-4E41-AC7F-DCC8C22A71BF}" presName="container" presStyleCnt="0">
@@ -1953,10 +1960,10 @@
           <a:blip xmlns:r="http://schemas.openxmlformats.org/officeDocument/2006/relationships" r:embed="rId1">
             <a:extLst>
               <a:ext uri="{28A0092B-C50C-407E-A947-70E740481C1C}">
-                <a14:useLocalDpi xmlns:a14="http://schemas.microsoft.com/office/drawing/2010/main" val="0"/>
+                <a14:useLocalDpi xmlns:a14="http://schemas.microsoft.com/office/drawing/2010/main" xmlns="" val="0"/>
               </a:ext>
               <a:ext uri="{96DAC541-7B7A-43D3-8B79-37D633B846F1}">
-                <asvg:svgBlip xmlns:asvg="http://schemas.microsoft.com/office/drawing/2016/SVG/main" r:embed="rId2"/>
+                <asvg:svgBlip xmlns:asvg="http://schemas.microsoft.com/office/drawing/2016/SVG/main" xmlns="" r:embed="rId2"/>
               </a:ext>
             </a:extLst>
           </a:blip>
@@ -1967,7 +1974,7 @@
       </dgm:spPr>
       <dgm:extLst>
         <a:ext uri="{E40237B7-FDA0-4F09-8148-C483321AD2D9}">
-          <dgm14:cNvPr xmlns:dgm14="http://schemas.microsoft.com/office/drawing/2010/diagram" id="0" name="" descr="Soap"/>
+          <dgm14:cNvPr xmlns:dgm14="http://schemas.microsoft.com/office/drawing/2010/diagram" xmlns="" id="0" name="" descr="Soap"/>
         </a:ext>
       </dgm:extLst>
     </dgm:pt>
@@ -1983,10 +1990,24 @@
         </dgm:presLayoutVars>
       </dgm:prSet>
       <dgm:spPr/>
+      <dgm:t>
+        <a:bodyPr/>
+        <a:lstStyle/>
+        <a:p>
+          <a:endParaRPr lang="en-US"/>
+        </a:p>
+      </dgm:t>
     </dgm:pt>
     <dgm:pt modelId="{A75E7D06-795E-4BCD-8804-0D81F5494BDA}" type="pres">
       <dgm:prSet presAssocID="{4D3ABE35-E73D-47A3-844A-54EA20894622}" presName="sibTrans" presStyleLbl="sibTrans2D1" presStyleIdx="0" presStyleCnt="0"/>
       <dgm:spPr/>
+      <dgm:t>
+        <a:bodyPr/>
+        <a:lstStyle/>
+        <a:p>
+          <a:endParaRPr lang="en-US"/>
+        </a:p>
+      </dgm:t>
     </dgm:pt>
     <dgm:pt modelId="{9DD3713D-B86B-494F-9201-554E7849A6B3}" type="pres">
       <dgm:prSet presAssocID="{34D46799-C843-4CD2-8099-D19870888DBF}" presName="compNode" presStyleCnt="0"/>
@@ -2003,10 +2024,10 @@
           <a:blip xmlns:r="http://schemas.openxmlformats.org/officeDocument/2006/relationships" r:embed="rId3">
             <a:extLst>
               <a:ext uri="{28A0092B-C50C-407E-A947-70E740481C1C}">
-                <a14:useLocalDpi xmlns:a14="http://schemas.microsoft.com/office/drawing/2010/main" val="0"/>
+                <a14:useLocalDpi xmlns:a14="http://schemas.microsoft.com/office/drawing/2010/main" xmlns="" val="0"/>
               </a:ext>
               <a:ext uri="{96DAC541-7B7A-43D3-8B79-37D633B846F1}">
-                <asvg:svgBlip xmlns:asvg="http://schemas.microsoft.com/office/drawing/2016/SVG/main" r:embed="rId4"/>
+                <asvg:svgBlip xmlns:asvg="http://schemas.microsoft.com/office/drawing/2016/SVG/main" xmlns="" r:embed="rId4"/>
               </a:ext>
             </a:extLst>
           </a:blip>
@@ -2017,7 +2038,7 @@
       </dgm:spPr>
       <dgm:extLst>
         <a:ext uri="{E40237B7-FDA0-4F09-8148-C483321AD2D9}">
-          <dgm14:cNvPr xmlns:dgm14="http://schemas.microsoft.com/office/drawing/2010/diagram" id="0" name="" descr="DNA"/>
+          <dgm14:cNvPr xmlns:dgm14="http://schemas.microsoft.com/office/drawing/2010/diagram" xmlns="" id="0" name="" descr="DNA"/>
         </a:ext>
       </dgm:extLst>
     </dgm:pt>
@@ -2033,10 +2054,24 @@
         </dgm:presLayoutVars>
       </dgm:prSet>
       <dgm:spPr/>
+      <dgm:t>
+        <a:bodyPr/>
+        <a:lstStyle/>
+        <a:p>
+          <a:endParaRPr lang="en-US"/>
+        </a:p>
+      </dgm:t>
     </dgm:pt>
     <dgm:pt modelId="{5B74734C-0210-4C50-A3CB-A80B5795F937}" type="pres">
       <dgm:prSet presAssocID="{87F78B80-11DF-4F0A-863B-ACE258AB56F7}" presName="sibTrans" presStyleLbl="sibTrans2D1" presStyleIdx="0" presStyleCnt="0"/>
       <dgm:spPr/>
+      <dgm:t>
+        <a:bodyPr/>
+        <a:lstStyle/>
+        <a:p>
+          <a:endParaRPr lang="en-US"/>
+        </a:p>
+      </dgm:t>
     </dgm:pt>
     <dgm:pt modelId="{265D394B-D2C5-40DA-926F-123700179681}" type="pres">
       <dgm:prSet presAssocID="{AE768C7E-646C-4094-823F-EC43C957411C}" presName="compNode" presStyleCnt="0"/>
@@ -2053,10 +2088,10 @@
           <a:blip xmlns:r="http://schemas.openxmlformats.org/officeDocument/2006/relationships" r:embed="rId5">
             <a:extLst>
               <a:ext uri="{28A0092B-C50C-407E-A947-70E740481C1C}">
-                <a14:useLocalDpi xmlns:a14="http://schemas.microsoft.com/office/drawing/2010/main" val="0"/>
+                <a14:useLocalDpi xmlns:a14="http://schemas.microsoft.com/office/drawing/2010/main" xmlns="" val="0"/>
               </a:ext>
               <a:ext uri="{96DAC541-7B7A-43D3-8B79-37D633B846F1}">
-                <asvg:svgBlip xmlns:asvg="http://schemas.microsoft.com/office/drawing/2016/SVG/main" r:embed="rId6"/>
+                <asvg:svgBlip xmlns:asvg="http://schemas.microsoft.com/office/drawing/2016/SVG/main" xmlns="" r:embed="rId6"/>
               </a:ext>
             </a:extLst>
           </a:blip>
@@ -2067,7 +2102,7 @@
       </dgm:spPr>
       <dgm:extLst>
         <a:ext uri="{E40237B7-FDA0-4F09-8148-C483321AD2D9}">
-          <dgm14:cNvPr xmlns:dgm14="http://schemas.microsoft.com/office/drawing/2010/diagram" id="0" name="" descr="Radioactive Sign"/>
+          <dgm14:cNvPr xmlns:dgm14="http://schemas.microsoft.com/office/drawing/2010/diagram" xmlns="" id="0" name="" descr="Radioactive Sign"/>
         </a:ext>
       </dgm:extLst>
     </dgm:pt>
@@ -2083,10 +2118,24 @@
         </dgm:presLayoutVars>
       </dgm:prSet>
       <dgm:spPr/>
+      <dgm:t>
+        <a:bodyPr/>
+        <a:lstStyle/>
+        <a:p>
+          <a:endParaRPr lang="en-US"/>
+        </a:p>
+      </dgm:t>
     </dgm:pt>
     <dgm:pt modelId="{C0A0DCDD-8CD8-4914-8498-B9385AB762C1}" type="pres">
       <dgm:prSet presAssocID="{C64AD569-6216-4DEA-9F0C-2433C617CC28}" presName="sibTrans" presStyleLbl="sibTrans2D1" presStyleIdx="0" presStyleCnt="0"/>
       <dgm:spPr/>
+      <dgm:t>
+        <a:bodyPr/>
+        <a:lstStyle/>
+        <a:p>
+          <a:endParaRPr lang="en-US"/>
+        </a:p>
+      </dgm:t>
     </dgm:pt>
     <dgm:pt modelId="{2146EF60-0AE1-40E7-A0CA-172AB8C52D4E}" type="pres">
       <dgm:prSet presAssocID="{0258DCA9-E20A-436F-8E1C-78C1BAED27FB}" presName="compNode" presStyleCnt="0"/>
@@ -2103,10 +2152,10 @@
           <a:blip xmlns:r="http://schemas.openxmlformats.org/officeDocument/2006/relationships" r:embed="rId7">
             <a:extLst>
               <a:ext uri="{28A0092B-C50C-407E-A947-70E740481C1C}">
-                <a14:useLocalDpi xmlns:a14="http://schemas.microsoft.com/office/drawing/2010/main" val="0"/>
+                <a14:useLocalDpi xmlns:a14="http://schemas.microsoft.com/office/drawing/2010/main" xmlns="" val="0"/>
               </a:ext>
               <a:ext uri="{96DAC541-7B7A-43D3-8B79-37D633B846F1}">
-                <asvg:svgBlip xmlns:asvg="http://schemas.microsoft.com/office/drawing/2016/SVG/main" r:embed="rId8"/>
+                <asvg:svgBlip xmlns:asvg="http://schemas.microsoft.com/office/drawing/2016/SVG/main" xmlns="" r:embed="rId8"/>
               </a:ext>
             </a:extLst>
           </a:blip>
@@ -2117,7 +2166,7 @@
       </dgm:spPr>
       <dgm:extLst>
         <a:ext uri="{E40237B7-FDA0-4F09-8148-C483321AD2D9}">
-          <dgm14:cNvPr xmlns:dgm14="http://schemas.microsoft.com/office/drawing/2010/diagram" id="0" name="" descr="Dice"/>
+          <dgm14:cNvPr xmlns:dgm14="http://schemas.microsoft.com/office/drawing/2010/diagram" xmlns="" id="0" name="" descr="Dice"/>
         </a:ext>
       </dgm:extLst>
     </dgm:pt>
@@ -2133,10 +2182,24 @@
         </dgm:presLayoutVars>
       </dgm:prSet>
       <dgm:spPr/>
+      <dgm:t>
+        <a:bodyPr/>
+        <a:lstStyle/>
+        <a:p>
+          <a:endParaRPr lang="en-US"/>
+        </a:p>
+      </dgm:t>
     </dgm:pt>
     <dgm:pt modelId="{21A10FF2-BDF7-4B55-B62D-F590E5A3BBD1}" type="pres">
       <dgm:prSet presAssocID="{45C94375-1821-4405-B3A9-ECEFB9F7477E}" presName="sibTrans" presStyleLbl="sibTrans2D1" presStyleIdx="0" presStyleCnt="0"/>
       <dgm:spPr/>
+      <dgm:t>
+        <a:bodyPr/>
+        <a:lstStyle/>
+        <a:p>
+          <a:endParaRPr lang="en-US"/>
+        </a:p>
+      </dgm:t>
     </dgm:pt>
     <dgm:pt modelId="{6027D0B0-7994-42AA-90FB-46BECBA9986D}" type="pres">
       <dgm:prSet presAssocID="{9719A11D-D2AE-44B4-85B5-895E7A68B731}" presName="compNode" presStyleCnt="0"/>
@@ -2153,10 +2216,10 @@
           <a:blip xmlns:r="http://schemas.openxmlformats.org/officeDocument/2006/relationships" r:embed="rId9">
             <a:extLst>
               <a:ext uri="{28A0092B-C50C-407E-A947-70E740481C1C}">
-                <a14:useLocalDpi xmlns:a14="http://schemas.microsoft.com/office/drawing/2010/main" val="0"/>
+                <a14:useLocalDpi xmlns:a14="http://schemas.microsoft.com/office/drawing/2010/main" xmlns="" val="0"/>
               </a:ext>
               <a:ext uri="{96DAC541-7B7A-43D3-8B79-37D633B846F1}">
-                <asvg:svgBlip xmlns:asvg="http://schemas.microsoft.com/office/drawing/2016/SVG/main" r:embed="rId10"/>
+                <asvg:svgBlip xmlns:asvg="http://schemas.microsoft.com/office/drawing/2016/SVG/main" xmlns="" r:embed="rId10"/>
               </a:ext>
             </a:extLst>
           </a:blip>
@@ -2167,7 +2230,7 @@
       </dgm:spPr>
       <dgm:extLst>
         <a:ext uri="{E40237B7-FDA0-4F09-8148-C483321AD2D9}">
-          <dgm14:cNvPr xmlns:dgm14="http://schemas.microsoft.com/office/drawing/2010/diagram" id="0" name="" descr="Web Design"/>
+          <dgm14:cNvPr xmlns:dgm14="http://schemas.microsoft.com/office/drawing/2010/diagram" xmlns="" id="0" name="" descr="Web Design"/>
         </a:ext>
       </dgm:extLst>
     </dgm:pt>
@@ -2183,24 +2246,31 @@
         </dgm:presLayoutVars>
       </dgm:prSet>
       <dgm:spPr/>
+      <dgm:t>
+        <a:bodyPr/>
+        <a:lstStyle/>
+        <a:p>
+          <a:endParaRPr lang="en-US"/>
+        </a:p>
+      </dgm:t>
     </dgm:pt>
   </dgm:ptLst>
   <dgm:cxnLst>
     <dgm:cxn modelId="{58D62C0B-530C-4C12-B3A3-67B2F94AC488}" type="presOf" srcId="{145238CD-F046-4BB2-BE2F-E678B29DCA14}" destId="{342406A4-8A20-45FC-BA12-1B72DA537120}" srcOrd="0" destOrd="0" presId="urn:microsoft.com/office/officeart/2018/2/layout/IconCircleList"/>
+    <dgm:cxn modelId="{A5640E22-EFE3-4C85-8979-331514F33EA1}" srcId="{6C8C840A-C567-4E41-AC7F-DCC8C22A71BF}" destId="{34D46799-C843-4CD2-8099-D19870888DBF}" srcOrd="1" destOrd="0" parTransId="{B05489D6-A55A-4CB5-A23E-DB77076FC040}" sibTransId="{87F78B80-11DF-4F0A-863B-ACE258AB56F7}"/>
+    <dgm:cxn modelId="{0934128B-3713-448C-8C2D-386A077F085F}" srcId="{6C8C840A-C567-4E41-AC7F-DCC8C22A71BF}" destId="{0258DCA9-E20A-436F-8E1C-78C1BAED27FB}" srcOrd="3" destOrd="0" parTransId="{1EA43818-098F-4489-BCCB-2138C75D11CE}" sibTransId="{45C94375-1821-4405-B3A9-ECEFB9F7477E}"/>
+    <dgm:cxn modelId="{62668260-3062-4AE7-AD05-42C52A347291}" type="presOf" srcId="{45C94375-1821-4405-B3A9-ECEFB9F7477E}" destId="{21A10FF2-BDF7-4B55-B62D-F590E5A3BBD1}" srcOrd="0" destOrd="0" presId="urn:microsoft.com/office/officeart/2018/2/layout/IconCircleList"/>
+    <dgm:cxn modelId="{F388FB40-3DCC-4AA0-A67A-92F0907A538C}" type="presOf" srcId="{0258DCA9-E20A-436F-8E1C-78C1BAED27FB}" destId="{F5ADFA76-0579-4726-8CE3-8AAA6C6978FF}" srcOrd="0" destOrd="0" presId="urn:microsoft.com/office/officeart/2018/2/layout/IconCircleList"/>
+    <dgm:cxn modelId="{7626625A-1C68-43F5-8799-ED946CF7B770}" type="presOf" srcId="{9719A11D-D2AE-44B4-85B5-895E7A68B731}" destId="{A8E8641B-BEB1-4F96-862E-1554FAE170C8}" srcOrd="0" destOrd="0" presId="urn:microsoft.com/office/officeart/2018/2/layout/IconCircleList"/>
+    <dgm:cxn modelId="{DAB4A4BB-DD8A-4302-88D9-C6A4DB81155A}" srcId="{6C8C840A-C567-4E41-AC7F-DCC8C22A71BF}" destId="{9719A11D-D2AE-44B4-85B5-895E7A68B731}" srcOrd="4" destOrd="0" parTransId="{E08FA798-708B-45D2-B947-35F8C39BA337}" sibTransId="{BA32CD5D-1922-48D2-82F1-516DB83EE2CB}"/>
+    <dgm:cxn modelId="{50D50A20-74BA-4F78-8DE2-6745162C6981}" srcId="{6C8C840A-C567-4E41-AC7F-DCC8C22A71BF}" destId="{145238CD-F046-4BB2-BE2F-E678B29DCA14}" srcOrd="0" destOrd="0" parTransId="{E864B708-916C-4A7B-883E-CCF92CAE3854}" sibTransId="{4D3ABE35-E73D-47A3-844A-54EA20894622}"/>
+    <dgm:cxn modelId="{8B16B6F7-C19E-44AB-818D-534A064E7966}" type="presOf" srcId="{87F78B80-11DF-4F0A-863B-ACE258AB56F7}" destId="{5B74734C-0210-4C50-A3CB-A80B5795F937}" srcOrd="0" destOrd="0" presId="urn:microsoft.com/office/officeart/2018/2/layout/IconCircleList"/>
     <dgm:cxn modelId="{0957B119-24F4-4C72-9A7D-770CBD2EDFEA}" type="presOf" srcId="{C64AD569-6216-4DEA-9F0C-2433C617CC28}" destId="{C0A0DCDD-8CD8-4914-8498-B9385AB762C1}" srcOrd="0" destOrd="0" presId="urn:microsoft.com/office/officeart/2018/2/layout/IconCircleList"/>
-    <dgm:cxn modelId="{50D50A20-74BA-4F78-8DE2-6745162C6981}" srcId="{6C8C840A-C567-4E41-AC7F-DCC8C22A71BF}" destId="{145238CD-F046-4BB2-BE2F-E678B29DCA14}" srcOrd="0" destOrd="0" parTransId="{E864B708-916C-4A7B-883E-CCF92CAE3854}" sibTransId="{4D3ABE35-E73D-47A3-844A-54EA20894622}"/>
-    <dgm:cxn modelId="{A5640E22-EFE3-4C85-8979-331514F33EA1}" srcId="{6C8C840A-C567-4E41-AC7F-DCC8C22A71BF}" destId="{34D46799-C843-4CD2-8099-D19870888DBF}" srcOrd="1" destOrd="0" parTransId="{B05489D6-A55A-4CB5-A23E-DB77076FC040}" sibTransId="{87F78B80-11DF-4F0A-863B-ACE258AB56F7}"/>
+    <dgm:cxn modelId="{FAF7B258-F806-4A53-848A-D8EF44ADAC5B}" type="presOf" srcId="{AE768C7E-646C-4094-823F-EC43C957411C}" destId="{58696095-51C1-4A9E-99F4-0EA49BFA5CC1}" srcOrd="0" destOrd="0" presId="urn:microsoft.com/office/officeart/2018/2/layout/IconCircleList"/>
+    <dgm:cxn modelId="{5D1D4B97-2B16-42E7-92F8-FDE3435A8E95}" type="presOf" srcId="{4D3ABE35-E73D-47A3-844A-54EA20894622}" destId="{A75E7D06-795E-4BCD-8804-0D81F5494BDA}" srcOrd="0" destOrd="0" presId="urn:microsoft.com/office/officeart/2018/2/layout/IconCircleList"/>
+    <dgm:cxn modelId="{FA34FAF7-4A7B-41F0-A38F-57F8BB92AC5E}" type="presOf" srcId="{6C8C840A-C567-4E41-AC7F-DCC8C22A71BF}" destId="{65D20795-7FE0-4847-AE98-F7742371F842}" srcOrd="0" destOrd="0" presId="urn:microsoft.com/office/officeart/2018/2/layout/IconCircleList"/>
     <dgm:cxn modelId="{CC48373D-6179-412F-8598-F7935A68FEB7}" type="presOf" srcId="{34D46799-C843-4CD2-8099-D19870888DBF}" destId="{4A80E39C-1C60-4A81-8359-E8985174A6C4}" srcOrd="0" destOrd="0" presId="urn:microsoft.com/office/officeart/2018/2/layout/IconCircleList"/>
-    <dgm:cxn modelId="{F388FB40-3DCC-4AA0-A67A-92F0907A538C}" type="presOf" srcId="{0258DCA9-E20A-436F-8E1C-78C1BAED27FB}" destId="{F5ADFA76-0579-4726-8CE3-8AAA6C6978FF}" srcOrd="0" destOrd="0" presId="urn:microsoft.com/office/officeart/2018/2/layout/IconCircleList"/>
-    <dgm:cxn modelId="{62668260-3062-4AE7-AD05-42C52A347291}" type="presOf" srcId="{45C94375-1821-4405-B3A9-ECEFB9F7477E}" destId="{21A10FF2-BDF7-4B55-B62D-F590E5A3BBD1}" srcOrd="0" destOrd="0" presId="urn:microsoft.com/office/officeart/2018/2/layout/IconCircleList"/>
-    <dgm:cxn modelId="{FAF7B258-F806-4A53-848A-D8EF44ADAC5B}" type="presOf" srcId="{AE768C7E-646C-4094-823F-EC43C957411C}" destId="{58696095-51C1-4A9E-99F4-0EA49BFA5CC1}" srcOrd="0" destOrd="0" presId="urn:microsoft.com/office/officeart/2018/2/layout/IconCircleList"/>
-    <dgm:cxn modelId="{7626625A-1C68-43F5-8799-ED946CF7B770}" type="presOf" srcId="{9719A11D-D2AE-44B4-85B5-895E7A68B731}" destId="{A8E8641B-BEB1-4F96-862E-1554FAE170C8}" srcOrd="0" destOrd="0" presId="urn:microsoft.com/office/officeart/2018/2/layout/IconCircleList"/>
-    <dgm:cxn modelId="{0934128B-3713-448C-8C2D-386A077F085F}" srcId="{6C8C840A-C567-4E41-AC7F-DCC8C22A71BF}" destId="{0258DCA9-E20A-436F-8E1C-78C1BAED27FB}" srcOrd="3" destOrd="0" parTransId="{1EA43818-098F-4489-BCCB-2138C75D11CE}" sibTransId="{45C94375-1821-4405-B3A9-ECEFB9F7477E}"/>
-    <dgm:cxn modelId="{5D1D4B97-2B16-42E7-92F8-FDE3435A8E95}" type="presOf" srcId="{4D3ABE35-E73D-47A3-844A-54EA20894622}" destId="{A75E7D06-795E-4BCD-8804-0D81F5494BDA}" srcOrd="0" destOrd="0" presId="urn:microsoft.com/office/officeart/2018/2/layout/IconCircleList"/>
-    <dgm:cxn modelId="{DAB4A4BB-DD8A-4302-88D9-C6A4DB81155A}" srcId="{6C8C840A-C567-4E41-AC7F-DCC8C22A71BF}" destId="{9719A11D-D2AE-44B4-85B5-895E7A68B731}" srcOrd="4" destOrd="0" parTransId="{E08FA798-708B-45D2-B947-35F8C39BA337}" sibTransId="{BA32CD5D-1922-48D2-82F1-516DB83EE2CB}"/>
     <dgm:cxn modelId="{2A6895C8-CD57-4399-AB4D-765B16DECE93}" srcId="{6C8C840A-C567-4E41-AC7F-DCC8C22A71BF}" destId="{AE768C7E-646C-4094-823F-EC43C957411C}" srcOrd="2" destOrd="0" parTransId="{4BF6503C-69AD-4143-8C65-7D61AD0770CD}" sibTransId="{C64AD569-6216-4DEA-9F0C-2433C617CC28}"/>
-    <dgm:cxn modelId="{8B16B6F7-C19E-44AB-818D-534A064E7966}" type="presOf" srcId="{87F78B80-11DF-4F0A-863B-ACE258AB56F7}" destId="{5B74734C-0210-4C50-A3CB-A80B5795F937}" srcOrd="0" destOrd="0" presId="urn:microsoft.com/office/officeart/2018/2/layout/IconCircleList"/>
-    <dgm:cxn modelId="{FA34FAF7-4A7B-41F0-A38F-57F8BB92AC5E}" type="presOf" srcId="{6C8C840A-C567-4E41-AC7F-DCC8C22A71BF}" destId="{65D20795-7FE0-4847-AE98-F7742371F842}" srcOrd="0" destOrd="0" presId="urn:microsoft.com/office/officeart/2018/2/layout/IconCircleList"/>
     <dgm:cxn modelId="{1136DADA-F4E7-46A9-8EE2-9C0991F5B830}" type="presParOf" srcId="{65D20795-7FE0-4847-AE98-F7742371F842}" destId="{DB039CEE-5DE1-4E3A-AAA3-81FED94972FB}" srcOrd="0" destOrd="0" presId="urn:microsoft.com/office/officeart/2018/2/layout/IconCircleList"/>
     <dgm:cxn modelId="{EAF30452-D73B-4E0D-A3CC-827D99C6AEA0}" type="presParOf" srcId="{DB039CEE-5DE1-4E3A-AAA3-81FED94972FB}" destId="{E932DE3B-EEEC-476F-96A1-779AF72FE12D}" srcOrd="0" destOrd="0" presId="urn:microsoft.com/office/officeart/2018/2/layout/IconCircleList"/>
     <dgm:cxn modelId="{67BF2424-E653-42DE-A78E-040078B25BDE}" type="presParOf" srcId="{E932DE3B-EEEC-476F-96A1-779AF72FE12D}" destId="{79C4D5B3-DFF1-4778-991A-C42318EC3693}" srcOrd="0" destOrd="0" presId="urn:microsoft.com/office/officeart/2018/2/layout/IconCircleList"/>
@@ -2236,7 +2306,7 @@
   <dgm:whole/>
   <dgm:extLst>
     <a:ext uri="http://schemas.microsoft.com/office/drawing/2008/diagram">
-      <dsp:dataModelExt xmlns:dsp="http://schemas.microsoft.com/office/drawing/2008/diagram" relId="rId6" minVer="http://schemas.openxmlformats.org/drawingml/2006/diagram"/>
+      <dsp:dataModelExt xmlns:dsp="http://schemas.microsoft.com/office/drawing/2008/diagram" xmlns="" relId="rId6" minVer="http://schemas.openxmlformats.org/drawingml/2006/diagram"/>
     </a:ext>
   </dgm:extLst>
 </dgm:dataModel>
@@ -2409,6 +2479,13 @@
         </dgm:presLayoutVars>
       </dgm:prSet>
       <dgm:spPr/>
+      <dgm:t>
+        <a:bodyPr/>
+        <a:lstStyle/>
+        <a:p>
+          <a:endParaRPr lang="en-US"/>
+        </a:p>
+      </dgm:t>
     </dgm:pt>
     <dgm:pt modelId="{113704BA-9056-4FE8-9702-F9B2D9881227}" type="pres">
       <dgm:prSet presAssocID="{AFA2B4BF-EDAF-48C3-BE27-AA3DED60121C}" presName="compNode" presStyleCnt="0"/>
@@ -2421,10 +2498,10 @@
           <a:blip xmlns:r="http://schemas.openxmlformats.org/officeDocument/2006/relationships" r:embed="rId1">
             <a:extLst>
               <a:ext uri="{28A0092B-C50C-407E-A947-70E740481C1C}">
-                <a14:useLocalDpi xmlns:a14="http://schemas.microsoft.com/office/drawing/2010/main" val="0"/>
+                <a14:useLocalDpi xmlns:a14="http://schemas.microsoft.com/office/drawing/2010/main" xmlns="" val="0"/>
               </a:ext>
               <a:ext uri="{96DAC541-7B7A-43D3-8B79-37D633B846F1}">
-                <asvg:svgBlip xmlns:asvg="http://schemas.microsoft.com/office/drawing/2016/SVG/main" r:embed="rId2"/>
+                <asvg:svgBlip xmlns:asvg="http://schemas.microsoft.com/office/drawing/2016/SVG/main" xmlns="" r:embed="rId2"/>
               </a:ext>
             </a:extLst>
           </a:blip>
@@ -2438,7 +2515,7 @@
       </dgm:spPr>
       <dgm:extLst>
         <a:ext uri="{E40237B7-FDA0-4F09-8148-C483321AD2D9}">
-          <dgm14:cNvPr xmlns:dgm14="http://schemas.microsoft.com/office/drawing/2010/diagram" id="0" name="" descr="Statistics"/>
+          <dgm14:cNvPr xmlns:dgm14="http://schemas.microsoft.com/office/drawing/2010/diagram" xmlns="" id="0" name="" descr="Statistics"/>
         </a:ext>
       </dgm:extLst>
     </dgm:pt>
@@ -2454,6 +2531,13 @@
         </dgm:presLayoutVars>
       </dgm:prSet>
       <dgm:spPr/>
+      <dgm:t>
+        <a:bodyPr/>
+        <a:lstStyle/>
+        <a:p>
+          <a:endParaRPr lang="en-US"/>
+        </a:p>
+      </dgm:t>
     </dgm:pt>
     <dgm:pt modelId="{1D17FA59-6431-4A66-B86B-EE07D9E9BCC2}" type="pres">
       <dgm:prSet presAssocID="{D3EA78A0-2D17-4044-BEDB-9D7C43C013A4}" presName="sibTrans" presStyleCnt="0"/>
@@ -2470,10 +2554,10 @@
           <a:blip xmlns:r="http://schemas.openxmlformats.org/officeDocument/2006/relationships" r:embed="rId3">
             <a:extLst>
               <a:ext uri="{28A0092B-C50C-407E-A947-70E740481C1C}">
-                <a14:useLocalDpi xmlns:a14="http://schemas.microsoft.com/office/drawing/2010/main" val="0"/>
+                <a14:useLocalDpi xmlns:a14="http://schemas.microsoft.com/office/drawing/2010/main" xmlns="" val="0"/>
               </a:ext>
               <a:ext uri="{96DAC541-7B7A-43D3-8B79-37D633B846F1}">
-                <asvg:svgBlip xmlns:asvg="http://schemas.microsoft.com/office/drawing/2016/SVG/main" r:embed="rId4"/>
+                <asvg:svgBlip xmlns:asvg="http://schemas.microsoft.com/office/drawing/2016/SVG/main" xmlns="" r:embed="rId4"/>
               </a:ext>
             </a:extLst>
           </a:blip>
@@ -2487,7 +2571,7 @@
       </dgm:spPr>
       <dgm:extLst>
         <a:ext uri="{E40237B7-FDA0-4F09-8148-C483321AD2D9}">
-          <dgm14:cNvPr xmlns:dgm14="http://schemas.microsoft.com/office/drawing/2010/diagram" id="0" name="" descr="DNA"/>
+          <dgm14:cNvPr xmlns:dgm14="http://schemas.microsoft.com/office/drawing/2010/diagram" xmlns="" id="0" name="" descr="DNA"/>
         </a:ext>
       </dgm:extLst>
     </dgm:pt>
@@ -2503,6 +2587,13 @@
         </dgm:presLayoutVars>
       </dgm:prSet>
       <dgm:spPr/>
+      <dgm:t>
+        <a:bodyPr/>
+        <a:lstStyle/>
+        <a:p>
+          <a:endParaRPr lang="en-US"/>
+        </a:p>
+      </dgm:t>
     </dgm:pt>
     <dgm:pt modelId="{533DE433-5C8B-4937-8F36-173475661F1B}" type="pres">
       <dgm:prSet presAssocID="{4D79AC8B-D7C2-41EA-AFD4-693A04484004}" presName="sibTrans" presStyleCnt="0"/>
@@ -2519,10 +2610,10 @@
           <a:blip xmlns:r="http://schemas.openxmlformats.org/officeDocument/2006/relationships" r:embed="rId5">
             <a:extLst>
               <a:ext uri="{28A0092B-C50C-407E-A947-70E740481C1C}">
-                <a14:useLocalDpi xmlns:a14="http://schemas.microsoft.com/office/drawing/2010/main" val="0"/>
+                <a14:useLocalDpi xmlns:a14="http://schemas.microsoft.com/office/drawing/2010/main" xmlns="" val="0"/>
               </a:ext>
               <a:ext uri="{96DAC541-7B7A-43D3-8B79-37D633B846F1}">
-                <asvg:svgBlip xmlns:asvg="http://schemas.microsoft.com/office/drawing/2016/SVG/main" r:embed="rId6"/>
+                <asvg:svgBlip xmlns:asvg="http://schemas.microsoft.com/office/drawing/2016/SVG/main" xmlns="" r:embed="rId6"/>
               </a:ext>
             </a:extLst>
           </a:blip>
@@ -2536,7 +2627,7 @@
       </dgm:spPr>
       <dgm:extLst>
         <a:ext uri="{E40237B7-FDA0-4F09-8148-C483321AD2D9}">
-          <dgm14:cNvPr xmlns:dgm14="http://schemas.microsoft.com/office/drawing/2010/diagram" id="0" name="" descr="Microscope"/>
+          <dgm14:cNvPr xmlns:dgm14="http://schemas.microsoft.com/office/drawing/2010/diagram" xmlns="" id="0" name="" descr="Microscope"/>
         </a:ext>
       </dgm:extLst>
     </dgm:pt>
@@ -2552,6 +2643,13 @@
         </dgm:presLayoutVars>
       </dgm:prSet>
       <dgm:spPr/>
+      <dgm:t>
+        <a:bodyPr/>
+        <a:lstStyle/>
+        <a:p>
+          <a:endParaRPr lang="en-US"/>
+        </a:p>
+      </dgm:t>
     </dgm:pt>
     <dgm:pt modelId="{84E3DB4F-8554-436C-B7DC-B04848B58F66}" type="pres">
       <dgm:prSet presAssocID="{909F71A4-639E-471D-8F0A-949CBAD3B919}" presName="sibTrans" presStyleCnt="0"/>
@@ -2568,10 +2666,10 @@
           <a:blip xmlns:r="http://schemas.openxmlformats.org/officeDocument/2006/relationships" r:embed="rId7">
             <a:extLst>
               <a:ext uri="{28A0092B-C50C-407E-A947-70E740481C1C}">
-                <a14:useLocalDpi xmlns:a14="http://schemas.microsoft.com/office/drawing/2010/main" val="0"/>
+                <a14:useLocalDpi xmlns:a14="http://schemas.microsoft.com/office/drawing/2010/main" xmlns="" val="0"/>
               </a:ext>
               <a:ext uri="{96DAC541-7B7A-43D3-8B79-37D633B846F1}">
-                <asvg:svgBlip xmlns:asvg="http://schemas.microsoft.com/office/drawing/2016/SVG/main" r:embed="rId8"/>
+                <asvg:svgBlip xmlns:asvg="http://schemas.microsoft.com/office/drawing/2016/SVG/main" xmlns="" r:embed="rId8"/>
               </a:ext>
             </a:extLst>
           </a:blip>
@@ -2585,7 +2683,7 @@
       </dgm:spPr>
       <dgm:extLst>
         <a:ext uri="{E40237B7-FDA0-4F09-8148-C483321AD2D9}">
-          <dgm14:cNvPr xmlns:dgm14="http://schemas.microsoft.com/office/drawing/2010/diagram" id="0" name="" descr="Hierarchy"/>
+          <dgm14:cNvPr xmlns:dgm14="http://schemas.microsoft.com/office/drawing/2010/diagram" xmlns="" id="0" name="" descr="Hierarchy"/>
         </a:ext>
       </dgm:extLst>
     </dgm:pt>
@@ -2601,18 +2699,25 @@
         </dgm:presLayoutVars>
       </dgm:prSet>
       <dgm:spPr/>
+      <dgm:t>
+        <a:bodyPr/>
+        <a:lstStyle/>
+        <a:p>
+          <a:endParaRPr lang="en-US"/>
+        </a:p>
+      </dgm:t>
     </dgm:pt>
   </dgm:ptLst>
   <dgm:cxnLst>
+    <dgm:cxn modelId="{6517D687-E9EA-4418-8C9C-9DF44C4FA7EF}" type="presOf" srcId="{FC8B587B-4184-463D-8274-E8C77696F991}" destId="{ED4FD4F3-05A7-4205-A2B5-0586733507CA}" srcOrd="0" destOrd="0" presId="urn:microsoft.com/office/officeart/2018/2/layout/IconLabelList"/>
+    <dgm:cxn modelId="{3DDC2829-2728-4B80-9DF4-A45CBEBEBA99}" type="presOf" srcId="{AFA2B4BF-EDAF-48C3-BE27-AA3DED60121C}" destId="{61A44010-91E1-4D49-9D97-2A05F2A2925D}" srcOrd="0" destOrd="0" presId="urn:microsoft.com/office/officeart/2018/2/layout/IconLabelList"/>
+    <dgm:cxn modelId="{0B5E4578-B79E-42C1-87A8-ACCD4AE665C6}" type="presOf" srcId="{F7014DF9-CCCC-4791-A4F3-D1C87209727F}" destId="{8148804E-0774-4AFC-B26E-B1AF5A777EB1}" srcOrd="0" destOrd="0" presId="urn:microsoft.com/office/officeart/2018/2/layout/IconLabelList"/>
+    <dgm:cxn modelId="{10EACA2F-C895-41A7-839E-F3CB968B82ED}" srcId="{FC8B587B-4184-463D-8274-E8C77696F991}" destId="{7EA6F881-7E71-4C4B-95CF-47C99FC87A15}" srcOrd="2" destOrd="0" parTransId="{F77A042E-D93C-428A-AF15-1FC8DC4235CF}" sibTransId="{909F71A4-639E-471D-8F0A-949CBAD3B919}"/>
+    <dgm:cxn modelId="{CB84EFA9-F582-4758-8B42-F543E4C27904}" srcId="{FC8B587B-4184-463D-8274-E8C77696F991}" destId="{AFA2B4BF-EDAF-48C3-BE27-AA3DED60121C}" srcOrd="0" destOrd="0" parTransId="{8ABA9CDF-42B0-4B6B-A264-F6F10D1CDBEA}" sibTransId="{D3EA78A0-2D17-4044-BEDB-9D7C43C013A4}"/>
+    <dgm:cxn modelId="{C8F73F26-B93E-4C64-AF22-9E6F625E498C}" srcId="{FC8B587B-4184-463D-8274-E8C77696F991}" destId="{08EFC72C-9515-4A14-A322-C3E0FDC8CEFA}" srcOrd="1" destOrd="0" parTransId="{E04740C5-6EDE-460E-B7C3-5FD4258BE660}" sibTransId="{4D79AC8B-D7C2-41EA-AFD4-693A04484004}"/>
+    <dgm:cxn modelId="{B00B74A6-1605-431D-9648-D320F1378A90}" type="presOf" srcId="{08EFC72C-9515-4A14-A322-C3E0FDC8CEFA}" destId="{FF02F989-C728-4AA8-9775-B150D8F22DF8}" srcOrd="0" destOrd="0" presId="urn:microsoft.com/office/officeart/2018/2/layout/IconLabelList"/>
     <dgm:cxn modelId="{9C9C2A0D-1E57-4B46-915B-EECB45F294E9}" srcId="{FC8B587B-4184-463D-8274-E8C77696F991}" destId="{F7014DF9-CCCC-4791-A4F3-D1C87209727F}" srcOrd="3" destOrd="0" parTransId="{ED23BFEC-0B3D-483D-AFA9-295B9757D975}" sibTransId="{426FDA25-FC49-4778-9353-FC443E15F670}"/>
-    <dgm:cxn modelId="{C8F73F26-B93E-4C64-AF22-9E6F625E498C}" srcId="{FC8B587B-4184-463D-8274-E8C77696F991}" destId="{08EFC72C-9515-4A14-A322-C3E0FDC8CEFA}" srcOrd="1" destOrd="0" parTransId="{E04740C5-6EDE-460E-B7C3-5FD4258BE660}" sibTransId="{4D79AC8B-D7C2-41EA-AFD4-693A04484004}"/>
-    <dgm:cxn modelId="{3DDC2829-2728-4B80-9DF4-A45CBEBEBA99}" type="presOf" srcId="{AFA2B4BF-EDAF-48C3-BE27-AA3DED60121C}" destId="{61A44010-91E1-4D49-9D97-2A05F2A2925D}" srcOrd="0" destOrd="0" presId="urn:microsoft.com/office/officeart/2018/2/layout/IconLabelList"/>
-    <dgm:cxn modelId="{10EACA2F-C895-41A7-839E-F3CB968B82ED}" srcId="{FC8B587B-4184-463D-8274-E8C77696F991}" destId="{7EA6F881-7E71-4C4B-95CF-47C99FC87A15}" srcOrd="2" destOrd="0" parTransId="{F77A042E-D93C-428A-AF15-1FC8DC4235CF}" sibTransId="{909F71A4-639E-471D-8F0A-949CBAD3B919}"/>
-    <dgm:cxn modelId="{0B5E4578-B79E-42C1-87A8-ACCD4AE665C6}" type="presOf" srcId="{F7014DF9-CCCC-4791-A4F3-D1C87209727F}" destId="{8148804E-0774-4AFC-B26E-B1AF5A777EB1}" srcOrd="0" destOrd="0" presId="urn:microsoft.com/office/officeart/2018/2/layout/IconLabelList"/>
-    <dgm:cxn modelId="{6517D687-E9EA-4418-8C9C-9DF44C4FA7EF}" type="presOf" srcId="{FC8B587B-4184-463D-8274-E8C77696F991}" destId="{ED4FD4F3-05A7-4205-A2B5-0586733507CA}" srcOrd="0" destOrd="0" presId="urn:microsoft.com/office/officeart/2018/2/layout/IconLabelList"/>
     <dgm:cxn modelId="{B3394398-126E-4FF1-89E0-BDF34B62AD28}" type="presOf" srcId="{7EA6F881-7E71-4C4B-95CF-47C99FC87A15}" destId="{4D77CE26-1744-4DD8-98C0-0FDAA84255BD}" srcOrd="0" destOrd="0" presId="urn:microsoft.com/office/officeart/2018/2/layout/IconLabelList"/>
-    <dgm:cxn modelId="{B00B74A6-1605-431D-9648-D320F1378A90}" type="presOf" srcId="{08EFC72C-9515-4A14-A322-C3E0FDC8CEFA}" destId="{FF02F989-C728-4AA8-9775-B150D8F22DF8}" srcOrd="0" destOrd="0" presId="urn:microsoft.com/office/officeart/2018/2/layout/IconLabelList"/>
-    <dgm:cxn modelId="{CB84EFA9-F582-4758-8B42-F543E4C27904}" srcId="{FC8B587B-4184-463D-8274-E8C77696F991}" destId="{AFA2B4BF-EDAF-48C3-BE27-AA3DED60121C}" srcOrd="0" destOrd="0" parTransId="{8ABA9CDF-42B0-4B6B-A264-F6F10D1CDBEA}" sibTransId="{D3EA78A0-2D17-4044-BEDB-9D7C43C013A4}"/>
     <dgm:cxn modelId="{22B8D59A-31FE-459A-853A-DF2476B03D99}" type="presParOf" srcId="{ED4FD4F3-05A7-4205-A2B5-0586733507CA}" destId="{113704BA-9056-4FE8-9702-F9B2D9881227}" srcOrd="0" destOrd="0" presId="urn:microsoft.com/office/officeart/2018/2/layout/IconLabelList"/>
     <dgm:cxn modelId="{82DE896B-7909-4018-A7C3-25D55920EDC4}" type="presParOf" srcId="{113704BA-9056-4FE8-9702-F9B2D9881227}" destId="{E56C06C3-0C59-446F-8AF1-1942B1E3E593}" srcOrd="0" destOrd="0" presId="urn:microsoft.com/office/officeart/2018/2/layout/IconLabelList"/>
     <dgm:cxn modelId="{211CF4C8-E01D-4850-8C08-5E92E6B6E7E8}" type="presParOf" srcId="{113704BA-9056-4FE8-9702-F9B2D9881227}" destId="{3328EF4B-4A89-4C28-A2EB-A95692A106E2}" srcOrd="1" destOrd="0" presId="urn:microsoft.com/office/officeart/2018/2/layout/IconLabelList"/>
@@ -2637,14 +2742,14 @@
   <dgm:whole/>
   <dgm:extLst>
     <a:ext uri="http://schemas.microsoft.com/office/drawing/2008/diagram">
-      <dsp:dataModelExt xmlns:dsp="http://schemas.microsoft.com/office/drawing/2008/diagram" relId="rId6" minVer="http://schemas.openxmlformats.org/drawingml/2006/diagram"/>
+      <dsp:dataModelExt xmlns:dsp="http://schemas.microsoft.com/office/drawing/2008/diagram" xmlns="" relId="rId6" minVer="http://schemas.openxmlformats.org/drawingml/2006/diagram"/>
     </a:ext>
   </dgm:extLst>
 </dgm:dataModel>
 </file>
 
 <file path=ppt/diagrams/drawing1.xml><?xml version="1.0" encoding="utf-8"?>
-<dsp:drawing xmlns:dgm="http://schemas.openxmlformats.org/drawingml/2006/diagram" xmlns:dsp="http://schemas.microsoft.com/office/drawing/2008/diagram" xmlns:a="http://schemas.openxmlformats.org/drawingml/2006/main">
+<dsp:drawing xmlns:dgm="http://schemas.openxmlformats.org/drawingml/2006/diagram" xmlns:a="http://schemas.openxmlformats.org/drawingml/2006/main" xmlns:dsp="http://schemas.microsoft.com/office/drawing/2008/diagram">
   <dsp:spTree>
     <dsp:nvGrpSpPr>
       <dsp:cNvPr id="0" name=""/>
@@ -2708,10 +2813,10 @@
           <a:blip xmlns:r="http://schemas.openxmlformats.org/officeDocument/2006/relationships" r:embed="rId1">
             <a:extLst>
               <a:ext uri="{28A0092B-C50C-407E-A947-70E740481C1C}">
-                <a14:useLocalDpi xmlns:a14="http://schemas.microsoft.com/office/drawing/2010/main" val="0"/>
+                <a14:useLocalDpi xmlns:a14="http://schemas.microsoft.com/office/drawing/2010/main" xmlns="" val="0"/>
               </a:ext>
               <a:ext uri="{96DAC541-7B7A-43D3-8B79-37D633B846F1}">
-                <asvg:svgBlip xmlns:asvg="http://schemas.microsoft.com/office/drawing/2016/SVG/main" r:embed="rId2"/>
+                <asvg:svgBlip xmlns:asvg="http://schemas.microsoft.com/office/drawing/2016/SVG/main" xmlns="" r:embed="rId2"/>
               </a:ext>
             </a:extLst>
           </a:blip>
@@ -2785,7 +2890,7 @@
         </a:bodyPr>
         <a:lstStyle/>
         <a:p>
-          <a:pPr marL="0" lvl="0" indent="0" algn="l" defTabSz="800100">
+          <a:pPr lvl="0" algn="l" defTabSz="800100">
             <a:lnSpc>
               <a:spcPct val="100000"/>
             </a:lnSpc>
@@ -2795,7 +2900,6 @@
             <a:spcAft>
               <a:spcPct val="35000"/>
             </a:spcAft>
-            <a:buNone/>
           </a:pPr>
           <a:r>
             <a:rPr lang="en-US" sz="1800" b="1" kern="1200"/>
@@ -2869,10 +2973,10 @@
           <a:blip xmlns:r="http://schemas.openxmlformats.org/officeDocument/2006/relationships" r:embed="rId3">
             <a:extLst>
               <a:ext uri="{28A0092B-C50C-407E-A947-70E740481C1C}">
-                <a14:useLocalDpi xmlns:a14="http://schemas.microsoft.com/office/drawing/2010/main" val="0"/>
+                <a14:useLocalDpi xmlns:a14="http://schemas.microsoft.com/office/drawing/2010/main" xmlns="" val="0"/>
               </a:ext>
               <a:ext uri="{96DAC541-7B7A-43D3-8B79-37D633B846F1}">
-                <asvg:svgBlip xmlns:asvg="http://schemas.microsoft.com/office/drawing/2016/SVG/main" r:embed="rId4"/>
+                <asvg:svgBlip xmlns:asvg="http://schemas.microsoft.com/office/drawing/2016/SVG/main" xmlns="" r:embed="rId4"/>
               </a:ext>
             </a:extLst>
           </a:blip>
@@ -2946,7 +3050,7 @@
         </a:bodyPr>
         <a:lstStyle/>
         <a:p>
-          <a:pPr marL="0" lvl="0" indent="0" algn="l" defTabSz="800100">
+          <a:pPr lvl="0" algn="l" defTabSz="800100">
             <a:lnSpc>
               <a:spcPct val="100000"/>
             </a:lnSpc>
@@ -2956,7 +3060,6 @@
             <a:spcAft>
               <a:spcPct val="35000"/>
             </a:spcAft>
-            <a:buNone/>
           </a:pPr>
           <a:r>
             <a:rPr lang="en-US" sz="1800" b="1" kern="1200"/>
@@ -3030,10 +3133,10 @@
           <a:blip xmlns:r="http://schemas.openxmlformats.org/officeDocument/2006/relationships" r:embed="rId5">
             <a:extLst>
               <a:ext uri="{28A0092B-C50C-407E-A947-70E740481C1C}">
-                <a14:useLocalDpi xmlns:a14="http://schemas.microsoft.com/office/drawing/2010/main" val="0"/>
+                <a14:useLocalDpi xmlns:a14="http://schemas.microsoft.com/office/drawing/2010/main" xmlns="" val="0"/>
               </a:ext>
               <a:ext uri="{96DAC541-7B7A-43D3-8B79-37D633B846F1}">
-                <asvg:svgBlip xmlns:asvg="http://schemas.microsoft.com/office/drawing/2016/SVG/main" r:embed="rId6"/>
+                <asvg:svgBlip xmlns:asvg="http://schemas.microsoft.com/office/drawing/2016/SVG/main" xmlns="" r:embed="rId6"/>
               </a:ext>
             </a:extLst>
           </a:blip>
@@ -3107,7 +3210,7 @@
         </a:bodyPr>
         <a:lstStyle/>
         <a:p>
-          <a:pPr marL="0" lvl="0" indent="0" algn="l" defTabSz="800100">
+          <a:pPr lvl="0" algn="l" defTabSz="800100">
             <a:lnSpc>
               <a:spcPct val="100000"/>
             </a:lnSpc>
@@ -3117,7 +3220,6 @@
             <a:spcAft>
               <a:spcPct val="35000"/>
             </a:spcAft>
-            <a:buNone/>
           </a:pPr>
           <a:r>
             <a:rPr lang="en-US" sz="1800" b="1" kern="1200"/>
@@ -3191,10 +3293,10 @@
           <a:blip xmlns:r="http://schemas.openxmlformats.org/officeDocument/2006/relationships" r:embed="rId7">
             <a:extLst>
               <a:ext uri="{28A0092B-C50C-407E-A947-70E740481C1C}">
-                <a14:useLocalDpi xmlns:a14="http://schemas.microsoft.com/office/drawing/2010/main" val="0"/>
+                <a14:useLocalDpi xmlns:a14="http://schemas.microsoft.com/office/drawing/2010/main" xmlns="" val="0"/>
               </a:ext>
               <a:ext uri="{96DAC541-7B7A-43D3-8B79-37D633B846F1}">
-                <asvg:svgBlip xmlns:asvg="http://schemas.microsoft.com/office/drawing/2016/SVG/main" r:embed="rId8"/>
+                <asvg:svgBlip xmlns:asvg="http://schemas.microsoft.com/office/drawing/2016/SVG/main" xmlns="" r:embed="rId8"/>
               </a:ext>
             </a:extLst>
           </a:blip>
@@ -3268,7 +3370,7 @@
         </a:bodyPr>
         <a:lstStyle/>
         <a:p>
-          <a:pPr marL="0" lvl="0" indent="0" algn="l" defTabSz="800100">
+          <a:pPr lvl="0" algn="l" defTabSz="800100">
             <a:lnSpc>
               <a:spcPct val="100000"/>
             </a:lnSpc>
@@ -3278,7 +3380,6 @@
             <a:spcAft>
               <a:spcPct val="35000"/>
             </a:spcAft>
-            <a:buNone/>
           </a:pPr>
           <a:r>
             <a:rPr lang="en-US" sz="1800" b="1" kern="1200"/>
@@ -3360,10 +3461,10 @@
           <a:blip xmlns:r="http://schemas.openxmlformats.org/officeDocument/2006/relationships" r:embed="rId9">
             <a:extLst>
               <a:ext uri="{28A0092B-C50C-407E-A947-70E740481C1C}">
-                <a14:useLocalDpi xmlns:a14="http://schemas.microsoft.com/office/drawing/2010/main" val="0"/>
+                <a14:useLocalDpi xmlns:a14="http://schemas.microsoft.com/office/drawing/2010/main" xmlns="" val="0"/>
               </a:ext>
               <a:ext uri="{96DAC541-7B7A-43D3-8B79-37D633B846F1}">
-                <asvg:svgBlip xmlns:asvg="http://schemas.microsoft.com/office/drawing/2016/SVG/main" r:embed="rId10"/>
+                <asvg:svgBlip xmlns:asvg="http://schemas.microsoft.com/office/drawing/2016/SVG/main" xmlns="" r:embed="rId10"/>
               </a:ext>
             </a:extLst>
           </a:blip>
@@ -3437,7 +3538,7 @@
         </a:bodyPr>
         <a:lstStyle/>
         <a:p>
-          <a:pPr marL="0" lvl="0" indent="0" algn="l" defTabSz="800100">
+          <a:pPr lvl="0" algn="l" defTabSz="800100">
             <a:lnSpc>
               <a:spcPct val="100000"/>
             </a:lnSpc>
@@ -3447,7 +3548,6 @@
             <a:spcAft>
               <a:spcPct val="35000"/>
             </a:spcAft>
-            <a:buNone/>
           </a:pPr>
           <a:r>
             <a:rPr lang="en-US" sz="1800" b="1" kern="1200"/>
@@ -3469,7 +3569,7 @@
 </file>
 
 <file path=ppt/diagrams/drawing2.xml><?xml version="1.0" encoding="utf-8"?>
-<dsp:drawing xmlns:dgm="http://schemas.openxmlformats.org/drawingml/2006/diagram" xmlns:dsp="http://schemas.microsoft.com/office/drawing/2008/diagram" xmlns:a="http://schemas.openxmlformats.org/drawingml/2006/main">
+<dsp:drawing xmlns:dgm="http://schemas.openxmlformats.org/drawingml/2006/diagram" xmlns:a="http://schemas.openxmlformats.org/drawingml/2006/main" xmlns:dsp="http://schemas.microsoft.com/office/drawing/2008/diagram">
   <dsp:spTree>
     <dsp:nvGrpSpPr>
       <dsp:cNvPr id="0" name=""/>
@@ -3483,7 +3583,7 @@
       </dsp:nvSpPr>
       <dsp:spPr>
         <a:xfrm>
-          <a:off x="1138979" y="700581"/>
+          <a:off x="1138979" y="753484"/>
           <a:ext cx="932563" cy="932563"/>
         </a:xfrm>
         <a:prstGeom prst="rect">
@@ -3493,10 +3593,10 @@
           <a:blip xmlns:r="http://schemas.openxmlformats.org/officeDocument/2006/relationships" r:embed="rId1">
             <a:extLst>
               <a:ext uri="{28A0092B-C50C-407E-A947-70E740481C1C}">
-                <a14:useLocalDpi xmlns:a14="http://schemas.microsoft.com/office/drawing/2010/main" val="0"/>
+                <a14:useLocalDpi xmlns:a14="http://schemas.microsoft.com/office/drawing/2010/main" xmlns="" val="0"/>
               </a:ext>
               <a:ext uri="{96DAC541-7B7A-43D3-8B79-37D633B846F1}">
-                <asvg:svgBlip xmlns:asvg="http://schemas.microsoft.com/office/drawing/2016/SVG/main" r:embed="rId2"/>
+                <asvg:svgBlip xmlns:asvg="http://schemas.microsoft.com/office/drawing/2016/SVG/main" xmlns="" r:embed="rId2"/>
               </a:ext>
             </a:extLst>
           </a:blip>
@@ -3533,8 +3633,8 @@
       </dsp:nvSpPr>
       <dsp:spPr>
         <a:xfrm>
-          <a:off x="569079" y="2075756"/>
-          <a:ext cx="2072362" cy="1575000"/>
+          <a:off x="569079" y="2112853"/>
+          <a:ext cx="2072362" cy="1485000"/>
         </a:xfrm>
         <a:prstGeom prst="rect">
           <a:avLst/>
@@ -3563,7 +3663,7 @@
         </a:bodyPr>
         <a:lstStyle/>
         <a:p>
-          <a:pPr marL="0" lvl="0" indent="0" algn="ctr" defTabSz="977900">
+          <a:pPr lvl="0" algn="ctr" defTabSz="977900">
             <a:lnSpc>
               <a:spcPct val="90000"/>
             </a:lnSpc>
@@ -3573,7 +3673,6 @@
             <a:spcAft>
               <a:spcPct val="35000"/>
             </a:spcAft>
-            <a:buNone/>
           </a:pPr>
           <a:r>
             <a:rPr lang="en-US" sz="2200" kern="1200" dirty="0"/>
@@ -3582,8 +3681,8 @@
         </a:p>
       </dsp:txBody>
       <dsp:txXfrm>
-        <a:off x="569079" y="2075756"/>
-        <a:ext cx="2072362" cy="1575000"/>
+        <a:off x="569079" y="2112853"/>
+        <a:ext cx="2072362" cy="1485000"/>
       </dsp:txXfrm>
     </dsp:sp>
     <dsp:sp modelId="{424E382D-1EA7-4031-9C77-09DE33220C32}">
@@ -3593,7 +3692,7 @@
       </dsp:nvSpPr>
       <dsp:spPr>
         <a:xfrm>
-          <a:off x="3574005" y="700581"/>
+          <a:off x="3574005" y="753484"/>
           <a:ext cx="932563" cy="932563"/>
         </a:xfrm>
         <a:prstGeom prst="rect">
@@ -3603,10 +3702,10 @@
           <a:blip xmlns:r="http://schemas.openxmlformats.org/officeDocument/2006/relationships" r:embed="rId3">
             <a:extLst>
               <a:ext uri="{28A0092B-C50C-407E-A947-70E740481C1C}">
-                <a14:useLocalDpi xmlns:a14="http://schemas.microsoft.com/office/drawing/2010/main" val="0"/>
+                <a14:useLocalDpi xmlns:a14="http://schemas.microsoft.com/office/drawing/2010/main" xmlns="" val="0"/>
               </a:ext>
               <a:ext uri="{96DAC541-7B7A-43D3-8B79-37D633B846F1}">
-                <asvg:svgBlip xmlns:asvg="http://schemas.microsoft.com/office/drawing/2016/SVG/main" r:embed="rId4"/>
+                <asvg:svgBlip xmlns:asvg="http://schemas.microsoft.com/office/drawing/2016/SVG/main" xmlns="" r:embed="rId4"/>
               </a:ext>
             </a:extLst>
           </a:blip>
@@ -3643,8 +3742,8 @@
       </dsp:nvSpPr>
       <dsp:spPr>
         <a:xfrm>
-          <a:off x="3004105" y="2075756"/>
-          <a:ext cx="2072362" cy="1575000"/>
+          <a:off x="3004105" y="2112853"/>
+          <a:ext cx="2072362" cy="1485000"/>
         </a:xfrm>
         <a:prstGeom prst="rect">
           <a:avLst/>
@@ -3673,7 +3772,7 @@
         </a:bodyPr>
         <a:lstStyle/>
         <a:p>
-          <a:pPr marL="0" lvl="0" indent="0" algn="ctr" defTabSz="889000">
+          <a:pPr lvl="0" algn="ctr" defTabSz="889000">
             <a:lnSpc>
               <a:spcPct val="90000"/>
             </a:lnSpc>
@@ -3683,7 +3782,6 @@
             <a:spcAft>
               <a:spcPct val="35000"/>
             </a:spcAft>
-            <a:buNone/>
           </a:pPr>
           <a:r>
             <a:rPr lang="en-IN" sz="2000" kern="1200" dirty="0"/>
@@ -3693,8 +3791,8 @@
         </a:p>
       </dsp:txBody>
       <dsp:txXfrm>
-        <a:off x="3004105" y="2075756"/>
-        <a:ext cx="2072362" cy="1575000"/>
+        <a:off x="3004105" y="2112853"/>
+        <a:ext cx="2072362" cy="1485000"/>
       </dsp:txXfrm>
     </dsp:sp>
     <dsp:sp modelId="{B8E57336-0346-449F-A2DE-2AD2CD7EC44B}">
@@ -3704,7 +3802,7 @@
       </dsp:nvSpPr>
       <dsp:spPr>
         <a:xfrm>
-          <a:off x="6009031" y="700581"/>
+          <a:off x="6009031" y="753484"/>
           <a:ext cx="932563" cy="932563"/>
         </a:xfrm>
         <a:prstGeom prst="rect">
@@ -3714,10 +3812,10 @@
           <a:blip xmlns:r="http://schemas.openxmlformats.org/officeDocument/2006/relationships" r:embed="rId5">
             <a:extLst>
               <a:ext uri="{28A0092B-C50C-407E-A947-70E740481C1C}">
-                <a14:useLocalDpi xmlns:a14="http://schemas.microsoft.com/office/drawing/2010/main" val="0"/>
+                <a14:useLocalDpi xmlns:a14="http://schemas.microsoft.com/office/drawing/2010/main" xmlns="" val="0"/>
               </a:ext>
               <a:ext uri="{96DAC541-7B7A-43D3-8B79-37D633B846F1}">
-                <asvg:svgBlip xmlns:asvg="http://schemas.microsoft.com/office/drawing/2016/SVG/main" r:embed="rId6"/>
+                <asvg:svgBlip xmlns:asvg="http://schemas.microsoft.com/office/drawing/2016/SVG/main" xmlns="" r:embed="rId6"/>
               </a:ext>
             </a:extLst>
           </a:blip>
@@ -3754,8 +3852,8 @@
       </dsp:nvSpPr>
       <dsp:spPr>
         <a:xfrm>
-          <a:off x="5439131" y="2075756"/>
-          <a:ext cx="2072362" cy="1575000"/>
+          <a:off x="5439131" y="2112853"/>
+          <a:ext cx="2072362" cy="1485000"/>
         </a:xfrm>
         <a:prstGeom prst="rect">
           <a:avLst/>
@@ -3784,7 +3882,7 @@
         </a:bodyPr>
         <a:lstStyle/>
         <a:p>
-          <a:pPr marL="0" lvl="0" indent="0" algn="ctr" defTabSz="933450">
+          <a:pPr lvl="0" algn="ctr" defTabSz="933450">
             <a:lnSpc>
               <a:spcPct val="90000"/>
             </a:lnSpc>
@@ -3794,7 +3892,6 @@
             <a:spcAft>
               <a:spcPct val="35000"/>
             </a:spcAft>
-            <a:buNone/>
           </a:pPr>
           <a:r>
             <a:rPr lang="en-US" sz="2100" kern="1200" dirty="0"/>
@@ -3803,8 +3900,8 @@
         </a:p>
       </dsp:txBody>
       <dsp:txXfrm>
-        <a:off x="5439131" y="2075756"/>
-        <a:ext cx="2072362" cy="1575000"/>
+        <a:off x="5439131" y="2112853"/>
+        <a:ext cx="2072362" cy="1485000"/>
       </dsp:txXfrm>
     </dsp:sp>
     <dsp:sp modelId="{D3CF0D68-0CAC-4F7A-AC04-8D74E3ED13DB}">
@@ -3814,7 +3911,7 @@
       </dsp:nvSpPr>
       <dsp:spPr>
         <a:xfrm>
-          <a:off x="8444057" y="700581"/>
+          <a:off x="8444057" y="753484"/>
           <a:ext cx="932563" cy="932563"/>
         </a:xfrm>
         <a:prstGeom prst="rect">
@@ -3824,10 +3921,10 @@
           <a:blip xmlns:r="http://schemas.openxmlformats.org/officeDocument/2006/relationships" r:embed="rId7">
             <a:extLst>
               <a:ext uri="{28A0092B-C50C-407E-A947-70E740481C1C}">
-                <a14:useLocalDpi xmlns:a14="http://schemas.microsoft.com/office/drawing/2010/main" val="0"/>
+                <a14:useLocalDpi xmlns:a14="http://schemas.microsoft.com/office/drawing/2010/main" xmlns="" val="0"/>
               </a:ext>
               <a:ext uri="{96DAC541-7B7A-43D3-8B79-37D633B846F1}">
-                <asvg:svgBlip xmlns:asvg="http://schemas.microsoft.com/office/drawing/2016/SVG/main" r:embed="rId8"/>
+                <asvg:svgBlip xmlns:asvg="http://schemas.microsoft.com/office/drawing/2016/SVG/main" xmlns="" r:embed="rId8"/>
               </a:ext>
             </a:extLst>
           </a:blip>
@@ -3864,8 +3961,8 @@
       </dsp:nvSpPr>
       <dsp:spPr>
         <a:xfrm>
-          <a:off x="7874157" y="2075756"/>
-          <a:ext cx="2072362" cy="1575000"/>
+          <a:off x="7874157" y="2112853"/>
+          <a:ext cx="2072362" cy="1485000"/>
         </a:xfrm>
         <a:prstGeom prst="rect">
           <a:avLst/>
@@ -3894,7 +3991,7 @@
         </a:bodyPr>
         <a:lstStyle/>
         <a:p>
-          <a:pPr marL="0" lvl="0" indent="0" algn="ctr" defTabSz="933450">
+          <a:pPr lvl="0" algn="ctr" defTabSz="933450">
             <a:lnSpc>
               <a:spcPct val="90000"/>
             </a:lnSpc>
@@ -3904,7 +4001,6 @@
             <a:spcAft>
               <a:spcPct val="35000"/>
             </a:spcAft>
-            <a:buNone/>
           </a:pPr>
           <a:r>
             <a:rPr lang="en-US" sz="2100" kern="1200" dirty="0"/>
@@ -3913,8 +4009,8 @@
         </a:p>
       </dsp:txBody>
       <dsp:txXfrm>
-        <a:off x="7874157" y="2075756"/>
-        <a:ext cx="2072362" cy="1575000"/>
+        <a:off x="7874157" y="2112853"/>
+        <a:ext cx="2072362" cy="1485000"/>
       </dsp:txXfrm>
     </dsp:sp>
   </dsp:spTree>
@@ -4121,7 +4217,7 @@
   </dgm:layoutNode>
   <dgm:extLst>
     <a:ext uri="{68A01E43-0DF5-4B5B-8FA6-DAF915123BFB}">
-      <dgm1612:lstStyle xmlns:dgm1612="http://schemas.microsoft.com/office/drawing/2016/12/diagram">
+      <dgm1612:lstStyle xmlns:dgm1612="http://schemas.microsoft.com/office/drawing/2016/12/diagram" xmlns="">
         <a:lvl1pPr>
           <a:lnSpc>
             <a:spcPct val="100000"/>
@@ -4311,7 +4407,7 @@
   </dgm:layoutNode>
   <dgm:extLst>
     <a:ext uri="{68A01E43-0DF5-4B5B-8FA6-DAF915123BFB}">
-      <dgm1612:lstStyle xmlns:dgm1612="http://schemas.microsoft.com/office/drawing/2016/12/diagram">
+      <dgm1612:lstStyle xmlns:dgm1612="http://schemas.microsoft.com/office/drawing/2016/12/diagram" xmlns="">
         <a:lvl1pPr>
           <a:lnSpc>
             <a:spcPct val="100000"/>
@@ -6413,7 +6509,7 @@
           <p:cNvPr id="2" name="Title 1">
             <a:extLst>
               <a:ext uri="{FF2B5EF4-FFF2-40B4-BE49-F238E27FC236}">
-                <a16:creationId xmlns:a16="http://schemas.microsoft.com/office/drawing/2014/main" id="{E820F90A-E5AF-5F49-09C4-2CFF394E23FD}"/>
+                <a16:creationId xmlns:a16="http://schemas.microsoft.com/office/drawing/2014/main" xmlns="" id="{E820F90A-E5AF-5F49-09C4-2CFF394E23FD}"/>
               </a:ext>
             </a:extLst>
           </p:cNvPr>
@@ -6451,7 +6547,7 @@
           <p:cNvPr id="3" name="Subtitle 2">
             <a:extLst>
               <a:ext uri="{FF2B5EF4-FFF2-40B4-BE49-F238E27FC236}">
-                <a16:creationId xmlns:a16="http://schemas.microsoft.com/office/drawing/2014/main" id="{754CE0AF-3C40-64FE-7190-038BBD59D2C9}"/>
+                <a16:creationId xmlns:a16="http://schemas.microsoft.com/office/drawing/2014/main" xmlns="" id="{754CE0AF-3C40-64FE-7190-038BBD59D2C9}"/>
               </a:ext>
             </a:extLst>
           </p:cNvPr>
@@ -6522,7 +6618,7 @@
           <p:cNvPr id="4" name="Date Placeholder 3">
             <a:extLst>
               <a:ext uri="{FF2B5EF4-FFF2-40B4-BE49-F238E27FC236}">
-                <a16:creationId xmlns:a16="http://schemas.microsoft.com/office/drawing/2014/main" id="{03C70439-6DC5-E9A7-5DB2-FAA09AD535FE}"/>
+                <a16:creationId xmlns:a16="http://schemas.microsoft.com/office/drawing/2014/main" xmlns="" id="{03C70439-6DC5-E9A7-5DB2-FAA09AD535FE}"/>
               </a:ext>
             </a:extLst>
           </p:cNvPr>
@@ -6540,6 +6636,7 @@
           <a:p>
             <a:fld id="{454AC2A5-0FEF-48B7-BFA1-2A7660A2FE01}" type="datetimeFigureOut">
               <a:rPr lang="en-IN" smtClean="0"/>
+              <a:pPr/>
               <a:t>22-06-2025</a:t>
             </a:fld>
             <a:endParaRPr lang="en-IN"/>
@@ -6551,7 +6648,7 @@
           <p:cNvPr id="5" name="Footer Placeholder 4">
             <a:extLst>
               <a:ext uri="{FF2B5EF4-FFF2-40B4-BE49-F238E27FC236}">
-                <a16:creationId xmlns:a16="http://schemas.microsoft.com/office/drawing/2014/main" id="{2A3CEE6B-0F53-C233-2EED-EB1C07DA5809}"/>
+                <a16:creationId xmlns:a16="http://schemas.microsoft.com/office/drawing/2014/main" xmlns="" id="{2A3CEE6B-0F53-C233-2EED-EB1C07DA5809}"/>
               </a:ext>
             </a:extLst>
           </p:cNvPr>
@@ -6576,7 +6673,7 @@
           <p:cNvPr id="6" name="Slide Number Placeholder 5">
             <a:extLst>
               <a:ext uri="{FF2B5EF4-FFF2-40B4-BE49-F238E27FC236}">
-                <a16:creationId xmlns:a16="http://schemas.microsoft.com/office/drawing/2014/main" id="{E53F1636-57B1-F29D-174A-C1BC102E91EE}"/>
+                <a16:creationId xmlns:a16="http://schemas.microsoft.com/office/drawing/2014/main" xmlns="" id="{E53F1636-57B1-F29D-174A-C1BC102E91EE}"/>
               </a:ext>
             </a:extLst>
           </p:cNvPr>
@@ -6594,6 +6691,7 @@
           <a:p>
             <a:fld id="{7D7C4AF0-9CED-4FDF-85FB-19D355664334}" type="slidenum">
               <a:rPr lang="en-IN" smtClean="0"/>
+              <a:pPr/>
               <a:t>‹#›</a:t>
             </a:fld>
             <a:endParaRPr lang="en-IN"/>
@@ -6603,7 +6701,7 @@
     </p:spTree>
     <p:extLst>
       <p:ext uri="{BB962C8B-B14F-4D97-AF65-F5344CB8AC3E}">
-        <p14:creationId xmlns:p14="http://schemas.microsoft.com/office/powerpoint/2010/main" val="1780766630"/>
+        <p14:creationId xmlns:p14="http://schemas.microsoft.com/office/powerpoint/2010/main" xmlns="" val="1780766630"/>
       </p:ext>
     </p:extLst>
   </p:cSld>
@@ -6635,7 +6733,7 @@
           <p:cNvPr id="2" name="Title 1">
             <a:extLst>
               <a:ext uri="{FF2B5EF4-FFF2-40B4-BE49-F238E27FC236}">
-                <a16:creationId xmlns:a16="http://schemas.microsoft.com/office/drawing/2014/main" id="{8245417D-4E8F-8691-41E0-ADE7B2D57E62}"/>
+                <a16:creationId xmlns:a16="http://schemas.microsoft.com/office/drawing/2014/main" xmlns="" id="{8245417D-4E8F-8691-41E0-ADE7B2D57E62}"/>
               </a:ext>
             </a:extLst>
           </p:cNvPr>
@@ -6664,7 +6762,7 @@
           <p:cNvPr id="3" name="Vertical Text Placeholder 2">
             <a:extLst>
               <a:ext uri="{FF2B5EF4-FFF2-40B4-BE49-F238E27FC236}">
-                <a16:creationId xmlns:a16="http://schemas.microsoft.com/office/drawing/2014/main" id="{F1B0BE38-C3A6-8C16-EFA1-DDE6C5A3C846}"/>
+                <a16:creationId xmlns:a16="http://schemas.microsoft.com/office/drawing/2014/main" xmlns="" id="{F1B0BE38-C3A6-8C16-EFA1-DDE6C5A3C846}"/>
               </a:ext>
             </a:extLst>
           </p:cNvPr>
@@ -6722,7 +6820,7 @@
           <p:cNvPr id="4" name="Date Placeholder 3">
             <a:extLst>
               <a:ext uri="{FF2B5EF4-FFF2-40B4-BE49-F238E27FC236}">
-                <a16:creationId xmlns:a16="http://schemas.microsoft.com/office/drawing/2014/main" id="{2C874153-9E0F-D6A8-B869-DDD0DA135E31}"/>
+                <a16:creationId xmlns:a16="http://schemas.microsoft.com/office/drawing/2014/main" xmlns="" id="{2C874153-9E0F-D6A8-B869-DDD0DA135E31}"/>
               </a:ext>
             </a:extLst>
           </p:cNvPr>
@@ -6740,6 +6838,7 @@
           <a:p>
             <a:fld id="{454AC2A5-0FEF-48B7-BFA1-2A7660A2FE01}" type="datetimeFigureOut">
               <a:rPr lang="en-IN" smtClean="0"/>
+              <a:pPr/>
               <a:t>22-06-2025</a:t>
             </a:fld>
             <a:endParaRPr lang="en-IN"/>
@@ -6751,7 +6850,7 @@
           <p:cNvPr id="5" name="Footer Placeholder 4">
             <a:extLst>
               <a:ext uri="{FF2B5EF4-FFF2-40B4-BE49-F238E27FC236}">
-                <a16:creationId xmlns:a16="http://schemas.microsoft.com/office/drawing/2014/main" id="{F3CF47CC-8A87-33EB-2A49-6B0F0887A557}"/>
+                <a16:creationId xmlns:a16="http://schemas.microsoft.com/office/drawing/2014/main" xmlns="" id="{F3CF47CC-8A87-33EB-2A49-6B0F0887A557}"/>
               </a:ext>
             </a:extLst>
           </p:cNvPr>
@@ -6776,7 +6875,7 @@
           <p:cNvPr id="6" name="Slide Number Placeholder 5">
             <a:extLst>
               <a:ext uri="{FF2B5EF4-FFF2-40B4-BE49-F238E27FC236}">
-                <a16:creationId xmlns:a16="http://schemas.microsoft.com/office/drawing/2014/main" id="{B03288DF-E416-23ED-7D2E-8DE35DD20068}"/>
+                <a16:creationId xmlns:a16="http://schemas.microsoft.com/office/drawing/2014/main" xmlns="" id="{B03288DF-E416-23ED-7D2E-8DE35DD20068}"/>
               </a:ext>
             </a:extLst>
           </p:cNvPr>
@@ -6794,6 +6893,7 @@
           <a:p>
             <a:fld id="{7D7C4AF0-9CED-4FDF-85FB-19D355664334}" type="slidenum">
               <a:rPr lang="en-IN" smtClean="0"/>
+              <a:pPr/>
               <a:t>‹#›</a:t>
             </a:fld>
             <a:endParaRPr lang="en-IN"/>
@@ -6803,7 +6903,7 @@
     </p:spTree>
     <p:extLst>
       <p:ext uri="{BB962C8B-B14F-4D97-AF65-F5344CB8AC3E}">
-        <p14:creationId xmlns:p14="http://schemas.microsoft.com/office/powerpoint/2010/main" val="2214191763"/>
+        <p14:creationId xmlns:p14="http://schemas.microsoft.com/office/powerpoint/2010/main" xmlns="" val="2214191763"/>
       </p:ext>
     </p:extLst>
   </p:cSld>
@@ -6835,7 +6935,7 @@
           <p:cNvPr id="2" name="Vertical Title 1">
             <a:extLst>
               <a:ext uri="{FF2B5EF4-FFF2-40B4-BE49-F238E27FC236}">
-                <a16:creationId xmlns:a16="http://schemas.microsoft.com/office/drawing/2014/main" id="{F17A7DBB-D496-16F3-147A-46A43DDBE323}"/>
+                <a16:creationId xmlns:a16="http://schemas.microsoft.com/office/drawing/2014/main" xmlns="" id="{F17A7DBB-D496-16F3-147A-46A43DDBE323}"/>
               </a:ext>
             </a:extLst>
           </p:cNvPr>
@@ -6869,7 +6969,7 @@
           <p:cNvPr id="3" name="Vertical Text Placeholder 2">
             <a:extLst>
               <a:ext uri="{FF2B5EF4-FFF2-40B4-BE49-F238E27FC236}">
-                <a16:creationId xmlns:a16="http://schemas.microsoft.com/office/drawing/2014/main" id="{EA81C56C-DB7E-2404-5341-6EF82B31684A}"/>
+                <a16:creationId xmlns:a16="http://schemas.microsoft.com/office/drawing/2014/main" xmlns="" id="{EA81C56C-DB7E-2404-5341-6EF82B31684A}"/>
               </a:ext>
             </a:extLst>
           </p:cNvPr>
@@ -6932,7 +7032,7 @@
           <p:cNvPr id="4" name="Date Placeholder 3">
             <a:extLst>
               <a:ext uri="{FF2B5EF4-FFF2-40B4-BE49-F238E27FC236}">
-                <a16:creationId xmlns:a16="http://schemas.microsoft.com/office/drawing/2014/main" id="{B480DBE7-DA29-AFBA-DE5D-0795D1C85E93}"/>
+                <a16:creationId xmlns:a16="http://schemas.microsoft.com/office/drawing/2014/main" xmlns="" id="{B480DBE7-DA29-AFBA-DE5D-0795D1C85E93}"/>
               </a:ext>
             </a:extLst>
           </p:cNvPr>
@@ -6950,6 +7050,7 @@
           <a:p>
             <a:fld id="{454AC2A5-0FEF-48B7-BFA1-2A7660A2FE01}" type="datetimeFigureOut">
               <a:rPr lang="en-IN" smtClean="0"/>
+              <a:pPr/>
               <a:t>22-06-2025</a:t>
             </a:fld>
             <a:endParaRPr lang="en-IN"/>
@@ -6961,7 +7062,7 @@
           <p:cNvPr id="5" name="Footer Placeholder 4">
             <a:extLst>
               <a:ext uri="{FF2B5EF4-FFF2-40B4-BE49-F238E27FC236}">
-                <a16:creationId xmlns:a16="http://schemas.microsoft.com/office/drawing/2014/main" id="{C7A6F944-AAF0-24B7-E9A3-F1778B0029A6}"/>
+                <a16:creationId xmlns:a16="http://schemas.microsoft.com/office/drawing/2014/main" xmlns="" id="{C7A6F944-AAF0-24B7-E9A3-F1778B0029A6}"/>
               </a:ext>
             </a:extLst>
           </p:cNvPr>
@@ -6986,7 +7087,7 @@
           <p:cNvPr id="6" name="Slide Number Placeholder 5">
             <a:extLst>
               <a:ext uri="{FF2B5EF4-FFF2-40B4-BE49-F238E27FC236}">
-                <a16:creationId xmlns:a16="http://schemas.microsoft.com/office/drawing/2014/main" id="{CD9711F6-7176-1C1A-D801-093C418AA186}"/>
+                <a16:creationId xmlns:a16="http://schemas.microsoft.com/office/drawing/2014/main" xmlns="" id="{CD9711F6-7176-1C1A-D801-093C418AA186}"/>
               </a:ext>
             </a:extLst>
           </p:cNvPr>
@@ -7004,6 +7105,7 @@
           <a:p>
             <a:fld id="{7D7C4AF0-9CED-4FDF-85FB-19D355664334}" type="slidenum">
               <a:rPr lang="en-IN" smtClean="0"/>
+              <a:pPr/>
               <a:t>‹#›</a:t>
             </a:fld>
             <a:endParaRPr lang="en-IN"/>
@@ -7013,7 +7115,7 @@
     </p:spTree>
     <p:extLst>
       <p:ext uri="{BB962C8B-B14F-4D97-AF65-F5344CB8AC3E}">
-        <p14:creationId xmlns:p14="http://schemas.microsoft.com/office/powerpoint/2010/main" val="1504095700"/>
+        <p14:creationId xmlns:p14="http://schemas.microsoft.com/office/powerpoint/2010/main" xmlns="" val="1504095700"/>
       </p:ext>
     </p:extLst>
   </p:cSld>
@@ -7045,7 +7147,7 @@
           <p:cNvPr id="2" name="Title 1">
             <a:extLst>
               <a:ext uri="{FF2B5EF4-FFF2-40B4-BE49-F238E27FC236}">
-                <a16:creationId xmlns:a16="http://schemas.microsoft.com/office/drawing/2014/main" id="{79050F56-A839-B299-AFC3-4E299A50AC42}"/>
+                <a16:creationId xmlns:a16="http://schemas.microsoft.com/office/drawing/2014/main" xmlns="" id="{79050F56-A839-B299-AFC3-4E299A50AC42}"/>
               </a:ext>
             </a:extLst>
           </p:cNvPr>
@@ -7074,7 +7176,7 @@
           <p:cNvPr id="3" name="Content Placeholder 2">
             <a:extLst>
               <a:ext uri="{FF2B5EF4-FFF2-40B4-BE49-F238E27FC236}">
-                <a16:creationId xmlns:a16="http://schemas.microsoft.com/office/drawing/2014/main" id="{D73E808F-E5DA-2E08-1781-C0E8F0586B55}"/>
+                <a16:creationId xmlns:a16="http://schemas.microsoft.com/office/drawing/2014/main" xmlns="" id="{D73E808F-E5DA-2E08-1781-C0E8F0586B55}"/>
               </a:ext>
             </a:extLst>
           </p:cNvPr>
@@ -7132,7 +7234,7 @@
           <p:cNvPr id="4" name="Date Placeholder 3">
             <a:extLst>
               <a:ext uri="{FF2B5EF4-FFF2-40B4-BE49-F238E27FC236}">
-                <a16:creationId xmlns:a16="http://schemas.microsoft.com/office/drawing/2014/main" id="{2D4DB29D-9E19-1252-3382-232460D65F1E}"/>
+                <a16:creationId xmlns:a16="http://schemas.microsoft.com/office/drawing/2014/main" xmlns="" id="{2D4DB29D-9E19-1252-3382-232460D65F1E}"/>
               </a:ext>
             </a:extLst>
           </p:cNvPr>
@@ -7150,6 +7252,7 @@
           <a:p>
             <a:fld id="{454AC2A5-0FEF-48B7-BFA1-2A7660A2FE01}" type="datetimeFigureOut">
               <a:rPr lang="en-IN" smtClean="0"/>
+              <a:pPr/>
               <a:t>22-06-2025</a:t>
             </a:fld>
             <a:endParaRPr lang="en-IN"/>
@@ -7161,7 +7264,7 @@
           <p:cNvPr id="5" name="Footer Placeholder 4">
             <a:extLst>
               <a:ext uri="{FF2B5EF4-FFF2-40B4-BE49-F238E27FC236}">
-                <a16:creationId xmlns:a16="http://schemas.microsoft.com/office/drawing/2014/main" id="{76CD087E-FDE2-2B4A-DFD4-DB8D646A8822}"/>
+                <a16:creationId xmlns:a16="http://schemas.microsoft.com/office/drawing/2014/main" xmlns="" id="{76CD087E-FDE2-2B4A-DFD4-DB8D646A8822}"/>
               </a:ext>
             </a:extLst>
           </p:cNvPr>
@@ -7186,7 +7289,7 @@
           <p:cNvPr id="6" name="Slide Number Placeholder 5">
             <a:extLst>
               <a:ext uri="{FF2B5EF4-FFF2-40B4-BE49-F238E27FC236}">
-                <a16:creationId xmlns:a16="http://schemas.microsoft.com/office/drawing/2014/main" id="{490F1459-FDD3-049F-81A8-60CB39582385}"/>
+                <a16:creationId xmlns:a16="http://schemas.microsoft.com/office/drawing/2014/main" xmlns="" id="{490F1459-FDD3-049F-81A8-60CB39582385}"/>
               </a:ext>
             </a:extLst>
           </p:cNvPr>
@@ -7204,6 +7307,7 @@
           <a:p>
             <a:fld id="{7D7C4AF0-9CED-4FDF-85FB-19D355664334}" type="slidenum">
               <a:rPr lang="en-IN" smtClean="0"/>
+              <a:pPr/>
               <a:t>‹#›</a:t>
             </a:fld>
             <a:endParaRPr lang="en-IN"/>
@@ -7213,7 +7317,7 @@
     </p:spTree>
     <p:extLst>
       <p:ext uri="{BB962C8B-B14F-4D97-AF65-F5344CB8AC3E}">
-        <p14:creationId xmlns:p14="http://schemas.microsoft.com/office/powerpoint/2010/main" val="3235442445"/>
+        <p14:creationId xmlns:p14="http://schemas.microsoft.com/office/powerpoint/2010/main" xmlns="" val="3235442445"/>
       </p:ext>
     </p:extLst>
   </p:cSld>
@@ -7245,7 +7349,7 @@
           <p:cNvPr id="2" name="Title 1">
             <a:extLst>
               <a:ext uri="{FF2B5EF4-FFF2-40B4-BE49-F238E27FC236}">
-                <a16:creationId xmlns:a16="http://schemas.microsoft.com/office/drawing/2014/main" id="{79FE48B8-003E-1CCE-5FD6-2A826CA5C381}"/>
+                <a16:creationId xmlns:a16="http://schemas.microsoft.com/office/drawing/2014/main" xmlns="" id="{79FE48B8-003E-1CCE-5FD6-2A826CA5C381}"/>
               </a:ext>
             </a:extLst>
           </p:cNvPr>
@@ -7283,7 +7387,7 @@
           <p:cNvPr id="3" name="Text Placeholder 2">
             <a:extLst>
               <a:ext uri="{FF2B5EF4-FFF2-40B4-BE49-F238E27FC236}">
-                <a16:creationId xmlns:a16="http://schemas.microsoft.com/office/drawing/2014/main" id="{DB3D42D1-BC46-966E-633E-A2ED42E587E8}"/>
+                <a16:creationId xmlns:a16="http://schemas.microsoft.com/office/drawing/2014/main" xmlns="" id="{DB3D42D1-BC46-966E-633E-A2ED42E587E8}"/>
               </a:ext>
             </a:extLst>
           </p:cNvPr>
@@ -7408,7 +7512,7 @@
           <p:cNvPr id="4" name="Date Placeholder 3">
             <a:extLst>
               <a:ext uri="{FF2B5EF4-FFF2-40B4-BE49-F238E27FC236}">
-                <a16:creationId xmlns:a16="http://schemas.microsoft.com/office/drawing/2014/main" id="{6D9CBB9A-822D-3A8A-62B2-3A362D8915EF}"/>
+                <a16:creationId xmlns:a16="http://schemas.microsoft.com/office/drawing/2014/main" xmlns="" id="{6D9CBB9A-822D-3A8A-62B2-3A362D8915EF}"/>
               </a:ext>
             </a:extLst>
           </p:cNvPr>
@@ -7426,6 +7530,7 @@
           <a:p>
             <a:fld id="{454AC2A5-0FEF-48B7-BFA1-2A7660A2FE01}" type="datetimeFigureOut">
               <a:rPr lang="en-IN" smtClean="0"/>
+              <a:pPr/>
               <a:t>22-06-2025</a:t>
             </a:fld>
             <a:endParaRPr lang="en-IN"/>
@@ -7437,7 +7542,7 @@
           <p:cNvPr id="5" name="Footer Placeholder 4">
             <a:extLst>
               <a:ext uri="{FF2B5EF4-FFF2-40B4-BE49-F238E27FC236}">
-                <a16:creationId xmlns:a16="http://schemas.microsoft.com/office/drawing/2014/main" id="{EA535FC9-B0CF-4346-5627-13EE4C3B97FC}"/>
+                <a16:creationId xmlns:a16="http://schemas.microsoft.com/office/drawing/2014/main" xmlns="" id="{EA535FC9-B0CF-4346-5627-13EE4C3B97FC}"/>
               </a:ext>
             </a:extLst>
           </p:cNvPr>
@@ -7462,7 +7567,7 @@
           <p:cNvPr id="6" name="Slide Number Placeholder 5">
             <a:extLst>
               <a:ext uri="{FF2B5EF4-FFF2-40B4-BE49-F238E27FC236}">
-                <a16:creationId xmlns:a16="http://schemas.microsoft.com/office/drawing/2014/main" id="{C4ABDA90-48FE-6272-90F6-7EF14C03AFCC}"/>
+                <a16:creationId xmlns:a16="http://schemas.microsoft.com/office/drawing/2014/main" xmlns="" id="{C4ABDA90-48FE-6272-90F6-7EF14C03AFCC}"/>
               </a:ext>
             </a:extLst>
           </p:cNvPr>
@@ -7480,6 +7585,7 @@
           <a:p>
             <a:fld id="{7D7C4AF0-9CED-4FDF-85FB-19D355664334}" type="slidenum">
               <a:rPr lang="en-IN" smtClean="0"/>
+              <a:pPr/>
               <a:t>‹#›</a:t>
             </a:fld>
             <a:endParaRPr lang="en-IN"/>
@@ -7489,7 +7595,7 @@
     </p:spTree>
     <p:extLst>
       <p:ext uri="{BB962C8B-B14F-4D97-AF65-F5344CB8AC3E}">
-        <p14:creationId xmlns:p14="http://schemas.microsoft.com/office/powerpoint/2010/main" val="3897915752"/>
+        <p14:creationId xmlns:p14="http://schemas.microsoft.com/office/powerpoint/2010/main" xmlns="" val="3897915752"/>
       </p:ext>
     </p:extLst>
   </p:cSld>
@@ -7521,7 +7627,7 @@
           <p:cNvPr id="2" name="Title 1">
             <a:extLst>
               <a:ext uri="{FF2B5EF4-FFF2-40B4-BE49-F238E27FC236}">
-                <a16:creationId xmlns:a16="http://schemas.microsoft.com/office/drawing/2014/main" id="{3DE8668B-67D2-E995-BBF9-AC72DE667071}"/>
+                <a16:creationId xmlns:a16="http://schemas.microsoft.com/office/drawing/2014/main" xmlns="" id="{3DE8668B-67D2-E995-BBF9-AC72DE667071}"/>
               </a:ext>
             </a:extLst>
           </p:cNvPr>
@@ -7550,7 +7656,7 @@
           <p:cNvPr id="3" name="Content Placeholder 2">
             <a:extLst>
               <a:ext uri="{FF2B5EF4-FFF2-40B4-BE49-F238E27FC236}">
-                <a16:creationId xmlns:a16="http://schemas.microsoft.com/office/drawing/2014/main" id="{51D21AAD-C439-B7AA-BEE1-B07BF5E4275E}"/>
+                <a16:creationId xmlns:a16="http://schemas.microsoft.com/office/drawing/2014/main" xmlns="" id="{51D21AAD-C439-B7AA-BEE1-B07BF5E4275E}"/>
               </a:ext>
             </a:extLst>
           </p:cNvPr>
@@ -7613,7 +7719,7 @@
           <p:cNvPr id="4" name="Content Placeholder 3">
             <a:extLst>
               <a:ext uri="{FF2B5EF4-FFF2-40B4-BE49-F238E27FC236}">
-                <a16:creationId xmlns:a16="http://schemas.microsoft.com/office/drawing/2014/main" id="{CEC55D0B-97CB-4802-0DB3-DC80F1F77774}"/>
+                <a16:creationId xmlns:a16="http://schemas.microsoft.com/office/drawing/2014/main" xmlns="" id="{CEC55D0B-97CB-4802-0DB3-DC80F1F77774}"/>
               </a:ext>
             </a:extLst>
           </p:cNvPr>
@@ -7676,7 +7782,7 @@
           <p:cNvPr id="5" name="Date Placeholder 4">
             <a:extLst>
               <a:ext uri="{FF2B5EF4-FFF2-40B4-BE49-F238E27FC236}">
-                <a16:creationId xmlns:a16="http://schemas.microsoft.com/office/drawing/2014/main" id="{5AF02927-11E8-1CBD-BEE1-21D20763C49F}"/>
+                <a16:creationId xmlns:a16="http://schemas.microsoft.com/office/drawing/2014/main" xmlns="" id="{5AF02927-11E8-1CBD-BEE1-21D20763C49F}"/>
               </a:ext>
             </a:extLst>
           </p:cNvPr>
@@ -7694,6 +7800,7 @@
           <a:p>
             <a:fld id="{454AC2A5-0FEF-48B7-BFA1-2A7660A2FE01}" type="datetimeFigureOut">
               <a:rPr lang="en-IN" smtClean="0"/>
+              <a:pPr/>
               <a:t>22-06-2025</a:t>
             </a:fld>
             <a:endParaRPr lang="en-IN"/>
@@ -7705,7 +7812,7 @@
           <p:cNvPr id="6" name="Footer Placeholder 5">
             <a:extLst>
               <a:ext uri="{FF2B5EF4-FFF2-40B4-BE49-F238E27FC236}">
-                <a16:creationId xmlns:a16="http://schemas.microsoft.com/office/drawing/2014/main" id="{125A3D33-C848-77A1-7A8D-0002A9A97E1F}"/>
+                <a16:creationId xmlns:a16="http://schemas.microsoft.com/office/drawing/2014/main" xmlns="" id="{125A3D33-C848-77A1-7A8D-0002A9A97E1F}"/>
               </a:ext>
             </a:extLst>
           </p:cNvPr>
@@ -7730,7 +7837,7 @@
           <p:cNvPr id="7" name="Slide Number Placeholder 6">
             <a:extLst>
               <a:ext uri="{FF2B5EF4-FFF2-40B4-BE49-F238E27FC236}">
-                <a16:creationId xmlns:a16="http://schemas.microsoft.com/office/drawing/2014/main" id="{C547AFF2-E272-492C-3557-C7A0F90EDC16}"/>
+                <a16:creationId xmlns:a16="http://schemas.microsoft.com/office/drawing/2014/main" xmlns="" id="{C547AFF2-E272-492C-3557-C7A0F90EDC16}"/>
               </a:ext>
             </a:extLst>
           </p:cNvPr>
@@ -7748,6 +7855,7 @@
           <a:p>
             <a:fld id="{7D7C4AF0-9CED-4FDF-85FB-19D355664334}" type="slidenum">
               <a:rPr lang="en-IN" smtClean="0"/>
+              <a:pPr/>
               <a:t>‹#›</a:t>
             </a:fld>
             <a:endParaRPr lang="en-IN"/>
@@ -7757,7 +7865,7 @@
     </p:spTree>
     <p:extLst>
       <p:ext uri="{BB962C8B-B14F-4D97-AF65-F5344CB8AC3E}">
-        <p14:creationId xmlns:p14="http://schemas.microsoft.com/office/powerpoint/2010/main" val="1217009900"/>
+        <p14:creationId xmlns:p14="http://schemas.microsoft.com/office/powerpoint/2010/main" xmlns="" val="1217009900"/>
       </p:ext>
     </p:extLst>
   </p:cSld>
@@ -7789,7 +7897,7 @@
           <p:cNvPr id="2" name="Title 1">
             <a:extLst>
               <a:ext uri="{FF2B5EF4-FFF2-40B4-BE49-F238E27FC236}">
-                <a16:creationId xmlns:a16="http://schemas.microsoft.com/office/drawing/2014/main" id="{A82DE328-A01E-021D-6A8B-2FE921708085}"/>
+                <a16:creationId xmlns:a16="http://schemas.microsoft.com/office/drawing/2014/main" xmlns="" id="{A82DE328-A01E-021D-6A8B-2FE921708085}"/>
               </a:ext>
             </a:extLst>
           </p:cNvPr>
@@ -7823,7 +7931,7 @@
           <p:cNvPr id="3" name="Text Placeholder 2">
             <a:extLst>
               <a:ext uri="{FF2B5EF4-FFF2-40B4-BE49-F238E27FC236}">
-                <a16:creationId xmlns:a16="http://schemas.microsoft.com/office/drawing/2014/main" id="{5535ED79-927F-1ED8-D03D-D5552A919270}"/>
+                <a16:creationId xmlns:a16="http://schemas.microsoft.com/office/drawing/2014/main" xmlns="" id="{5535ED79-927F-1ED8-D03D-D5552A919270}"/>
               </a:ext>
             </a:extLst>
           </p:cNvPr>
@@ -7894,7 +8002,7 @@
           <p:cNvPr id="4" name="Content Placeholder 3">
             <a:extLst>
               <a:ext uri="{FF2B5EF4-FFF2-40B4-BE49-F238E27FC236}">
-                <a16:creationId xmlns:a16="http://schemas.microsoft.com/office/drawing/2014/main" id="{F85F79BA-01FE-E8DC-566B-365828CC3CDC}"/>
+                <a16:creationId xmlns:a16="http://schemas.microsoft.com/office/drawing/2014/main" xmlns="" id="{F85F79BA-01FE-E8DC-566B-365828CC3CDC}"/>
               </a:ext>
             </a:extLst>
           </p:cNvPr>
@@ -7957,7 +8065,7 @@
           <p:cNvPr id="5" name="Text Placeholder 4">
             <a:extLst>
               <a:ext uri="{FF2B5EF4-FFF2-40B4-BE49-F238E27FC236}">
-                <a16:creationId xmlns:a16="http://schemas.microsoft.com/office/drawing/2014/main" id="{1BD844AC-E2F9-AE47-9A19-05936FF8BE6B}"/>
+                <a16:creationId xmlns:a16="http://schemas.microsoft.com/office/drawing/2014/main" xmlns="" id="{1BD844AC-E2F9-AE47-9A19-05936FF8BE6B}"/>
               </a:ext>
             </a:extLst>
           </p:cNvPr>
@@ -8028,7 +8136,7 @@
           <p:cNvPr id="6" name="Content Placeholder 5">
             <a:extLst>
               <a:ext uri="{FF2B5EF4-FFF2-40B4-BE49-F238E27FC236}">
-                <a16:creationId xmlns:a16="http://schemas.microsoft.com/office/drawing/2014/main" id="{13D05E3E-E6B8-E5EB-C694-4720EE8094C2}"/>
+                <a16:creationId xmlns:a16="http://schemas.microsoft.com/office/drawing/2014/main" xmlns="" id="{13D05E3E-E6B8-E5EB-C694-4720EE8094C2}"/>
               </a:ext>
             </a:extLst>
           </p:cNvPr>
@@ -8091,7 +8199,7 @@
           <p:cNvPr id="7" name="Date Placeholder 6">
             <a:extLst>
               <a:ext uri="{FF2B5EF4-FFF2-40B4-BE49-F238E27FC236}">
-                <a16:creationId xmlns:a16="http://schemas.microsoft.com/office/drawing/2014/main" id="{14EED83C-209A-A413-F964-E60302E4BBED}"/>
+                <a16:creationId xmlns:a16="http://schemas.microsoft.com/office/drawing/2014/main" xmlns="" id="{14EED83C-209A-A413-F964-E60302E4BBED}"/>
               </a:ext>
             </a:extLst>
           </p:cNvPr>
@@ -8109,6 +8217,7 @@
           <a:p>
             <a:fld id="{454AC2A5-0FEF-48B7-BFA1-2A7660A2FE01}" type="datetimeFigureOut">
               <a:rPr lang="en-IN" smtClean="0"/>
+              <a:pPr/>
               <a:t>22-06-2025</a:t>
             </a:fld>
             <a:endParaRPr lang="en-IN"/>
@@ -8120,7 +8229,7 @@
           <p:cNvPr id="8" name="Footer Placeholder 7">
             <a:extLst>
               <a:ext uri="{FF2B5EF4-FFF2-40B4-BE49-F238E27FC236}">
-                <a16:creationId xmlns:a16="http://schemas.microsoft.com/office/drawing/2014/main" id="{7F3DA8F2-C7F8-D499-EACF-1BE67AC6BF4D}"/>
+                <a16:creationId xmlns:a16="http://schemas.microsoft.com/office/drawing/2014/main" xmlns="" id="{7F3DA8F2-C7F8-D499-EACF-1BE67AC6BF4D}"/>
               </a:ext>
             </a:extLst>
           </p:cNvPr>
@@ -8145,7 +8254,7 @@
           <p:cNvPr id="9" name="Slide Number Placeholder 8">
             <a:extLst>
               <a:ext uri="{FF2B5EF4-FFF2-40B4-BE49-F238E27FC236}">
-                <a16:creationId xmlns:a16="http://schemas.microsoft.com/office/drawing/2014/main" id="{51C818B3-EA9E-DDEA-136D-3E6CEFD63FA8}"/>
+                <a16:creationId xmlns:a16="http://schemas.microsoft.com/office/drawing/2014/main" xmlns="" id="{51C818B3-EA9E-DDEA-136D-3E6CEFD63FA8}"/>
               </a:ext>
             </a:extLst>
           </p:cNvPr>
@@ -8163,6 +8272,7 @@
           <a:p>
             <a:fld id="{7D7C4AF0-9CED-4FDF-85FB-19D355664334}" type="slidenum">
               <a:rPr lang="en-IN" smtClean="0"/>
+              <a:pPr/>
               <a:t>‹#›</a:t>
             </a:fld>
             <a:endParaRPr lang="en-IN"/>
@@ -8172,7 +8282,7 @@
     </p:spTree>
     <p:extLst>
       <p:ext uri="{BB962C8B-B14F-4D97-AF65-F5344CB8AC3E}">
-        <p14:creationId xmlns:p14="http://schemas.microsoft.com/office/powerpoint/2010/main" val="1254287675"/>
+        <p14:creationId xmlns:p14="http://schemas.microsoft.com/office/powerpoint/2010/main" xmlns="" val="1254287675"/>
       </p:ext>
     </p:extLst>
   </p:cSld>
@@ -8204,7 +8314,7 @@
           <p:cNvPr id="2" name="Title 1">
             <a:extLst>
               <a:ext uri="{FF2B5EF4-FFF2-40B4-BE49-F238E27FC236}">
-                <a16:creationId xmlns:a16="http://schemas.microsoft.com/office/drawing/2014/main" id="{D26F310F-3E28-B508-C060-260C740554FD}"/>
+                <a16:creationId xmlns:a16="http://schemas.microsoft.com/office/drawing/2014/main" xmlns="" id="{D26F310F-3E28-B508-C060-260C740554FD}"/>
               </a:ext>
             </a:extLst>
           </p:cNvPr>
@@ -8233,7 +8343,7 @@
           <p:cNvPr id="3" name="Date Placeholder 2">
             <a:extLst>
               <a:ext uri="{FF2B5EF4-FFF2-40B4-BE49-F238E27FC236}">
-                <a16:creationId xmlns:a16="http://schemas.microsoft.com/office/drawing/2014/main" id="{8498F20C-14C3-BB35-E5F9-DAF770C858E3}"/>
+                <a16:creationId xmlns:a16="http://schemas.microsoft.com/office/drawing/2014/main" xmlns="" id="{8498F20C-14C3-BB35-E5F9-DAF770C858E3}"/>
               </a:ext>
             </a:extLst>
           </p:cNvPr>
@@ -8251,6 +8361,7 @@
           <a:p>
             <a:fld id="{454AC2A5-0FEF-48B7-BFA1-2A7660A2FE01}" type="datetimeFigureOut">
               <a:rPr lang="en-IN" smtClean="0"/>
+              <a:pPr/>
               <a:t>22-06-2025</a:t>
             </a:fld>
             <a:endParaRPr lang="en-IN"/>
@@ -8262,7 +8373,7 @@
           <p:cNvPr id="4" name="Footer Placeholder 3">
             <a:extLst>
               <a:ext uri="{FF2B5EF4-FFF2-40B4-BE49-F238E27FC236}">
-                <a16:creationId xmlns:a16="http://schemas.microsoft.com/office/drawing/2014/main" id="{2B512BE4-8DF9-F717-C90B-AA7BC017820E}"/>
+                <a16:creationId xmlns:a16="http://schemas.microsoft.com/office/drawing/2014/main" xmlns="" id="{2B512BE4-8DF9-F717-C90B-AA7BC017820E}"/>
               </a:ext>
             </a:extLst>
           </p:cNvPr>
@@ -8287,7 +8398,7 @@
           <p:cNvPr id="5" name="Slide Number Placeholder 4">
             <a:extLst>
               <a:ext uri="{FF2B5EF4-FFF2-40B4-BE49-F238E27FC236}">
-                <a16:creationId xmlns:a16="http://schemas.microsoft.com/office/drawing/2014/main" id="{C0532BE0-D5D2-61DD-697C-F184380CDFD2}"/>
+                <a16:creationId xmlns:a16="http://schemas.microsoft.com/office/drawing/2014/main" xmlns="" id="{C0532BE0-D5D2-61DD-697C-F184380CDFD2}"/>
               </a:ext>
             </a:extLst>
           </p:cNvPr>
@@ -8305,6 +8416,7 @@
           <a:p>
             <a:fld id="{7D7C4AF0-9CED-4FDF-85FB-19D355664334}" type="slidenum">
               <a:rPr lang="en-IN" smtClean="0"/>
+              <a:pPr/>
               <a:t>‹#›</a:t>
             </a:fld>
             <a:endParaRPr lang="en-IN"/>
@@ -8314,7 +8426,7 @@
     </p:spTree>
     <p:extLst>
       <p:ext uri="{BB962C8B-B14F-4D97-AF65-F5344CB8AC3E}">
-        <p14:creationId xmlns:p14="http://schemas.microsoft.com/office/powerpoint/2010/main" val="1856996239"/>
+        <p14:creationId xmlns:p14="http://schemas.microsoft.com/office/powerpoint/2010/main" xmlns="" val="1856996239"/>
       </p:ext>
     </p:extLst>
   </p:cSld>
@@ -8346,7 +8458,7 @@
           <p:cNvPr id="2" name="Date Placeholder 1">
             <a:extLst>
               <a:ext uri="{FF2B5EF4-FFF2-40B4-BE49-F238E27FC236}">
-                <a16:creationId xmlns:a16="http://schemas.microsoft.com/office/drawing/2014/main" id="{EE5DEF32-EA0D-7DF7-A656-E5626B91DE10}"/>
+                <a16:creationId xmlns:a16="http://schemas.microsoft.com/office/drawing/2014/main" xmlns="" id="{EE5DEF32-EA0D-7DF7-A656-E5626B91DE10}"/>
               </a:ext>
             </a:extLst>
           </p:cNvPr>
@@ -8364,6 +8476,7 @@
           <a:p>
             <a:fld id="{454AC2A5-0FEF-48B7-BFA1-2A7660A2FE01}" type="datetimeFigureOut">
               <a:rPr lang="en-IN" smtClean="0"/>
+              <a:pPr/>
               <a:t>22-06-2025</a:t>
             </a:fld>
             <a:endParaRPr lang="en-IN"/>
@@ -8375,7 +8488,7 @@
           <p:cNvPr id="3" name="Footer Placeholder 2">
             <a:extLst>
               <a:ext uri="{FF2B5EF4-FFF2-40B4-BE49-F238E27FC236}">
-                <a16:creationId xmlns:a16="http://schemas.microsoft.com/office/drawing/2014/main" id="{8DB5F7D3-A966-9164-B5F7-29DD2187186C}"/>
+                <a16:creationId xmlns:a16="http://schemas.microsoft.com/office/drawing/2014/main" xmlns="" id="{8DB5F7D3-A966-9164-B5F7-29DD2187186C}"/>
               </a:ext>
             </a:extLst>
           </p:cNvPr>
@@ -8400,7 +8513,7 @@
           <p:cNvPr id="4" name="Slide Number Placeholder 3">
             <a:extLst>
               <a:ext uri="{FF2B5EF4-FFF2-40B4-BE49-F238E27FC236}">
-                <a16:creationId xmlns:a16="http://schemas.microsoft.com/office/drawing/2014/main" id="{9EAB5D7D-D8BA-6F00-25DE-72906740B0B6}"/>
+                <a16:creationId xmlns:a16="http://schemas.microsoft.com/office/drawing/2014/main" xmlns="" id="{9EAB5D7D-D8BA-6F00-25DE-72906740B0B6}"/>
               </a:ext>
             </a:extLst>
           </p:cNvPr>
@@ -8418,6 +8531,7 @@
           <a:p>
             <a:fld id="{7D7C4AF0-9CED-4FDF-85FB-19D355664334}" type="slidenum">
               <a:rPr lang="en-IN" smtClean="0"/>
+              <a:pPr/>
               <a:t>‹#›</a:t>
             </a:fld>
             <a:endParaRPr lang="en-IN"/>
@@ -8427,7 +8541,7 @@
     </p:spTree>
     <p:extLst>
       <p:ext uri="{BB962C8B-B14F-4D97-AF65-F5344CB8AC3E}">
-        <p14:creationId xmlns:p14="http://schemas.microsoft.com/office/powerpoint/2010/main" val="243106922"/>
+        <p14:creationId xmlns:p14="http://schemas.microsoft.com/office/powerpoint/2010/main" xmlns="" val="243106922"/>
       </p:ext>
     </p:extLst>
   </p:cSld>
@@ -8459,7 +8573,7 @@
           <p:cNvPr id="2" name="Title 1">
             <a:extLst>
               <a:ext uri="{FF2B5EF4-FFF2-40B4-BE49-F238E27FC236}">
-                <a16:creationId xmlns:a16="http://schemas.microsoft.com/office/drawing/2014/main" id="{F5BB2123-C986-5DBF-FEE5-FA8BD246C5E7}"/>
+                <a16:creationId xmlns:a16="http://schemas.microsoft.com/office/drawing/2014/main" xmlns="" id="{F5BB2123-C986-5DBF-FEE5-FA8BD246C5E7}"/>
               </a:ext>
             </a:extLst>
           </p:cNvPr>
@@ -8497,7 +8611,7 @@
           <p:cNvPr id="3" name="Content Placeholder 2">
             <a:extLst>
               <a:ext uri="{FF2B5EF4-FFF2-40B4-BE49-F238E27FC236}">
-                <a16:creationId xmlns:a16="http://schemas.microsoft.com/office/drawing/2014/main" id="{65B7C5D8-D67E-2393-2CF0-5ED855995809}"/>
+                <a16:creationId xmlns:a16="http://schemas.microsoft.com/office/drawing/2014/main" xmlns="" id="{65B7C5D8-D67E-2393-2CF0-5ED855995809}"/>
               </a:ext>
             </a:extLst>
           </p:cNvPr>
@@ -8588,7 +8702,7 @@
           <p:cNvPr id="4" name="Text Placeholder 3">
             <a:extLst>
               <a:ext uri="{FF2B5EF4-FFF2-40B4-BE49-F238E27FC236}">
-                <a16:creationId xmlns:a16="http://schemas.microsoft.com/office/drawing/2014/main" id="{24C9312E-B397-AFF3-7A91-18AD5EB50426}"/>
+                <a16:creationId xmlns:a16="http://schemas.microsoft.com/office/drawing/2014/main" xmlns="" id="{24C9312E-B397-AFF3-7A91-18AD5EB50426}"/>
               </a:ext>
             </a:extLst>
           </p:cNvPr>
@@ -8659,7 +8773,7 @@
           <p:cNvPr id="5" name="Date Placeholder 4">
             <a:extLst>
               <a:ext uri="{FF2B5EF4-FFF2-40B4-BE49-F238E27FC236}">
-                <a16:creationId xmlns:a16="http://schemas.microsoft.com/office/drawing/2014/main" id="{ACD7D54A-7734-B912-8F21-63F184CC5CE2}"/>
+                <a16:creationId xmlns:a16="http://schemas.microsoft.com/office/drawing/2014/main" xmlns="" id="{ACD7D54A-7734-B912-8F21-63F184CC5CE2}"/>
               </a:ext>
             </a:extLst>
           </p:cNvPr>
@@ -8677,6 +8791,7 @@
           <a:p>
             <a:fld id="{454AC2A5-0FEF-48B7-BFA1-2A7660A2FE01}" type="datetimeFigureOut">
               <a:rPr lang="en-IN" smtClean="0"/>
+              <a:pPr/>
               <a:t>22-06-2025</a:t>
             </a:fld>
             <a:endParaRPr lang="en-IN"/>
@@ -8688,7 +8803,7 @@
           <p:cNvPr id="6" name="Footer Placeholder 5">
             <a:extLst>
               <a:ext uri="{FF2B5EF4-FFF2-40B4-BE49-F238E27FC236}">
-                <a16:creationId xmlns:a16="http://schemas.microsoft.com/office/drawing/2014/main" id="{844F3681-6C49-E952-B9E9-96E6FCB5B3A2}"/>
+                <a16:creationId xmlns:a16="http://schemas.microsoft.com/office/drawing/2014/main" xmlns="" id="{844F3681-6C49-E952-B9E9-96E6FCB5B3A2}"/>
               </a:ext>
             </a:extLst>
           </p:cNvPr>
@@ -8713,7 +8828,7 @@
           <p:cNvPr id="7" name="Slide Number Placeholder 6">
             <a:extLst>
               <a:ext uri="{FF2B5EF4-FFF2-40B4-BE49-F238E27FC236}">
-                <a16:creationId xmlns:a16="http://schemas.microsoft.com/office/drawing/2014/main" id="{A2D71DA9-599F-A998-31D6-5F9BADDD4E46}"/>
+                <a16:creationId xmlns:a16="http://schemas.microsoft.com/office/drawing/2014/main" xmlns="" id="{A2D71DA9-599F-A998-31D6-5F9BADDD4E46}"/>
               </a:ext>
             </a:extLst>
           </p:cNvPr>
@@ -8731,6 +8846,7 @@
           <a:p>
             <a:fld id="{7D7C4AF0-9CED-4FDF-85FB-19D355664334}" type="slidenum">
               <a:rPr lang="en-IN" smtClean="0"/>
+              <a:pPr/>
               <a:t>‹#›</a:t>
             </a:fld>
             <a:endParaRPr lang="en-IN"/>
@@ -8740,7 +8856,7 @@
     </p:spTree>
     <p:extLst>
       <p:ext uri="{BB962C8B-B14F-4D97-AF65-F5344CB8AC3E}">
-        <p14:creationId xmlns:p14="http://schemas.microsoft.com/office/powerpoint/2010/main" val="1038535071"/>
+        <p14:creationId xmlns:p14="http://schemas.microsoft.com/office/powerpoint/2010/main" xmlns="" val="1038535071"/>
       </p:ext>
     </p:extLst>
   </p:cSld>
@@ -8772,7 +8888,7 @@
           <p:cNvPr id="2" name="Title 1">
             <a:extLst>
               <a:ext uri="{FF2B5EF4-FFF2-40B4-BE49-F238E27FC236}">
-                <a16:creationId xmlns:a16="http://schemas.microsoft.com/office/drawing/2014/main" id="{3D819642-B767-3342-3E59-D3400734AB79}"/>
+                <a16:creationId xmlns:a16="http://schemas.microsoft.com/office/drawing/2014/main" xmlns="" id="{3D819642-B767-3342-3E59-D3400734AB79}"/>
               </a:ext>
             </a:extLst>
           </p:cNvPr>
@@ -8810,7 +8926,7 @@
           <p:cNvPr id="3" name="Picture Placeholder 2">
             <a:extLst>
               <a:ext uri="{FF2B5EF4-FFF2-40B4-BE49-F238E27FC236}">
-                <a16:creationId xmlns:a16="http://schemas.microsoft.com/office/drawing/2014/main" id="{5643077C-90CB-9B24-9ECD-E8D233DC4185}"/>
+                <a16:creationId xmlns:a16="http://schemas.microsoft.com/office/drawing/2014/main" xmlns="" id="{5643077C-90CB-9B24-9ECD-E8D233DC4185}"/>
               </a:ext>
             </a:extLst>
           </p:cNvPr>
@@ -8877,7 +8993,7 @@
           <p:cNvPr id="4" name="Text Placeholder 3">
             <a:extLst>
               <a:ext uri="{FF2B5EF4-FFF2-40B4-BE49-F238E27FC236}">
-                <a16:creationId xmlns:a16="http://schemas.microsoft.com/office/drawing/2014/main" id="{4A80B823-97E3-E3B4-7083-0EF0695FA9B3}"/>
+                <a16:creationId xmlns:a16="http://schemas.microsoft.com/office/drawing/2014/main" xmlns="" id="{4A80B823-97E3-E3B4-7083-0EF0695FA9B3}"/>
               </a:ext>
             </a:extLst>
           </p:cNvPr>
@@ -8948,7 +9064,7 @@
           <p:cNvPr id="5" name="Date Placeholder 4">
             <a:extLst>
               <a:ext uri="{FF2B5EF4-FFF2-40B4-BE49-F238E27FC236}">
-                <a16:creationId xmlns:a16="http://schemas.microsoft.com/office/drawing/2014/main" id="{264D1DF3-F6DD-621F-61E7-D926DE8D3B25}"/>
+                <a16:creationId xmlns:a16="http://schemas.microsoft.com/office/drawing/2014/main" xmlns="" id="{264D1DF3-F6DD-621F-61E7-D926DE8D3B25}"/>
               </a:ext>
             </a:extLst>
           </p:cNvPr>
@@ -8966,6 +9082,7 @@
           <a:p>
             <a:fld id="{454AC2A5-0FEF-48B7-BFA1-2A7660A2FE01}" type="datetimeFigureOut">
               <a:rPr lang="en-IN" smtClean="0"/>
+              <a:pPr/>
               <a:t>22-06-2025</a:t>
             </a:fld>
             <a:endParaRPr lang="en-IN"/>
@@ -8977,7 +9094,7 @@
           <p:cNvPr id="6" name="Footer Placeholder 5">
             <a:extLst>
               <a:ext uri="{FF2B5EF4-FFF2-40B4-BE49-F238E27FC236}">
-                <a16:creationId xmlns:a16="http://schemas.microsoft.com/office/drawing/2014/main" id="{C6795959-6240-6A05-3333-9F9078C92957}"/>
+                <a16:creationId xmlns:a16="http://schemas.microsoft.com/office/drawing/2014/main" xmlns="" id="{C6795959-6240-6A05-3333-9F9078C92957}"/>
               </a:ext>
             </a:extLst>
           </p:cNvPr>
@@ -9002,7 +9119,7 @@
           <p:cNvPr id="7" name="Slide Number Placeholder 6">
             <a:extLst>
               <a:ext uri="{FF2B5EF4-FFF2-40B4-BE49-F238E27FC236}">
-                <a16:creationId xmlns:a16="http://schemas.microsoft.com/office/drawing/2014/main" id="{DF28A4B6-70FE-7256-5B9C-89B1B5E7A7D5}"/>
+                <a16:creationId xmlns:a16="http://schemas.microsoft.com/office/drawing/2014/main" xmlns="" id="{DF28A4B6-70FE-7256-5B9C-89B1B5E7A7D5}"/>
               </a:ext>
             </a:extLst>
           </p:cNvPr>
@@ -9020,6 +9137,7 @@
           <a:p>
             <a:fld id="{7D7C4AF0-9CED-4FDF-85FB-19D355664334}" type="slidenum">
               <a:rPr lang="en-IN" smtClean="0"/>
+              <a:pPr/>
               <a:t>‹#›</a:t>
             </a:fld>
             <a:endParaRPr lang="en-IN"/>
@@ -9029,7 +9147,7 @@
     </p:spTree>
     <p:extLst>
       <p:ext uri="{BB962C8B-B14F-4D97-AF65-F5344CB8AC3E}">
-        <p14:creationId xmlns:p14="http://schemas.microsoft.com/office/powerpoint/2010/main" val="2901619847"/>
+        <p14:creationId xmlns:p14="http://schemas.microsoft.com/office/powerpoint/2010/main" xmlns="" val="2901619847"/>
       </p:ext>
     </p:extLst>
   </p:cSld>
@@ -9066,7 +9184,7 @@
           <p:cNvPr id="2" name="Title Placeholder 1">
             <a:extLst>
               <a:ext uri="{FF2B5EF4-FFF2-40B4-BE49-F238E27FC236}">
-                <a16:creationId xmlns:a16="http://schemas.microsoft.com/office/drawing/2014/main" id="{1E7D331C-2F6A-AE16-B877-1069E5A47C87}"/>
+                <a16:creationId xmlns:a16="http://schemas.microsoft.com/office/drawing/2014/main" xmlns="" id="{1E7D331C-2F6A-AE16-B877-1069E5A47C87}"/>
               </a:ext>
             </a:extLst>
           </p:cNvPr>
@@ -9105,7 +9223,7 @@
           <p:cNvPr id="3" name="Text Placeholder 2">
             <a:extLst>
               <a:ext uri="{FF2B5EF4-FFF2-40B4-BE49-F238E27FC236}">
-                <a16:creationId xmlns:a16="http://schemas.microsoft.com/office/drawing/2014/main" id="{CFD17CCB-9832-AD4C-86BB-30995AFDF89F}"/>
+                <a16:creationId xmlns:a16="http://schemas.microsoft.com/office/drawing/2014/main" xmlns="" id="{CFD17CCB-9832-AD4C-86BB-30995AFDF89F}"/>
               </a:ext>
             </a:extLst>
           </p:cNvPr>
@@ -9173,7 +9291,7 @@
           <p:cNvPr id="4" name="Date Placeholder 3">
             <a:extLst>
               <a:ext uri="{FF2B5EF4-FFF2-40B4-BE49-F238E27FC236}">
-                <a16:creationId xmlns:a16="http://schemas.microsoft.com/office/drawing/2014/main" id="{AFD9825B-6CF7-102D-4E85-6F2F700BB894}"/>
+                <a16:creationId xmlns:a16="http://schemas.microsoft.com/office/drawing/2014/main" xmlns="" id="{AFD9825B-6CF7-102D-4E85-6F2F700BB894}"/>
               </a:ext>
             </a:extLst>
           </p:cNvPr>
@@ -9209,6 +9327,7 @@
           <a:p>
             <a:fld id="{454AC2A5-0FEF-48B7-BFA1-2A7660A2FE01}" type="datetimeFigureOut">
               <a:rPr lang="en-IN" smtClean="0"/>
+              <a:pPr/>
               <a:t>22-06-2025</a:t>
             </a:fld>
             <a:endParaRPr lang="en-IN"/>
@@ -9220,7 +9339,7 @@
           <p:cNvPr id="5" name="Footer Placeholder 4">
             <a:extLst>
               <a:ext uri="{FF2B5EF4-FFF2-40B4-BE49-F238E27FC236}">
-                <a16:creationId xmlns:a16="http://schemas.microsoft.com/office/drawing/2014/main" id="{060FBBBB-C8BD-71B4-0127-C24F18E03D0C}"/>
+                <a16:creationId xmlns:a16="http://schemas.microsoft.com/office/drawing/2014/main" xmlns="" id="{060FBBBB-C8BD-71B4-0127-C24F18E03D0C}"/>
               </a:ext>
             </a:extLst>
           </p:cNvPr>
@@ -9263,7 +9382,7 @@
           <p:cNvPr id="6" name="Slide Number Placeholder 5">
             <a:extLst>
               <a:ext uri="{FF2B5EF4-FFF2-40B4-BE49-F238E27FC236}">
-                <a16:creationId xmlns:a16="http://schemas.microsoft.com/office/drawing/2014/main" id="{976F9CD9-21DA-E4A6-CE23-1051AC3E045C}"/>
+                <a16:creationId xmlns:a16="http://schemas.microsoft.com/office/drawing/2014/main" xmlns="" id="{976F9CD9-21DA-E4A6-CE23-1051AC3E045C}"/>
               </a:ext>
             </a:extLst>
           </p:cNvPr>
@@ -9299,6 +9418,7 @@
           <a:p>
             <a:fld id="{7D7C4AF0-9CED-4FDF-85FB-19D355664334}" type="slidenum">
               <a:rPr lang="en-IN" smtClean="0"/>
+              <a:pPr/>
               <a:t>‹#›</a:t>
             </a:fld>
             <a:endParaRPr lang="en-IN"/>
@@ -9308,7 +9428,7 @@
     </p:spTree>
     <p:extLst>
       <p:ext uri="{BB962C8B-B14F-4D97-AF65-F5344CB8AC3E}">
-        <p14:creationId xmlns:p14="http://schemas.microsoft.com/office/powerpoint/2010/main" val="1942460793"/>
+        <p14:creationId xmlns:p14="http://schemas.microsoft.com/office/powerpoint/2010/main" xmlns="" val="1942460793"/>
       </p:ext>
     </p:extLst>
   </p:cSld>
@@ -9631,7 +9751,7 @@
           <p:cNvPr id="2" name="Title 1">
             <a:extLst>
               <a:ext uri="{FF2B5EF4-FFF2-40B4-BE49-F238E27FC236}">
-                <a16:creationId xmlns:a16="http://schemas.microsoft.com/office/drawing/2014/main" id="{BFB7B9A5-8349-DFAD-7B2F-67528A27D490}"/>
+                <a16:creationId xmlns:a16="http://schemas.microsoft.com/office/drawing/2014/main" xmlns="" id="{BFB7B9A5-8349-DFAD-7B2F-67528A27D490}"/>
               </a:ext>
             </a:extLst>
           </p:cNvPr>
@@ -9668,7 +9788,7 @@
           <p:cNvPr id="3" name="Subtitle 2">
             <a:extLst>
               <a:ext uri="{FF2B5EF4-FFF2-40B4-BE49-F238E27FC236}">
-                <a16:creationId xmlns:a16="http://schemas.microsoft.com/office/drawing/2014/main" id="{1E8E0BE6-8868-24A0-03EA-395A791EF727}"/>
+                <a16:creationId xmlns:a16="http://schemas.microsoft.com/office/drawing/2014/main" xmlns="" id="{1E8E0BE6-8868-24A0-03EA-395A791EF727}"/>
               </a:ext>
             </a:extLst>
           </p:cNvPr>
@@ -9737,13 +9857,20 @@
     </p:spTree>
     <p:extLst>
       <p:ext uri="{BB962C8B-B14F-4D97-AF65-F5344CB8AC3E}">
-        <p14:creationId xmlns:p14="http://schemas.microsoft.com/office/powerpoint/2010/main" val="514556088"/>
+        <p14:creationId xmlns:p14="http://schemas.microsoft.com/office/powerpoint/2010/main" xmlns="" val="514556088"/>
       </p:ext>
     </p:extLst>
   </p:cSld>
   <p:clrMapOvr>
     <a:masterClrMapping/>
   </p:clrMapOvr>
+  <p:timing>
+    <p:tnLst>
+      <p:par>
+        <p:cTn id="1" dur="indefinite" restart="never" nodeType="tmRoot"/>
+      </p:par>
+    </p:tnLst>
+  </p:timing>
 </p:sld>
 </file>
 
@@ -9777,10 +9904,10 @@
           <p:cNvPr id="8" name="Rectangle 7">
             <a:extLst>
               <a:ext uri="{FF2B5EF4-FFF2-40B4-BE49-F238E27FC236}">
-                <a16:creationId xmlns:a16="http://schemas.microsoft.com/office/drawing/2014/main" id="{DAF1966E-FD40-4A4A-B61B-C4DF7FA05F06}"/>
+                <a16:creationId xmlns:a16="http://schemas.microsoft.com/office/drawing/2014/main" xmlns="" id="{DAF1966E-FD40-4A4A-B61B-C4DF7FA05F06}"/>
               </a:ext>
               <a:ext uri="{C183D7F6-B498-43B3-948B-1728B52AA6E4}">
-                <adec:decorative xmlns:adec="http://schemas.microsoft.com/office/drawing/2017/decorative" val="1"/>
+                <adec:decorative xmlns:adec="http://schemas.microsoft.com/office/drawing/2017/decorative" xmlns="" val="1"/>
               </a:ext>
             </a:extLst>
           </p:cNvPr>
@@ -9790,7 +9917,7 @@
           <p:nvPr>
             <p:extLst>
               <p:ext uri="{386F3935-93C4-4BCD-93E2-E3B085C9AB24}">
-                <p16:designElem xmlns:p16="http://schemas.microsoft.com/office/powerpoint/2015/main" val="1"/>
+                <p16:designElem xmlns:p16="http://schemas.microsoft.com/office/powerpoint/2015/main" xmlns="" val="1"/>
               </p:ext>
             </p:extLst>
           </p:nvPr>
@@ -9837,10 +9964,10 @@
           <p:cNvPr id="10" name="Rectangle 9">
             <a:extLst>
               <a:ext uri="{FF2B5EF4-FFF2-40B4-BE49-F238E27FC236}">
-                <a16:creationId xmlns:a16="http://schemas.microsoft.com/office/drawing/2014/main" id="{047BFA19-D45E-416B-A404-7AF2F3F27017}"/>
+                <a16:creationId xmlns:a16="http://schemas.microsoft.com/office/drawing/2014/main" xmlns="" id="{047BFA19-D45E-416B-A404-7AF2F3F27017}"/>
               </a:ext>
               <a:ext uri="{C183D7F6-B498-43B3-948B-1728B52AA6E4}">
-                <adec:decorative xmlns:adec="http://schemas.microsoft.com/office/drawing/2017/decorative" val="1"/>
+                <adec:decorative xmlns:adec="http://schemas.microsoft.com/office/drawing/2017/decorative" xmlns="" val="1"/>
               </a:ext>
             </a:extLst>
           </p:cNvPr>
@@ -9850,7 +9977,7 @@
           <p:nvPr>
             <p:extLst>
               <p:ext uri="{386F3935-93C4-4BCD-93E2-E3B085C9AB24}">
-                <p16:designElem xmlns:p16="http://schemas.microsoft.com/office/powerpoint/2015/main" val="1"/>
+                <p16:designElem xmlns:p16="http://schemas.microsoft.com/office/powerpoint/2015/main" xmlns="" val="1"/>
               </p:ext>
             </p:extLst>
           </p:nvPr>
@@ -9936,10 +10063,10 @@
           <p:cNvPr id="12" name="Rectangle 11">
             <a:extLst>
               <a:ext uri="{FF2B5EF4-FFF2-40B4-BE49-F238E27FC236}">
-                <a16:creationId xmlns:a16="http://schemas.microsoft.com/office/drawing/2014/main" id="{8E0105E7-23DB-4CF2-8258-FF47C7620F6E}"/>
+                <a16:creationId xmlns:a16="http://schemas.microsoft.com/office/drawing/2014/main" xmlns="" id="{8E0105E7-23DB-4CF2-8258-FF47C7620F6E}"/>
               </a:ext>
               <a:ext uri="{C183D7F6-B498-43B3-948B-1728B52AA6E4}">
-                <adec:decorative xmlns:adec="http://schemas.microsoft.com/office/drawing/2017/decorative" val="1"/>
+                <adec:decorative xmlns:adec="http://schemas.microsoft.com/office/drawing/2017/decorative" xmlns="" val="1"/>
               </a:ext>
             </a:extLst>
           </p:cNvPr>
@@ -9949,7 +10076,7 @@
           <p:nvPr>
             <p:extLst>
               <p:ext uri="{386F3935-93C4-4BCD-93E2-E3B085C9AB24}">
-                <p16:designElem xmlns:p16="http://schemas.microsoft.com/office/powerpoint/2015/main" val="1"/>
+                <p16:designElem xmlns:p16="http://schemas.microsoft.com/office/powerpoint/2015/main" xmlns="" val="1"/>
               </p:ext>
             </p:extLst>
           </p:nvPr>
@@ -10026,7 +10153,7 @@
           <p:cNvPr id="2" name="Title 1">
             <a:extLst>
               <a:ext uri="{FF2B5EF4-FFF2-40B4-BE49-F238E27FC236}">
-                <a16:creationId xmlns:a16="http://schemas.microsoft.com/office/drawing/2014/main" id="{B77D2E15-C43B-2111-40F3-20245C5424D5}"/>
+                <a16:creationId xmlns:a16="http://schemas.microsoft.com/office/drawing/2014/main" xmlns="" id="{B77D2E15-C43B-2111-40F3-20245C5424D5}"/>
               </a:ext>
             </a:extLst>
           </p:cNvPr>
@@ -10067,10 +10194,10 @@
           <p:cNvPr id="14" name="Rectangle 13">
             <a:extLst>
               <a:ext uri="{FF2B5EF4-FFF2-40B4-BE49-F238E27FC236}">
-                <a16:creationId xmlns:a16="http://schemas.microsoft.com/office/drawing/2014/main" id="{074B4F7D-14B2-478B-8BF5-01E4E0C5D263}"/>
+                <a16:creationId xmlns:a16="http://schemas.microsoft.com/office/drawing/2014/main" xmlns="" id="{074B4F7D-14B2-478B-8BF5-01E4E0C5D263}"/>
               </a:ext>
               <a:ext uri="{C183D7F6-B498-43B3-948B-1728B52AA6E4}">
-                <adec:decorative xmlns:adec="http://schemas.microsoft.com/office/drawing/2017/decorative" val="1"/>
+                <adec:decorative xmlns:adec="http://schemas.microsoft.com/office/drawing/2017/decorative" xmlns="" val="1"/>
               </a:ext>
             </a:extLst>
           </p:cNvPr>
@@ -10080,7 +10207,7 @@
           <p:nvPr>
             <p:extLst>
               <p:ext uri="{386F3935-93C4-4BCD-93E2-E3B085C9AB24}">
-                <p16:designElem xmlns:p16="http://schemas.microsoft.com/office/powerpoint/2015/main" val="1"/>
+                <p16:designElem xmlns:p16="http://schemas.microsoft.com/office/powerpoint/2015/main" xmlns="" val="1"/>
               </p:ext>
             </p:extLst>
           </p:nvPr>
@@ -10135,7 +10262,7 @@
           <p:cNvPr id="3" name="Content Placeholder 2">
             <a:extLst>
               <a:ext uri="{FF2B5EF4-FFF2-40B4-BE49-F238E27FC236}">
-                <a16:creationId xmlns:a16="http://schemas.microsoft.com/office/drawing/2014/main" id="{5FA45F77-47F5-EBA2-F775-D9A0E304B8BF}"/>
+                <a16:creationId xmlns:a16="http://schemas.microsoft.com/office/drawing/2014/main" xmlns="" id="{5FA45F77-47F5-EBA2-F775-D9A0E304B8BF}"/>
               </a:ext>
             </a:extLst>
           </p:cNvPr>
@@ -10195,13 +10322,20 @@
     </p:spTree>
     <p:extLst>
       <p:ext uri="{BB962C8B-B14F-4D97-AF65-F5344CB8AC3E}">
-        <p14:creationId xmlns:p14="http://schemas.microsoft.com/office/powerpoint/2010/main" val="3007343472"/>
+        <p14:creationId xmlns:p14="http://schemas.microsoft.com/office/powerpoint/2010/main" xmlns="" val="3007343472"/>
       </p:ext>
     </p:extLst>
   </p:cSld>
   <p:clrMapOvr>
     <a:masterClrMapping/>
   </p:clrMapOvr>
+  <p:timing>
+    <p:tnLst>
+      <p:par>
+        <p:cTn id="1" dur="indefinite" restart="never" nodeType="tmRoot"/>
+      </p:par>
+    </p:tnLst>
+  </p:timing>
 </p:sld>
 </file>
 
@@ -10235,10 +10369,10 @@
           <p:cNvPr id="8" name="Rectangle 7">
             <a:extLst>
               <a:ext uri="{FF2B5EF4-FFF2-40B4-BE49-F238E27FC236}">
-                <a16:creationId xmlns:a16="http://schemas.microsoft.com/office/drawing/2014/main" id="{DAF1966E-FD40-4A4A-B61B-C4DF7FA05F06}"/>
+                <a16:creationId xmlns:a16="http://schemas.microsoft.com/office/drawing/2014/main" xmlns="" id="{DAF1966E-FD40-4A4A-B61B-C4DF7FA05F06}"/>
               </a:ext>
               <a:ext uri="{C183D7F6-B498-43B3-948B-1728B52AA6E4}">
-                <adec:decorative xmlns:adec="http://schemas.microsoft.com/office/drawing/2017/decorative" val="1"/>
+                <adec:decorative xmlns:adec="http://schemas.microsoft.com/office/drawing/2017/decorative" xmlns="" val="1"/>
               </a:ext>
             </a:extLst>
           </p:cNvPr>
@@ -10248,7 +10382,7 @@
           <p:nvPr>
             <p:extLst>
               <p:ext uri="{386F3935-93C4-4BCD-93E2-E3B085C9AB24}">
-                <p16:designElem xmlns:p16="http://schemas.microsoft.com/office/powerpoint/2015/main" val="1"/>
+                <p16:designElem xmlns:p16="http://schemas.microsoft.com/office/powerpoint/2015/main" xmlns="" val="1"/>
               </p:ext>
             </p:extLst>
           </p:nvPr>
@@ -10295,10 +10429,10 @@
           <p:cNvPr id="10" name="Rectangle 9">
             <a:extLst>
               <a:ext uri="{FF2B5EF4-FFF2-40B4-BE49-F238E27FC236}">
-                <a16:creationId xmlns:a16="http://schemas.microsoft.com/office/drawing/2014/main" id="{047BFA19-D45E-416B-A404-7AF2F3F27017}"/>
+                <a16:creationId xmlns:a16="http://schemas.microsoft.com/office/drawing/2014/main" xmlns="" id="{047BFA19-D45E-416B-A404-7AF2F3F27017}"/>
               </a:ext>
               <a:ext uri="{C183D7F6-B498-43B3-948B-1728B52AA6E4}">
-                <adec:decorative xmlns:adec="http://schemas.microsoft.com/office/drawing/2017/decorative" val="1"/>
+                <adec:decorative xmlns:adec="http://schemas.microsoft.com/office/drawing/2017/decorative" xmlns="" val="1"/>
               </a:ext>
             </a:extLst>
           </p:cNvPr>
@@ -10308,7 +10442,7 @@
           <p:nvPr>
             <p:extLst>
               <p:ext uri="{386F3935-93C4-4BCD-93E2-E3B085C9AB24}">
-                <p16:designElem xmlns:p16="http://schemas.microsoft.com/office/powerpoint/2015/main" val="1"/>
+                <p16:designElem xmlns:p16="http://schemas.microsoft.com/office/powerpoint/2015/main" xmlns="" val="1"/>
               </p:ext>
             </p:extLst>
           </p:nvPr>
@@ -10394,10 +10528,10 @@
           <p:cNvPr id="12" name="Rectangle 11">
             <a:extLst>
               <a:ext uri="{FF2B5EF4-FFF2-40B4-BE49-F238E27FC236}">
-                <a16:creationId xmlns:a16="http://schemas.microsoft.com/office/drawing/2014/main" id="{8E0105E7-23DB-4CF2-8258-FF47C7620F6E}"/>
+                <a16:creationId xmlns:a16="http://schemas.microsoft.com/office/drawing/2014/main" xmlns="" id="{8E0105E7-23DB-4CF2-8258-FF47C7620F6E}"/>
               </a:ext>
               <a:ext uri="{C183D7F6-B498-43B3-948B-1728B52AA6E4}">
-                <adec:decorative xmlns:adec="http://schemas.microsoft.com/office/drawing/2017/decorative" val="1"/>
+                <adec:decorative xmlns:adec="http://schemas.microsoft.com/office/drawing/2017/decorative" xmlns="" val="1"/>
               </a:ext>
             </a:extLst>
           </p:cNvPr>
@@ -10407,7 +10541,7 @@
           <p:nvPr>
             <p:extLst>
               <p:ext uri="{386F3935-93C4-4BCD-93E2-E3B085C9AB24}">
-                <p16:designElem xmlns:p16="http://schemas.microsoft.com/office/powerpoint/2015/main" val="1"/>
+                <p16:designElem xmlns:p16="http://schemas.microsoft.com/office/powerpoint/2015/main" xmlns="" val="1"/>
               </p:ext>
             </p:extLst>
           </p:nvPr>
@@ -10484,7 +10618,7 @@
           <p:cNvPr id="2" name="Title 1">
             <a:extLst>
               <a:ext uri="{FF2B5EF4-FFF2-40B4-BE49-F238E27FC236}">
-                <a16:creationId xmlns:a16="http://schemas.microsoft.com/office/drawing/2014/main" id="{749D7823-97FC-8920-7DDA-BD3D27ADAECF}"/>
+                <a16:creationId xmlns:a16="http://schemas.microsoft.com/office/drawing/2014/main" xmlns="" id="{749D7823-97FC-8920-7DDA-BD3D27ADAECF}"/>
               </a:ext>
             </a:extLst>
           </p:cNvPr>
@@ -10525,10 +10659,10 @@
           <p:cNvPr id="14" name="Rectangle 13">
             <a:extLst>
               <a:ext uri="{FF2B5EF4-FFF2-40B4-BE49-F238E27FC236}">
-                <a16:creationId xmlns:a16="http://schemas.microsoft.com/office/drawing/2014/main" id="{074B4F7D-14B2-478B-8BF5-01E4E0C5D263}"/>
+                <a16:creationId xmlns:a16="http://schemas.microsoft.com/office/drawing/2014/main" xmlns="" id="{074B4F7D-14B2-478B-8BF5-01E4E0C5D263}"/>
               </a:ext>
               <a:ext uri="{C183D7F6-B498-43B3-948B-1728B52AA6E4}">
-                <adec:decorative xmlns:adec="http://schemas.microsoft.com/office/drawing/2017/decorative" val="1"/>
+                <adec:decorative xmlns:adec="http://schemas.microsoft.com/office/drawing/2017/decorative" xmlns="" val="1"/>
               </a:ext>
             </a:extLst>
           </p:cNvPr>
@@ -10538,7 +10672,7 @@
           <p:nvPr>
             <p:extLst>
               <p:ext uri="{386F3935-93C4-4BCD-93E2-E3B085C9AB24}">
-                <p16:designElem xmlns:p16="http://schemas.microsoft.com/office/powerpoint/2015/main" val="1"/>
+                <p16:designElem xmlns:p16="http://schemas.microsoft.com/office/powerpoint/2015/main" xmlns="" val="1"/>
               </p:ext>
             </p:extLst>
           </p:nvPr>
@@ -10593,7 +10727,7 @@
           <p:cNvPr id="3" name="Content Placeholder 2">
             <a:extLst>
               <a:ext uri="{FF2B5EF4-FFF2-40B4-BE49-F238E27FC236}">
-                <a16:creationId xmlns:a16="http://schemas.microsoft.com/office/drawing/2014/main" id="{ED59776D-AACA-8866-C9E3-FAB6A1362E17}"/>
+                <a16:creationId xmlns:a16="http://schemas.microsoft.com/office/drawing/2014/main" xmlns="" id="{ED59776D-AACA-8866-C9E3-FAB6A1362E17}"/>
               </a:ext>
             </a:extLst>
           </p:cNvPr>
@@ -10612,7 +10746,7 @@
         </p:spPr>
         <p:txBody>
           <a:bodyPr>
-            <a:normAutofit/>
+            <a:normAutofit lnSpcReduction="10000"/>
           </a:bodyPr>
           <a:lstStyle/>
           <a:p>
@@ -10663,13 +10797,20 @@
     </p:spTree>
     <p:extLst>
       <p:ext uri="{BB962C8B-B14F-4D97-AF65-F5344CB8AC3E}">
-        <p14:creationId xmlns:p14="http://schemas.microsoft.com/office/powerpoint/2010/main" val="843491970"/>
+        <p14:creationId xmlns:p14="http://schemas.microsoft.com/office/powerpoint/2010/main" xmlns="" val="843491970"/>
       </p:ext>
     </p:extLst>
   </p:cSld>
   <p:clrMapOvr>
     <a:masterClrMapping/>
   </p:clrMapOvr>
+  <p:timing>
+    <p:tnLst>
+      <p:par>
+        <p:cTn id="1" dur="indefinite" restart="never" nodeType="tmRoot"/>
+      </p:par>
+    </p:tnLst>
+  </p:timing>
 </p:sld>
 </file>
 
@@ -10703,10 +10844,10 @@
           <p:cNvPr id="9" name="Rectangle 8">
             <a:extLst>
               <a:ext uri="{FF2B5EF4-FFF2-40B4-BE49-F238E27FC236}">
-                <a16:creationId xmlns:a16="http://schemas.microsoft.com/office/drawing/2014/main" id="{DAF1966E-FD40-4A4A-B61B-C4DF7FA05F06}"/>
+                <a16:creationId xmlns:a16="http://schemas.microsoft.com/office/drawing/2014/main" xmlns="" id="{DAF1966E-FD40-4A4A-B61B-C4DF7FA05F06}"/>
               </a:ext>
               <a:ext uri="{C183D7F6-B498-43B3-948B-1728B52AA6E4}">
-                <adec:decorative xmlns:adec="http://schemas.microsoft.com/office/drawing/2017/decorative" val="1"/>
+                <adec:decorative xmlns:adec="http://schemas.microsoft.com/office/drawing/2017/decorative" xmlns="" val="1"/>
               </a:ext>
             </a:extLst>
           </p:cNvPr>
@@ -10716,7 +10857,7 @@
           <p:nvPr>
             <p:extLst>
               <p:ext uri="{386F3935-93C4-4BCD-93E2-E3B085C9AB24}">
-                <p16:designElem xmlns:p16="http://schemas.microsoft.com/office/powerpoint/2015/main" val="1"/>
+                <p16:designElem xmlns:p16="http://schemas.microsoft.com/office/powerpoint/2015/main" xmlns="" val="1"/>
               </p:ext>
             </p:extLst>
           </p:nvPr>
@@ -10763,10 +10904,10 @@
           <p:cNvPr id="11" name="Rectangle 10">
             <a:extLst>
               <a:ext uri="{FF2B5EF4-FFF2-40B4-BE49-F238E27FC236}">
-                <a16:creationId xmlns:a16="http://schemas.microsoft.com/office/drawing/2014/main" id="{047BFA19-D45E-416B-A404-7AF2F3F27017}"/>
+                <a16:creationId xmlns:a16="http://schemas.microsoft.com/office/drawing/2014/main" xmlns="" id="{047BFA19-D45E-416B-A404-7AF2F3F27017}"/>
               </a:ext>
               <a:ext uri="{C183D7F6-B498-43B3-948B-1728B52AA6E4}">
-                <adec:decorative xmlns:adec="http://schemas.microsoft.com/office/drawing/2017/decorative" val="1"/>
+                <adec:decorative xmlns:adec="http://schemas.microsoft.com/office/drawing/2017/decorative" xmlns="" val="1"/>
               </a:ext>
             </a:extLst>
           </p:cNvPr>
@@ -10776,7 +10917,7 @@
           <p:nvPr>
             <p:extLst>
               <p:ext uri="{386F3935-93C4-4BCD-93E2-E3B085C9AB24}">
-                <p16:designElem xmlns:p16="http://schemas.microsoft.com/office/powerpoint/2015/main" val="1"/>
+                <p16:designElem xmlns:p16="http://schemas.microsoft.com/office/powerpoint/2015/main" xmlns="" val="1"/>
               </p:ext>
             </p:extLst>
           </p:nvPr>
@@ -10862,10 +11003,10 @@
           <p:cNvPr id="13" name="Rectangle 12">
             <a:extLst>
               <a:ext uri="{FF2B5EF4-FFF2-40B4-BE49-F238E27FC236}">
-                <a16:creationId xmlns:a16="http://schemas.microsoft.com/office/drawing/2014/main" id="{8E0105E7-23DB-4CF2-8258-FF47C7620F6E}"/>
+                <a16:creationId xmlns:a16="http://schemas.microsoft.com/office/drawing/2014/main" xmlns="" id="{8E0105E7-23DB-4CF2-8258-FF47C7620F6E}"/>
               </a:ext>
               <a:ext uri="{C183D7F6-B498-43B3-948B-1728B52AA6E4}">
-                <adec:decorative xmlns:adec="http://schemas.microsoft.com/office/drawing/2017/decorative" val="1"/>
+                <adec:decorative xmlns:adec="http://schemas.microsoft.com/office/drawing/2017/decorative" xmlns="" val="1"/>
               </a:ext>
             </a:extLst>
           </p:cNvPr>
@@ -10875,7 +11016,7 @@
           <p:nvPr>
             <p:extLst>
               <p:ext uri="{386F3935-93C4-4BCD-93E2-E3B085C9AB24}">
-                <p16:designElem xmlns:p16="http://schemas.microsoft.com/office/powerpoint/2015/main" val="1"/>
+                <p16:designElem xmlns:p16="http://schemas.microsoft.com/office/powerpoint/2015/main" xmlns="" val="1"/>
               </p:ext>
             </p:extLst>
           </p:nvPr>
@@ -10952,7 +11093,7 @@
           <p:cNvPr id="4" name="Title 1">
             <a:extLst>
               <a:ext uri="{FF2B5EF4-FFF2-40B4-BE49-F238E27FC236}">
-                <a16:creationId xmlns:a16="http://schemas.microsoft.com/office/drawing/2014/main" id="{9B396CF3-B86A-D5A7-480C-14B2FF78000E}"/>
+                <a16:creationId xmlns:a16="http://schemas.microsoft.com/office/drawing/2014/main" xmlns="" id="{9B396CF3-B86A-D5A7-480C-14B2FF78000E}"/>
               </a:ext>
             </a:extLst>
           </p:cNvPr>
@@ -10989,10 +11130,10 @@
           <p:cNvPr id="15" name="Rectangle 14">
             <a:extLst>
               <a:ext uri="{FF2B5EF4-FFF2-40B4-BE49-F238E27FC236}">
-                <a16:creationId xmlns:a16="http://schemas.microsoft.com/office/drawing/2014/main" id="{074B4F7D-14B2-478B-8BF5-01E4E0C5D263}"/>
+                <a16:creationId xmlns:a16="http://schemas.microsoft.com/office/drawing/2014/main" xmlns="" id="{074B4F7D-14B2-478B-8BF5-01E4E0C5D263}"/>
               </a:ext>
               <a:ext uri="{C183D7F6-B498-43B3-948B-1728B52AA6E4}">
-                <adec:decorative xmlns:adec="http://schemas.microsoft.com/office/drawing/2017/decorative" val="1"/>
+                <adec:decorative xmlns:adec="http://schemas.microsoft.com/office/drawing/2017/decorative" xmlns="" val="1"/>
               </a:ext>
             </a:extLst>
           </p:cNvPr>
@@ -11002,7 +11143,7 @@
           <p:nvPr>
             <p:extLst>
               <p:ext uri="{386F3935-93C4-4BCD-93E2-E3B085C9AB24}">
-                <p16:designElem xmlns:p16="http://schemas.microsoft.com/office/powerpoint/2015/main" val="1"/>
+                <p16:designElem xmlns:p16="http://schemas.microsoft.com/office/powerpoint/2015/main" xmlns="" val="1"/>
               </p:ext>
             </p:extLst>
           </p:nvPr>
@@ -11057,7 +11198,7 @@
           <p:cNvPr id="3" name="Content Placeholder 2">
             <a:extLst>
               <a:ext uri="{FF2B5EF4-FFF2-40B4-BE49-F238E27FC236}">
-                <a16:creationId xmlns:a16="http://schemas.microsoft.com/office/drawing/2014/main" id="{FB7812A8-CC48-92E4-BF0D-422E4A0B0A1F}"/>
+                <a16:creationId xmlns:a16="http://schemas.microsoft.com/office/drawing/2014/main" xmlns="" id="{FB7812A8-CC48-92E4-BF0D-422E4A0B0A1F}"/>
               </a:ext>
             </a:extLst>
           </p:cNvPr>
@@ -11165,13 +11306,20 @@
     </p:spTree>
     <p:extLst>
       <p:ext uri="{BB962C8B-B14F-4D97-AF65-F5344CB8AC3E}">
-        <p14:creationId xmlns:p14="http://schemas.microsoft.com/office/powerpoint/2010/main" val="518961496"/>
+        <p14:creationId xmlns:p14="http://schemas.microsoft.com/office/powerpoint/2010/main" xmlns="" val="518961496"/>
       </p:ext>
     </p:extLst>
   </p:cSld>
   <p:clrMapOvr>
     <a:masterClrMapping/>
   </p:clrMapOvr>
+  <p:timing>
+    <p:tnLst>
+      <p:par>
+        <p:cTn id="1" dur="indefinite" restart="never" nodeType="tmRoot"/>
+      </p:par>
+    </p:tnLst>
+  </p:timing>
 </p:sld>
 </file>
 
@@ -11205,10 +11353,10 @@
           <p:cNvPr id="8" name="Rectangle 7">
             <a:extLst>
               <a:ext uri="{FF2B5EF4-FFF2-40B4-BE49-F238E27FC236}">
-                <a16:creationId xmlns:a16="http://schemas.microsoft.com/office/drawing/2014/main" id="{DAF1966E-FD40-4A4A-B61B-C4DF7FA05F06}"/>
+                <a16:creationId xmlns:a16="http://schemas.microsoft.com/office/drawing/2014/main" xmlns="" id="{DAF1966E-FD40-4A4A-B61B-C4DF7FA05F06}"/>
               </a:ext>
               <a:ext uri="{C183D7F6-B498-43B3-948B-1728B52AA6E4}">
-                <adec:decorative xmlns:adec="http://schemas.microsoft.com/office/drawing/2017/decorative" val="1"/>
+                <adec:decorative xmlns:adec="http://schemas.microsoft.com/office/drawing/2017/decorative" xmlns="" val="1"/>
               </a:ext>
             </a:extLst>
           </p:cNvPr>
@@ -11218,7 +11366,7 @@
           <p:nvPr>
             <p:extLst>
               <p:ext uri="{386F3935-93C4-4BCD-93E2-E3B085C9AB24}">
-                <p16:designElem xmlns:p16="http://schemas.microsoft.com/office/powerpoint/2015/main" val="1"/>
+                <p16:designElem xmlns:p16="http://schemas.microsoft.com/office/powerpoint/2015/main" xmlns="" val="1"/>
               </p:ext>
             </p:extLst>
           </p:nvPr>
@@ -11265,10 +11413,10 @@
           <p:cNvPr id="10" name="Rectangle 9">
             <a:extLst>
               <a:ext uri="{FF2B5EF4-FFF2-40B4-BE49-F238E27FC236}">
-                <a16:creationId xmlns:a16="http://schemas.microsoft.com/office/drawing/2014/main" id="{047BFA19-D45E-416B-A404-7AF2F3F27017}"/>
+                <a16:creationId xmlns:a16="http://schemas.microsoft.com/office/drawing/2014/main" xmlns="" id="{047BFA19-D45E-416B-A404-7AF2F3F27017}"/>
               </a:ext>
               <a:ext uri="{C183D7F6-B498-43B3-948B-1728B52AA6E4}">
-                <adec:decorative xmlns:adec="http://schemas.microsoft.com/office/drawing/2017/decorative" val="1"/>
+                <adec:decorative xmlns:adec="http://schemas.microsoft.com/office/drawing/2017/decorative" xmlns="" val="1"/>
               </a:ext>
             </a:extLst>
           </p:cNvPr>
@@ -11278,7 +11426,7 @@
           <p:nvPr>
             <p:extLst>
               <p:ext uri="{386F3935-93C4-4BCD-93E2-E3B085C9AB24}">
-                <p16:designElem xmlns:p16="http://schemas.microsoft.com/office/powerpoint/2015/main" val="1"/>
+                <p16:designElem xmlns:p16="http://schemas.microsoft.com/office/powerpoint/2015/main" xmlns="" val="1"/>
               </p:ext>
             </p:extLst>
           </p:nvPr>
@@ -11364,10 +11512,10 @@
           <p:cNvPr id="12" name="Rectangle 11">
             <a:extLst>
               <a:ext uri="{FF2B5EF4-FFF2-40B4-BE49-F238E27FC236}">
-                <a16:creationId xmlns:a16="http://schemas.microsoft.com/office/drawing/2014/main" id="{8E0105E7-23DB-4CF2-8258-FF47C7620F6E}"/>
+                <a16:creationId xmlns:a16="http://schemas.microsoft.com/office/drawing/2014/main" xmlns="" id="{8E0105E7-23DB-4CF2-8258-FF47C7620F6E}"/>
               </a:ext>
               <a:ext uri="{C183D7F6-B498-43B3-948B-1728B52AA6E4}">
-                <adec:decorative xmlns:adec="http://schemas.microsoft.com/office/drawing/2017/decorative" val="1"/>
+                <adec:decorative xmlns:adec="http://schemas.microsoft.com/office/drawing/2017/decorative" xmlns="" val="1"/>
               </a:ext>
             </a:extLst>
           </p:cNvPr>
@@ -11377,7 +11525,7 @@
           <p:nvPr>
             <p:extLst>
               <p:ext uri="{386F3935-93C4-4BCD-93E2-E3B085C9AB24}">
-                <p16:designElem xmlns:p16="http://schemas.microsoft.com/office/powerpoint/2015/main" val="1"/>
+                <p16:designElem xmlns:p16="http://schemas.microsoft.com/office/powerpoint/2015/main" xmlns="" val="1"/>
               </p:ext>
             </p:extLst>
           </p:nvPr>
@@ -11454,7 +11602,7 @@
           <p:cNvPr id="2" name="Title 1">
             <a:extLst>
               <a:ext uri="{FF2B5EF4-FFF2-40B4-BE49-F238E27FC236}">
-                <a16:creationId xmlns:a16="http://schemas.microsoft.com/office/drawing/2014/main" id="{8F23728A-A602-B82A-ACC5-3B5F47D667FE}"/>
+                <a16:creationId xmlns:a16="http://schemas.microsoft.com/office/drawing/2014/main" xmlns="" id="{8F23728A-A602-B82A-ACC5-3B5F47D667FE}"/>
               </a:ext>
             </a:extLst>
           </p:cNvPr>
@@ -11491,10 +11639,10 @@
           <p:cNvPr id="14" name="Rectangle 13">
             <a:extLst>
               <a:ext uri="{FF2B5EF4-FFF2-40B4-BE49-F238E27FC236}">
-                <a16:creationId xmlns:a16="http://schemas.microsoft.com/office/drawing/2014/main" id="{074B4F7D-14B2-478B-8BF5-01E4E0C5D263}"/>
+                <a16:creationId xmlns:a16="http://schemas.microsoft.com/office/drawing/2014/main" xmlns="" id="{074B4F7D-14B2-478B-8BF5-01E4E0C5D263}"/>
               </a:ext>
               <a:ext uri="{C183D7F6-B498-43B3-948B-1728B52AA6E4}">
-                <adec:decorative xmlns:adec="http://schemas.microsoft.com/office/drawing/2017/decorative" val="1"/>
+                <adec:decorative xmlns:adec="http://schemas.microsoft.com/office/drawing/2017/decorative" xmlns="" val="1"/>
               </a:ext>
             </a:extLst>
           </p:cNvPr>
@@ -11504,7 +11652,7 @@
           <p:nvPr>
             <p:extLst>
               <p:ext uri="{386F3935-93C4-4BCD-93E2-E3B085C9AB24}">
-                <p16:designElem xmlns:p16="http://schemas.microsoft.com/office/powerpoint/2015/main" val="1"/>
+                <p16:designElem xmlns:p16="http://schemas.microsoft.com/office/powerpoint/2015/main" xmlns="" val="1"/>
               </p:ext>
             </p:extLst>
           </p:nvPr>
@@ -11559,7 +11707,7 @@
           <p:cNvPr id="3" name="Content Placeholder 2">
             <a:extLst>
               <a:ext uri="{FF2B5EF4-FFF2-40B4-BE49-F238E27FC236}">
-                <a16:creationId xmlns:a16="http://schemas.microsoft.com/office/drawing/2014/main" id="{DCD3F1BF-47CC-121C-95C9-E4135180969C}"/>
+                <a16:creationId xmlns:a16="http://schemas.microsoft.com/office/drawing/2014/main" xmlns="" id="{DCD3F1BF-47CC-121C-95C9-E4135180969C}"/>
               </a:ext>
             </a:extLst>
           </p:cNvPr>
@@ -11617,13 +11765,20 @@
     </p:spTree>
     <p:extLst>
       <p:ext uri="{BB962C8B-B14F-4D97-AF65-F5344CB8AC3E}">
-        <p14:creationId xmlns:p14="http://schemas.microsoft.com/office/powerpoint/2010/main" val="4158490415"/>
+        <p14:creationId xmlns:p14="http://schemas.microsoft.com/office/powerpoint/2010/main" xmlns="" val="4158490415"/>
       </p:ext>
     </p:extLst>
   </p:cSld>
   <p:clrMapOvr>
     <a:masterClrMapping/>
   </p:clrMapOvr>
+  <p:timing>
+    <p:tnLst>
+      <p:par>
+        <p:cTn id="1" dur="indefinite" restart="never" nodeType="tmRoot"/>
+      </p:par>
+    </p:tnLst>
+  </p:timing>
 </p:sld>
 </file>
 
@@ -11657,10 +11812,10 @@
           <p:cNvPr id="15" name="Rectangle 14">
             <a:extLst>
               <a:ext uri="{FF2B5EF4-FFF2-40B4-BE49-F238E27FC236}">
-                <a16:creationId xmlns:a16="http://schemas.microsoft.com/office/drawing/2014/main" id="{DAF1966E-FD40-4A4A-B61B-C4DF7FA05F06}"/>
+                <a16:creationId xmlns:a16="http://schemas.microsoft.com/office/drawing/2014/main" xmlns="" id="{DAF1966E-FD40-4A4A-B61B-C4DF7FA05F06}"/>
               </a:ext>
               <a:ext uri="{C183D7F6-B498-43B3-948B-1728B52AA6E4}">
-                <adec:decorative xmlns:adec="http://schemas.microsoft.com/office/drawing/2017/decorative" val="1"/>
+                <adec:decorative xmlns:adec="http://schemas.microsoft.com/office/drawing/2017/decorative" xmlns="" val="1"/>
               </a:ext>
             </a:extLst>
           </p:cNvPr>
@@ -11670,7 +11825,7 @@
           <p:nvPr>
             <p:extLst>
               <p:ext uri="{386F3935-93C4-4BCD-93E2-E3B085C9AB24}">
-                <p16:designElem xmlns:p16="http://schemas.microsoft.com/office/powerpoint/2015/main" val="1"/>
+                <p16:designElem xmlns:p16="http://schemas.microsoft.com/office/powerpoint/2015/main" xmlns="" val="1"/>
               </p:ext>
             </p:extLst>
           </p:nvPr>
@@ -11717,10 +11872,10 @@
           <p:cNvPr id="17" name="Rectangle 16">
             <a:extLst>
               <a:ext uri="{FF2B5EF4-FFF2-40B4-BE49-F238E27FC236}">
-                <a16:creationId xmlns:a16="http://schemas.microsoft.com/office/drawing/2014/main" id="{047BFA19-D45E-416B-A404-7AF2F3F27017}"/>
+                <a16:creationId xmlns:a16="http://schemas.microsoft.com/office/drawing/2014/main" xmlns="" id="{047BFA19-D45E-416B-A404-7AF2F3F27017}"/>
               </a:ext>
               <a:ext uri="{C183D7F6-B498-43B3-948B-1728B52AA6E4}">
-                <adec:decorative xmlns:adec="http://schemas.microsoft.com/office/drawing/2017/decorative" val="1"/>
+                <adec:decorative xmlns:adec="http://schemas.microsoft.com/office/drawing/2017/decorative" xmlns="" val="1"/>
               </a:ext>
             </a:extLst>
           </p:cNvPr>
@@ -11730,7 +11885,7 @@
           <p:nvPr>
             <p:extLst>
               <p:ext uri="{386F3935-93C4-4BCD-93E2-E3B085C9AB24}">
-                <p16:designElem xmlns:p16="http://schemas.microsoft.com/office/powerpoint/2015/main" val="1"/>
+                <p16:designElem xmlns:p16="http://schemas.microsoft.com/office/powerpoint/2015/main" xmlns="" val="1"/>
               </p:ext>
             </p:extLst>
           </p:nvPr>
@@ -11816,10 +11971,10 @@
           <p:cNvPr id="19" name="Rectangle 18">
             <a:extLst>
               <a:ext uri="{FF2B5EF4-FFF2-40B4-BE49-F238E27FC236}">
-                <a16:creationId xmlns:a16="http://schemas.microsoft.com/office/drawing/2014/main" id="{8E0105E7-23DB-4CF2-8258-FF47C7620F6E}"/>
+                <a16:creationId xmlns:a16="http://schemas.microsoft.com/office/drawing/2014/main" xmlns="" id="{8E0105E7-23DB-4CF2-8258-FF47C7620F6E}"/>
               </a:ext>
               <a:ext uri="{C183D7F6-B498-43B3-948B-1728B52AA6E4}">
-                <adec:decorative xmlns:adec="http://schemas.microsoft.com/office/drawing/2017/decorative" val="1"/>
+                <adec:decorative xmlns:adec="http://schemas.microsoft.com/office/drawing/2017/decorative" xmlns="" val="1"/>
               </a:ext>
             </a:extLst>
           </p:cNvPr>
@@ -11829,7 +11984,7 @@
           <p:nvPr>
             <p:extLst>
               <p:ext uri="{386F3935-93C4-4BCD-93E2-E3B085C9AB24}">
-                <p16:designElem xmlns:p16="http://schemas.microsoft.com/office/powerpoint/2015/main" val="1"/>
+                <p16:designElem xmlns:p16="http://schemas.microsoft.com/office/powerpoint/2015/main" xmlns="" val="1"/>
               </p:ext>
             </p:extLst>
           </p:nvPr>
@@ -11906,7 +12061,7 @@
           <p:cNvPr id="2" name="Title 1">
             <a:extLst>
               <a:ext uri="{FF2B5EF4-FFF2-40B4-BE49-F238E27FC236}">
-                <a16:creationId xmlns:a16="http://schemas.microsoft.com/office/drawing/2014/main" id="{0B095E5B-C9E5-B0DB-098F-F11C973FF4C0}"/>
+                <a16:creationId xmlns:a16="http://schemas.microsoft.com/office/drawing/2014/main" xmlns="" id="{0B095E5B-C9E5-B0DB-098F-F11C973FF4C0}"/>
               </a:ext>
             </a:extLst>
           </p:cNvPr>
@@ -11943,10 +12098,10 @@
           <p:cNvPr id="21" name="Rectangle 20">
             <a:extLst>
               <a:ext uri="{FF2B5EF4-FFF2-40B4-BE49-F238E27FC236}">
-                <a16:creationId xmlns:a16="http://schemas.microsoft.com/office/drawing/2014/main" id="{074B4F7D-14B2-478B-8BF5-01E4E0C5D263}"/>
+                <a16:creationId xmlns:a16="http://schemas.microsoft.com/office/drawing/2014/main" xmlns="" id="{074B4F7D-14B2-478B-8BF5-01E4E0C5D263}"/>
               </a:ext>
               <a:ext uri="{C183D7F6-B498-43B3-948B-1728B52AA6E4}">
-                <adec:decorative xmlns:adec="http://schemas.microsoft.com/office/drawing/2017/decorative" val="1"/>
+                <adec:decorative xmlns:adec="http://schemas.microsoft.com/office/drawing/2017/decorative" xmlns="" val="1"/>
               </a:ext>
             </a:extLst>
           </p:cNvPr>
@@ -11956,7 +12111,7 @@
           <p:nvPr>
             <p:extLst>
               <p:ext uri="{386F3935-93C4-4BCD-93E2-E3B085C9AB24}">
-                <p16:designElem xmlns:p16="http://schemas.microsoft.com/office/powerpoint/2015/main" val="1"/>
+                <p16:designElem xmlns:p16="http://schemas.microsoft.com/office/powerpoint/2015/main" xmlns="" val="1"/>
               </p:ext>
             </p:extLst>
           </p:nvPr>
@@ -12011,7 +12166,7 @@
           <p:cNvPr id="3" name="Content Placeholder 2">
             <a:extLst>
               <a:ext uri="{FF2B5EF4-FFF2-40B4-BE49-F238E27FC236}">
-                <a16:creationId xmlns:a16="http://schemas.microsoft.com/office/drawing/2014/main" id="{232E13AE-40C3-9EFA-1F3E-B9ABDBA4F3B4}"/>
+                <a16:creationId xmlns:a16="http://schemas.microsoft.com/office/drawing/2014/main" xmlns="" id="{232E13AE-40C3-9EFA-1F3E-B9ABDBA4F3B4}"/>
               </a:ext>
             </a:extLst>
           </p:cNvPr>
@@ -12089,13 +12244,20 @@
     </p:spTree>
     <p:extLst>
       <p:ext uri="{BB962C8B-B14F-4D97-AF65-F5344CB8AC3E}">
-        <p14:creationId xmlns:p14="http://schemas.microsoft.com/office/powerpoint/2010/main" val="1192631749"/>
+        <p14:creationId xmlns:p14="http://schemas.microsoft.com/office/powerpoint/2010/main" xmlns="" val="1192631749"/>
       </p:ext>
     </p:extLst>
   </p:cSld>
   <p:clrMapOvr>
     <a:masterClrMapping/>
   </p:clrMapOvr>
+  <p:timing>
+    <p:tnLst>
+      <p:par>
+        <p:cTn id="1" dur="indefinite" restart="never" nodeType="tmRoot"/>
+      </p:par>
+    </p:tnLst>
+  </p:timing>
 </p:sld>
 </file>
 
@@ -12129,10 +12291,10 @@
           <p:cNvPr id="8" name="Rectangle 7">
             <a:extLst>
               <a:ext uri="{FF2B5EF4-FFF2-40B4-BE49-F238E27FC236}">
-                <a16:creationId xmlns:a16="http://schemas.microsoft.com/office/drawing/2014/main" id="{100EDD19-6802-4EC3-95CE-CFFAB042CFD6}"/>
+                <a16:creationId xmlns:a16="http://schemas.microsoft.com/office/drawing/2014/main" xmlns="" id="{100EDD19-6802-4EC3-95CE-CFFAB042CFD6}"/>
               </a:ext>
               <a:ext uri="{C183D7F6-B498-43B3-948B-1728B52AA6E4}">
-                <adec:decorative xmlns:adec="http://schemas.microsoft.com/office/drawing/2017/decorative" val="1"/>
+                <adec:decorative xmlns:adec="http://schemas.microsoft.com/office/drawing/2017/decorative" xmlns="" val="1"/>
               </a:ext>
             </a:extLst>
           </p:cNvPr>
@@ -12142,7 +12304,7 @@
           <p:nvPr>
             <p:extLst>
               <p:ext uri="{386F3935-93C4-4BCD-93E2-E3B085C9AB24}">
-                <p16:designElem xmlns:p16="http://schemas.microsoft.com/office/powerpoint/2015/main" val="1"/>
+                <p16:designElem xmlns:p16="http://schemas.microsoft.com/office/powerpoint/2015/main" xmlns="" val="1"/>
               </p:ext>
             </p:extLst>
           </p:nvPr>
@@ -12189,7 +12351,7 @@
           <p:cNvPr id="2" name="Title 1">
             <a:extLst>
               <a:ext uri="{FF2B5EF4-FFF2-40B4-BE49-F238E27FC236}">
-                <a16:creationId xmlns:a16="http://schemas.microsoft.com/office/drawing/2014/main" id="{F516CA35-8829-4DF2-5CF0-18068A26CEFE}"/>
+                <a16:creationId xmlns:a16="http://schemas.microsoft.com/office/drawing/2014/main" xmlns="" id="{F516CA35-8829-4DF2-5CF0-18068A26CEFE}"/>
               </a:ext>
             </a:extLst>
           </p:cNvPr>
@@ -12229,10 +12391,10 @@
           <p:cNvPr id="10" name="sketch line">
             <a:extLst>
               <a:ext uri="{FF2B5EF4-FFF2-40B4-BE49-F238E27FC236}">
-                <a16:creationId xmlns:a16="http://schemas.microsoft.com/office/drawing/2014/main" id="{DB17E863-922E-4C26-BD64-E8FD41D28661}"/>
+                <a16:creationId xmlns:a16="http://schemas.microsoft.com/office/drawing/2014/main" xmlns="" id="{DB17E863-922E-4C26-BD64-E8FD41D28661}"/>
               </a:ext>
               <a:ext uri="{C183D7F6-B498-43B3-948B-1728B52AA6E4}">
-                <adec:decorative xmlns:adec="http://schemas.microsoft.com/office/drawing/2017/decorative" val="1"/>
+                <adec:decorative xmlns:adec="http://schemas.microsoft.com/office/drawing/2017/decorative" xmlns="" val="1"/>
               </a:ext>
             </a:extLst>
           </p:cNvPr>
@@ -12242,7 +12404,7 @@
           <p:nvPr>
             <p:extLst>
               <p:ext uri="{386F3935-93C4-4BCD-93E2-E3B085C9AB24}">
-                <p16:designElem xmlns:p16="http://schemas.microsoft.com/office/powerpoint/2015/main" val="1"/>
+                <p16:designElem xmlns:p16="http://schemas.microsoft.com/office/powerpoint/2015/main" xmlns="" val="1"/>
               </p:ext>
             </p:extLst>
           </p:nvPr>
@@ -12825,7 +12987,7 @@
             <a:round/>
             <a:extLst>
               <a:ext uri="{C807C97D-BFC1-408E-A445-0C87EB9F89A2}">
-                <ask:lineSketchStyleProps xmlns:ask="http://schemas.microsoft.com/office/drawing/2018/sketchyshapes" sd="1219033472">
+                <ask:lineSketchStyleProps xmlns:ask="http://schemas.microsoft.com/office/drawing/2018/sketchyshapes" xmlns="" sd="1219033472">
                   <a:prstGeom prst="rect">
                     <a:avLst/>
                   </a:prstGeom>
@@ -12867,7 +13029,7 @@
           <p:cNvPr id="3" name="Content Placeholder 2">
             <a:extLst>
               <a:ext uri="{FF2B5EF4-FFF2-40B4-BE49-F238E27FC236}">
-                <a16:creationId xmlns:a16="http://schemas.microsoft.com/office/drawing/2014/main" id="{B1594985-B930-EB1C-EB5F-1246F2B8896F}"/>
+                <a16:creationId xmlns:a16="http://schemas.microsoft.com/office/drawing/2014/main" xmlns="" id="{B1594985-B930-EB1C-EB5F-1246F2B8896F}"/>
               </a:ext>
             </a:extLst>
           </p:cNvPr>
@@ -13012,13 +13174,20 @@
     </p:spTree>
     <p:extLst>
       <p:ext uri="{BB962C8B-B14F-4D97-AF65-F5344CB8AC3E}">
-        <p14:creationId xmlns:p14="http://schemas.microsoft.com/office/powerpoint/2010/main" val="3944609729"/>
+        <p14:creationId xmlns:p14="http://schemas.microsoft.com/office/powerpoint/2010/main" xmlns="" val="3944609729"/>
       </p:ext>
     </p:extLst>
   </p:cSld>
   <p:clrMapOvr>
     <a:masterClrMapping/>
   </p:clrMapOvr>
+  <p:timing>
+    <p:tnLst>
+      <p:par>
+        <p:cTn id="1" dur="indefinite" restart="never" nodeType="tmRoot"/>
+      </p:par>
+    </p:tnLst>
+  </p:timing>
 </p:sld>
 </file>
 
@@ -13044,7 +13213,7 @@
           <p:cNvPr id="2" name="Title 1">
             <a:extLst>
               <a:ext uri="{FF2B5EF4-FFF2-40B4-BE49-F238E27FC236}">
-                <a16:creationId xmlns:a16="http://schemas.microsoft.com/office/drawing/2014/main" id="{0BBD01F1-36A6-D4F8-E05D-A33ACCEA0D10}"/>
+                <a16:creationId xmlns:a16="http://schemas.microsoft.com/office/drawing/2014/main" xmlns="" id="{0BBD01F1-36A6-D4F8-E05D-A33ACCEA0D10}"/>
               </a:ext>
             </a:extLst>
           </p:cNvPr>
@@ -13086,7 +13255,7 @@
           <p:cNvPr id="5" name="Content Placeholder 2">
             <a:extLst>
               <a:ext uri="{FF2B5EF4-FFF2-40B4-BE49-F238E27FC236}">
-                <a16:creationId xmlns:a16="http://schemas.microsoft.com/office/drawing/2014/main" id="{7EE65851-9B1A-A053-D4B5-7D89D7C5CB69}"/>
+                <a16:creationId xmlns:a16="http://schemas.microsoft.com/office/drawing/2014/main" xmlns="" id="{7EE65851-9B1A-A053-D4B5-7D89D7C5CB69}"/>
               </a:ext>
             </a:extLst>
           </p:cNvPr>
@@ -13110,13 +13279,20 @@
     </p:spTree>
     <p:extLst>
       <p:ext uri="{BB962C8B-B14F-4D97-AF65-F5344CB8AC3E}">
-        <p14:creationId xmlns:p14="http://schemas.microsoft.com/office/powerpoint/2010/main" val="1703836379"/>
+        <p14:creationId xmlns:p14="http://schemas.microsoft.com/office/powerpoint/2010/main" xmlns="" val="1703836379"/>
       </p:ext>
     </p:extLst>
   </p:cSld>
   <p:clrMapOvr>
     <a:masterClrMapping/>
   </p:clrMapOvr>
+  <p:timing>
+    <p:tnLst>
+      <p:par>
+        <p:cTn id="1" dur="indefinite" restart="never" nodeType="tmRoot"/>
+      </p:par>
+    </p:tnLst>
+  </p:timing>
 </p:sld>
 </file>
 
@@ -13142,7 +13318,7 @@
           <p:cNvPr id="2" name="Title 1">
             <a:extLst>
               <a:ext uri="{FF2B5EF4-FFF2-40B4-BE49-F238E27FC236}">
-                <a16:creationId xmlns:a16="http://schemas.microsoft.com/office/drawing/2014/main" id="{592B357C-CAEF-B339-50E2-34E4E124E17E}"/>
+                <a16:creationId xmlns:a16="http://schemas.microsoft.com/office/drawing/2014/main" xmlns="" id="{592B357C-CAEF-B339-50E2-34E4E124E17E}"/>
               </a:ext>
             </a:extLst>
           </p:cNvPr>
@@ -13179,46 +13355,195 @@
           </a:p>
         </p:txBody>
       </p:sp>
-      <p:sp>
-        <p:nvSpPr>
-          <p:cNvPr id="3" name="Content Placeholder 2">
-            <a:extLst>
-              <a:ext uri="{FF2B5EF4-FFF2-40B4-BE49-F238E27FC236}">
-                <a16:creationId xmlns:a16="http://schemas.microsoft.com/office/drawing/2014/main" id="{B1A505BD-37ED-8717-DE1B-2D18F18479FA}"/>
-              </a:ext>
-            </a:extLst>
+      <p:pic>
+        <p:nvPicPr>
+          <p:cNvPr id="9" name="streamlit-app-2025-06-22-21-06-69.mp4">
+            <a:hlinkClick r:id="" action="ppaction://media"/>
           </p:cNvPr>
-          <p:cNvSpPr>
-            <a:spLocks noGrp="1"/>
-          </p:cNvSpPr>
+          <p:cNvPicPr>
+            <a:picLocks noGrp="1" noRot="1" noChangeAspect="1"/>
+          </p:cNvPicPr>
           <p:nvPr>
             <p:ph idx="1"/>
+            <a:videoFile r:link="rId1"/>
           </p:nvPr>
-        </p:nvSpPr>
+        </p:nvPicPr>
+        <p:blipFill>
+          <a:blip r:embed="rId3" cstate="print"/>
+          <a:stretch>
+            <a:fillRect/>
+          </a:stretch>
+        </p:blipFill>
         <p:spPr>
           <a:xfrm>
-            <a:off x="838200" y="914400"/>
-            <a:ext cx="10515600" cy="5262563"/>
+            <a:off x="914399" y="1457325"/>
+            <a:ext cx="10587039" cy="4704160"/>
           </a:xfrm>
+          <a:prstGeom prst="rect">
+            <a:avLst/>
+          </a:prstGeom>
         </p:spPr>
-        <p:txBody>
-          <a:bodyPr/>
-          <a:lstStyle/>
-          <a:p>
-            <a:endParaRPr lang="en-IN" dirty="0"/>
-          </a:p>
-        </p:txBody>
-      </p:sp>
+      </p:pic>
     </p:spTree>
     <p:extLst>
       <p:ext uri="{BB962C8B-B14F-4D97-AF65-F5344CB8AC3E}">
-        <p14:creationId xmlns:p14="http://schemas.microsoft.com/office/powerpoint/2010/main" val="2130347106"/>
+        <p14:creationId xmlns:p14="http://schemas.microsoft.com/office/powerpoint/2010/main" xmlns="" val="2130347106"/>
       </p:ext>
     </p:extLst>
   </p:cSld>
   <p:clrMapOvr>
     <a:masterClrMapping/>
   </p:clrMapOvr>
+  <p:timing>
+    <p:tnLst>
+      <p:par>
+        <p:cTn id="1" dur="indefinite" restart="never" nodeType="tmRoot">
+          <p:childTnLst>
+            <p:seq concurrent="1" nextAc="seek">
+              <p:cTn id="2" dur="indefinite" nodeType="mainSeq">
+                <p:childTnLst>
+                  <p:par>
+                    <p:cTn id="3" fill="hold">
+                      <p:stCondLst>
+                        <p:cond delay="indefinite"/>
+                        <p:cond evt="onBegin" delay="0">
+                          <p:tn val="2"/>
+                        </p:cond>
+                      </p:stCondLst>
+                      <p:childTnLst>
+                        <p:par>
+                          <p:cTn id="4" fill="hold">
+                            <p:stCondLst>
+                              <p:cond delay="0"/>
+                            </p:stCondLst>
+                            <p:childTnLst>
+                              <p:par>
+                                <p:cTn id="5" presetID="1" presetClass="mediacall" presetSubtype="0" fill="hold" nodeType="afterEffect">
+                                  <p:stCondLst>
+                                    <p:cond delay="0"/>
+                                  </p:stCondLst>
+                                  <p:childTnLst>
+                                    <p:cmd type="call" cmd="playFrom(0.0)">
+                                      <p:cBhvr>
+                                        <p:cTn id="6" dur="1" fill="hold"/>
+                                        <p:tgtEl>
+                                          <p:spTgt spid="9"/>
+                                        </p:tgtEl>
+                                      </p:cBhvr>
+                                    </p:cmd>
+                                  </p:childTnLst>
+                                </p:cTn>
+                              </p:par>
+                            </p:childTnLst>
+                          </p:cTn>
+                        </p:par>
+                      </p:childTnLst>
+                    </p:cTn>
+                  </p:par>
+                </p:childTnLst>
+              </p:cTn>
+              <p:prevCondLst>
+                <p:cond evt="onPrev" delay="0">
+                  <p:tgtEl>
+                    <p:sldTgt/>
+                  </p:tgtEl>
+                </p:cond>
+              </p:prevCondLst>
+              <p:nextCondLst>
+                <p:cond evt="onNext" delay="0">
+                  <p:tgtEl>
+                    <p:sldTgt/>
+                  </p:tgtEl>
+                </p:cond>
+              </p:nextCondLst>
+            </p:seq>
+            <p:video>
+              <p:cMediaNode>
+                <p:cTn id="7" fill="hold" display="0">
+                  <p:stCondLst>
+                    <p:cond delay="indefinite"/>
+                  </p:stCondLst>
+                  <p:endCondLst>
+                    <p:cond evt="onNext" delay="0">
+                      <p:tgtEl>
+                        <p:sldTgt/>
+                      </p:tgtEl>
+                    </p:cond>
+                    <p:cond evt="onPrev" delay="0">
+                      <p:tgtEl>
+                        <p:sldTgt/>
+                      </p:tgtEl>
+                    </p:cond>
+                  </p:endCondLst>
+                </p:cTn>
+                <p:tgtEl>
+                  <p:spTgt spid="9"/>
+                </p:tgtEl>
+              </p:cMediaNode>
+            </p:video>
+            <p:seq concurrent="1" nextAc="seek">
+              <p:cTn id="8" restart="whenNotActive" fill="hold" evtFilter="cancelBubble" nodeType="interactiveSeq">
+                <p:stCondLst>
+                  <p:cond evt="onClick" delay="0">
+                    <p:tgtEl>
+                      <p:spTgt spid="9"/>
+                    </p:tgtEl>
+                  </p:cond>
+                </p:stCondLst>
+                <p:endSync evt="end" delay="0">
+                  <p:rtn val="all"/>
+                </p:endSync>
+                <p:childTnLst>
+                  <p:par>
+                    <p:cTn id="9" fill="hold">
+                      <p:stCondLst>
+                        <p:cond delay="0"/>
+                      </p:stCondLst>
+                      <p:childTnLst>
+                        <p:par>
+                          <p:cTn id="10" fill="hold">
+                            <p:stCondLst>
+                              <p:cond delay="0"/>
+                            </p:stCondLst>
+                            <p:childTnLst>
+                              <p:par>
+                                <p:cTn id="11" presetID="2" presetClass="mediacall" presetSubtype="0" fill="hold" nodeType="clickEffect">
+                                  <p:stCondLst>
+                                    <p:cond delay="0"/>
+                                  </p:stCondLst>
+                                  <p:childTnLst>
+                                    <p:cmd type="call" cmd="togglePause">
+                                      <p:cBhvr>
+                                        <p:cTn id="12" dur="1" fill="hold"/>
+                                        <p:tgtEl>
+                                          <p:spTgt spid="9"/>
+                                        </p:tgtEl>
+                                      </p:cBhvr>
+                                    </p:cmd>
+                                  </p:childTnLst>
+                                </p:cTn>
+                              </p:par>
+                            </p:childTnLst>
+                          </p:cTn>
+                        </p:par>
+                      </p:childTnLst>
+                    </p:cTn>
+                  </p:par>
+                </p:childTnLst>
+              </p:cTn>
+              <p:nextCondLst>
+                <p:cond evt="onClick" delay="0">
+                  <p:tgtEl>
+                    <p:spTgt spid="9"/>
+                  </p:tgtEl>
+                </p:cond>
+              </p:nextCondLst>
+            </p:seq>
+          </p:childTnLst>
+        </p:cTn>
+      </p:par>
+    </p:tnLst>
+  </p:timing>
 </p:sld>
 </file>
 
@@ -13252,10 +13577,10 @@
           <p:cNvPr id="10" name="Rectangle 9">
             <a:extLst>
               <a:ext uri="{FF2B5EF4-FFF2-40B4-BE49-F238E27FC236}">
-                <a16:creationId xmlns:a16="http://schemas.microsoft.com/office/drawing/2014/main" id="{6C4028FD-8BAA-4A19-BFDE-594D991B7552}"/>
+                <a16:creationId xmlns:a16="http://schemas.microsoft.com/office/drawing/2014/main" xmlns="" id="{6C4028FD-8BAA-4A19-BFDE-594D991B7552}"/>
               </a:ext>
               <a:ext uri="{C183D7F6-B498-43B3-948B-1728B52AA6E4}">
-                <adec:decorative xmlns:adec="http://schemas.microsoft.com/office/drawing/2017/decorative" val="1"/>
+                <adec:decorative xmlns:adec="http://schemas.microsoft.com/office/drawing/2017/decorative" xmlns="" val="1"/>
               </a:ext>
             </a:extLst>
           </p:cNvPr>
@@ -13265,7 +13590,7 @@
           <p:nvPr>
             <p:extLst>
               <p:ext uri="{386F3935-93C4-4BCD-93E2-E3B085C9AB24}">
-                <p16:designElem xmlns:p16="http://schemas.microsoft.com/office/powerpoint/2015/main" val="1"/>
+                <p16:designElem xmlns:p16="http://schemas.microsoft.com/office/powerpoint/2015/main" xmlns="" val="1"/>
               </p:ext>
             </p:extLst>
           </p:nvPr>
@@ -13312,7 +13637,7 @@
           <p:cNvPr id="2" name="Title 1">
             <a:extLst>
               <a:ext uri="{FF2B5EF4-FFF2-40B4-BE49-F238E27FC236}">
-                <a16:creationId xmlns:a16="http://schemas.microsoft.com/office/drawing/2014/main" id="{5E68A873-04EF-333B-ADCF-29C795845195}"/>
+                <a16:creationId xmlns:a16="http://schemas.microsoft.com/office/drawing/2014/main" xmlns="" id="{5E68A873-04EF-333B-ADCF-29C795845195}"/>
               </a:ext>
             </a:extLst>
           </p:cNvPr>
@@ -13354,7 +13679,7 @@
           <p:cNvPr id="5" name="Content Placeholder 2">
             <a:extLst>
               <a:ext uri="{FF2B5EF4-FFF2-40B4-BE49-F238E27FC236}">
-                <a16:creationId xmlns:a16="http://schemas.microsoft.com/office/drawing/2014/main" id="{40AD962E-5572-68D1-0FE9-36CEFC0868A5}"/>
+                <a16:creationId xmlns:a16="http://schemas.microsoft.com/office/drawing/2014/main" xmlns="" id="{40AD962E-5572-68D1-0FE9-36CEFC0868A5}"/>
               </a:ext>
             </a:extLst>
           </p:cNvPr>
@@ -13365,7 +13690,7 @@
             <p:ph idx="1"/>
             <p:extLst>
               <p:ext uri="{D42A27DB-BD31-4B8C-83A1-F6EECF244321}">
-                <p14:modId xmlns:p14="http://schemas.microsoft.com/office/powerpoint/2010/main" val="523424589"/>
+                <p14:modId xmlns:p14="http://schemas.microsoft.com/office/powerpoint/2010/main" xmlns="" val="523424589"/>
               </p:ext>
             </p:extLst>
           </p:nvPr>
@@ -13383,13 +13708,20 @@
     </p:spTree>
     <p:extLst>
       <p:ext uri="{BB962C8B-B14F-4D97-AF65-F5344CB8AC3E}">
-        <p14:creationId xmlns:p14="http://schemas.microsoft.com/office/powerpoint/2010/main" val="1097475592"/>
+        <p14:creationId xmlns:p14="http://schemas.microsoft.com/office/powerpoint/2010/main" xmlns="" val="1097475592"/>
       </p:ext>
     </p:extLst>
   </p:cSld>
   <p:clrMapOvr>
     <a:masterClrMapping/>
   </p:clrMapOvr>
+  <p:timing>
+    <p:tnLst>
+      <p:par>
+        <p:cTn id="1" dur="indefinite" restart="never" nodeType="tmRoot"/>
+      </p:par>
+    </p:tnLst>
+  </p:timing>
 </p:sld>
 </file>
 
@@ -13423,10 +13755,10 @@
           <p:cNvPr id="16" name="Rectangle 15">
             <a:extLst>
               <a:ext uri="{FF2B5EF4-FFF2-40B4-BE49-F238E27FC236}">
-                <a16:creationId xmlns:a16="http://schemas.microsoft.com/office/drawing/2014/main" id="{89A320C9-9735-4D13-8279-C1C674841392}"/>
+                <a16:creationId xmlns:a16="http://schemas.microsoft.com/office/drawing/2014/main" xmlns="" id="{89A320C9-9735-4D13-8279-C1C674841392}"/>
               </a:ext>
               <a:ext uri="{C183D7F6-B498-43B3-948B-1728B52AA6E4}">
-                <adec:decorative xmlns:adec="http://schemas.microsoft.com/office/drawing/2017/decorative" val="1"/>
+                <adec:decorative xmlns:adec="http://schemas.microsoft.com/office/drawing/2017/decorative" xmlns="" val="1"/>
               </a:ext>
             </a:extLst>
           </p:cNvPr>
@@ -13436,7 +13768,7 @@
           <p:nvPr>
             <p:extLst>
               <p:ext uri="{386F3935-93C4-4BCD-93E2-E3B085C9AB24}">
-                <p16:designElem xmlns:p16="http://schemas.microsoft.com/office/powerpoint/2015/main" val="1"/>
+                <p16:designElem xmlns:p16="http://schemas.microsoft.com/office/powerpoint/2015/main" xmlns="" val="1"/>
               </p:ext>
             </p:extLst>
           </p:nvPr>
@@ -13483,10 +13815,10 @@
           <p:cNvPr id="18" name="Rectangle 17">
             <a:extLst>
               <a:ext uri="{FF2B5EF4-FFF2-40B4-BE49-F238E27FC236}">
-                <a16:creationId xmlns:a16="http://schemas.microsoft.com/office/drawing/2014/main" id="{92544CF4-9B52-4A7B-A4B3-88C72729B77D}"/>
+                <a16:creationId xmlns:a16="http://schemas.microsoft.com/office/drawing/2014/main" xmlns="" id="{92544CF4-9B52-4A7B-A4B3-88C72729B77D}"/>
               </a:ext>
               <a:ext uri="{C183D7F6-B498-43B3-948B-1728B52AA6E4}">
-                <adec:decorative xmlns:adec="http://schemas.microsoft.com/office/drawing/2017/decorative" val="1"/>
+                <adec:decorative xmlns:adec="http://schemas.microsoft.com/office/drawing/2017/decorative" xmlns="" val="1"/>
               </a:ext>
             </a:extLst>
           </p:cNvPr>
@@ -13496,7 +13828,7 @@
           <p:nvPr>
             <p:extLst>
               <p:ext uri="{386F3935-93C4-4BCD-93E2-E3B085C9AB24}">
-                <p16:designElem xmlns:p16="http://schemas.microsoft.com/office/powerpoint/2015/main" val="1"/>
+                <p16:designElem xmlns:p16="http://schemas.microsoft.com/office/powerpoint/2015/main" xmlns="" val="1"/>
               </p:ext>
             </p:extLst>
           </p:nvPr>
@@ -13582,10 +13914,10 @@
           <p:cNvPr id="20" name="Rectangle 19">
             <a:extLst>
               <a:ext uri="{FF2B5EF4-FFF2-40B4-BE49-F238E27FC236}">
-                <a16:creationId xmlns:a16="http://schemas.microsoft.com/office/drawing/2014/main" id="{E75862C5-5C00-4421-BC7B-9B7B86DBC80D}"/>
+                <a16:creationId xmlns:a16="http://schemas.microsoft.com/office/drawing/2014/main" xmlns="" id="{E75862C5-5C00-4421-BC7B-9B7B86DBC80D}"/>
               </a:ext>
               <a:ext uri="{C183D7F6-B498-43B3-948B-1728B52AA6E4}">
-                <adec:decorative xmlns:adec="http://schemas.microsoft.com/office/drawing/2017/decorative" val="1"/>
+                <adec:decorative xmlns:adec="http://schemas.microsoft.com/office/drawing/2017/decorative" xmlns="" val="1"/>
               </a:ext>
             </a:extLst>
           </p:cNvPr>
@@ -13595,7 +13927,7 @@
           <p:nvPr>
             <p:extLst>
               <p:ext uri="{386F3935-93C4-4BCD-93E2-E3B085C9AB24}">
-                <p16:designElem xmlns:p16="http://schemas.microsoft.com/office/powerpoint/2015/main" val="1"/>
+                <p16:designElem xmlns:p16="http://schemas.microsoft.com/office/powerpoint/2015/main" xmlns="" val="1"/>
               </p:ext>
             </p:extLst>
           </p:nvPr>
@@ -13672,7 +14004,7 @@
           <p:cNvPr id="2" name="Title 1">
             <a:extLst>
               <a:ext uri="{FF2B5EF4-FFF2-40B4-BE49-F238E27FC236}">
-                <a16:creationId xmlns:a16="http://schemas.microsoft.com/office/drawing/2014/main" id="{9CC5778C-7E07-B68D-B27D-A2577FFF198F}"/>
+                <a16:creationId xmlns:a16="http://schemas.microsoft.com/office/drawing/2014/main" xmlns="" id="{9CC5778C-7E07-B68D-B27D-A2577FFF198F}"/>
               </a:ext>
             </a:extLst>
           </p:cNvPr>
@@ -13713,10 +14045,10 @@
           <p:cNvPr id="22" name="Rectangle 21">
             <a:extLst>
               <a:ext uri="{FF2B5EF4-FFF2-40B4-BE49-F238E27FC236}">
-                <a16:creationId xmlns:a16="http://schemas.microsoft.com/office/drawing/2014/main" id="{089440EF-9BE9-4AE9-8C28-00B02296CDB6}"/>
+                <a16:creationId xmlns:a16="http://schemas.microsoft.com/office/drawing/2014/main" xmlns="" id="{089440EF-9BE9-4AE9-8C28-00B02296CDB6}"/>
               </a:ext>
               <a:ext uri="{C183D7F6-B498-43B3-948B-1728B52AA6E4}">
-                <adec:decorative xmlns:adec="http://schemas.microsoft.com/office/drawing/2017/decorative" val="1"/>
+                <adec:decorative xmlns:adec="http://schemas.microsoft.com/office/drawing/2017/decorative" xmlns="" val="1"/>
               </a:ext>
             </a:extLst>
           </p:cNvPr>
@@ -13726,7 +14058,7 @@
           <p:nvPr>
             <p:extLst>
               <p:ext uri="{386F3935-93C4-4BCD-93E2-E3B085C9AB24}">
-                <p16:designElem xmlns:p16="http://schemas.microsoft.com/office/powerpoint/2015/main" val="1"/>
+                <p16:designElem xmlns:p16="http://schemas.microsoft.com/office/powerpoint/2015/main" xmlns="" val="1"/>
               </p:ext>
             </p:extLst>
           </p:nvPr>
@@ -13781,7 +14113,7 @@
           <p:cNvPr id="4" name="Content Placeholder 3">
             <a:extLst>
               <a:ext uri="{FF2B5EF4-FFF2-40B4-BE49-F238E27FC236}">
-                <a16:creationId xmlns:a16="http://schemas.microsoft.com/office/drawing/2014/main" id="{51ED0660-9FD8-E7BB-7B21-889196146BB7}"/>
+                <a16:creationId xmlns:a16="http://schemas.microsoft.com/office/drawing/2014/main" xmlns="" id="{51ED0660-9FD8-E7BB-7B21-889196146BB7}"/>
               </a:ext>
             </a:extLst>
           </p:cNvPr>
@@ -13792,7 +14124,7 @@
             <p:ph idx="1"/>
             <p:extLst>
               <p:ext uri="{D42A27DB-BD31-4B8C-83A1-F6EECF244321}">
-                <p14:modId xmlns:p14="http://schemas.microsoft.com/office/powerpoint/2010/main" val="3158995833"/>
+                <p14:modId xmlns:p14="http://schemas.microsoft.com/office/powerpoint/2010/main" xmlns="" val="3158995833"/>
               </p:ext>
             </p:extLst>
           </p:nvPr>
@@ -13809,14 +14141,14 @@
                 <a:gridCol w="3246516">
                   <a:extLst>
                     <a:ext uri="{9D8B030D-6E8A-4147-A177-3AD203B41FA5}">
-                      <a16:colId xmlns:a16="http://schemas.microsoft.com/office/drawing/2014/main" val="144100385"/>
+                      <a16:colId xmlns:a16="http://schemas.microsoft.com/office/drawing/2014/main" xmlns="" val="144100385"/>
                     </a:ext>
                   </a:extLst>
                 </a:gridCol>
                 <a:gridCol w="5044714">
                   <a:extLst>
                     <a:ext uri="{9D8B030D-6E8A-4147-A177-3AD203B41FA5}">
-                      <a16:colId xmlns:a16="http://schemas.microsoft.com/office/drawing/2014/main" val="1668839214"/>
+                      <a16:colId xmlns:a16="http://schemas.microsoft.com/office/drawing/2014/main" xmlns="" val="1668839214"/>
                     </a:ext>
                   </a:extLst>
                 </a:gridCol>
@@ -13898,7 +14230,7 @@
                 </a:tc>
                 <a:extLst>
                   <a:ext uri="{0D108BD9-81ED-4DB2-BD59-A6C34878D82A}">
-                    <a16:rowId xmlns:a16="http://schemas.microsoft.com/office/drawing/2014/main" val="1688797570"/>
+                    <a16:rowId xmlns:a16="http://schemas.microsoft.com/office/drawing/2014/main" xmlns="" val="1688797570"/>
                   </a:ext>
                 </a:extLst>
               </a:tr>
@@ -13975,7 +14307,7 @@
                 </a:tc>
                 <a:extLst>
                   <a:ext uri="{0D108BD9-81ED-4DB2-BD59-A6C34878D82A}">
-                    <a16:rowId xmlns:a16="http://schemas.microsoft.com/office/drawing/2014/main" val="2192570332"/>
+                    <a16:rowId xmlns:a16="http://schemas.microsoft.com/office/drawing/2014/main" xmlns="" val="2192570332"/>
                   </a:ext>
                 </a:extLst>
               </a:tr>
@@ -14052,7 +14384,7 @@
                 </a:tc>
                 <a:extLst>
                   <a:ext uri="{0D108BD9-81ED-4DB2-BD59-A6C34878D82A}">
-                    <a16:rowId xmlns:a16="http://schemas.microsoft.com/office/drawing/2014/main" val="2735993383"/>
+                    <a16:rowId xmlns:a16="http://schemas.microsoft.com/office/drawing/2014/main" xmlns="" val="2735993383"/>
                   </a:ext>
                 </a:extLst>
               </a:tr>
@@ -14063,13 +14395,20 @@
     </p:spTree>
     <p:extLst>
       <p:ext uri="{BB962C8B-B14F-4D97-AF65-F5344CB8AC3E}">
-        <p14:creationId xmlns:p14="http://schemas.microsoft.com/office/powerpoint/2010/main" val="3439050064"/>
+        <p14:creationId xmlns:p14="http://schemas.microsoft.com/office/powerpoint/2010/main" xmlns="" val="3439050064"/>
       </p:ext>
     </p:extLst>
   </p:cSld>
   <p:clrMapOvr>
     <a:masterClrMapping/>
   </p:clrMapOvr>
+  <p:timing>
+    <p:tnLst>
+      <p:par>
+        <p:cTn id="1" dur="indefinite" restart="never" nodeType="tmRoot"/>
+      </p:par>
+    </p:tnLst>
+  </p:timing>
 </p:sld>
 </file>
 
@@ -14116,7 +14455,7 @@
     </a:clrScheme>
     <a:fontScheme name="Office">
       <a:majorFont>
-        <a:latin typeface="Aptos Display" panose="02110004020202020204"/>
+        <a:latin typeface="Aptos Display"/>
         <a:ea typeface=""/>
         <a:cs typeface=""/>
         <a:font script="Jpan" typeface="游ゴシック Light"/>
@@ -14168,7 +14507,7 @@
         <a:font script="Tfng" typeface="Ebrima"/>
       </a:majorFont>
       <a:minorFont>
-        <a:latin typeface="Aptos" panose="02110004020202020204"/>
+        <a:latin typeface="Aptos"/>
         <a:ea typeface=""/>
         <a:cs typeface=""/>
         <a:font script="Jpan" typeface="游ゴシック"/>
@@ -14382,7 +14721,7 @@
   <a:extraClrSchemeLst/>
   <a:extLst>
     <a:ext uri="{05A4C25C-085E-4340-85A3-A5531E510DB2}">
-      <thm15:themeFamily xmlns:thm15="http://schemas.microsoft.com/office/thememl/2012/main" name="Office Theme" id="{2E142A2C-CD16-42D6-873A-C26D2A0506FA}" vid="{1BDDFF52-6CD6-40A5-AB3C-68EB2F1E4D0A}"/>
+      <thm15:themeFamily xmlns:thm15="http://schemas.microsoft.com/office/thememl/2012/main" xmlns="" name="Office Theme" id="{2E142A2C-CD16-42D6-873A-C26D2A0506FA}" vid="{1BDDFF52-6CD6-40A5-AB3C-68EB2F1E4D0A}"/>
     </a:ext>
   </a:extLst>
 </a:theme>

</xml_diff>